<commit_message>
modified the workflow presentation
</commit_message>
<xml_diff>
--- a/extras/Explorer_Tool_Workflow_2.pptx
+++ b/extras/Explorer_Tool_Workflow_2.pptx
@@ -259,7 +259,7 @@
           <a:p>
             <a:fld id="{1560D20A-E720-4ECB-907E-0F9EBDE75356}" type="datetimeFigureOut">
               <a:rPr lang="en-US" smtClean="0"/>
-              <a:t>10/21/2021</a:t>
+              <a:t>12/16/2021</a:t>
             </a:fld>
             <a:endParaRPr lang="en-US"/>
           </a:p>
@@ -457,7 +457,7 @@
           <a:p>
             <a:fld id="{1560D20A-E720-4ECB-907E-0F9EBDE75356}" type="datetimeFigureOut">
               <a:rPr lang="en-US" smtClean="0"/>
-              <a:t>10/21/2021</a:t>
+              <a:t>12/16/2021</a:t>
             </a:fld>
             <a:endParaRPr lang="en-US"/>
           </a:p>
@@ -665,7 +665,7 @@
           <a:p>
             <a:fld id="{1560D20A-E720-4ECB-907E-0F9EBDE75356}" type="datetimeFigureOut">
               <a:rPr lang="en-US" smtClean="0"/>
-              <a:t>10/21/2021</a:t>
+              <a:t>12/16/2021</a:t>
             </a:fld>
             <a:endParaRPr lang="en-US"/>
           </a:p>
@@ -863,7 +863,7 @@
           <a:p>
             <a:fld id="{1560D20A-E720-4ECB-907E-0F9EBDE75356}" type="datetimeFigureOut">
               <a:rPr lang="en-US" smtClean="0"/>
-              <a:t>10/21/2021</a:t>
+              <a:t>12/16/2021</a:t>
             </a:fld>
             <a:endParaRPr lang="en-US"/>
           </a:p>
@@ -1138,7 +1138,7 @@
           <a:p>
             <a:fld id="{1560D20A-E720-4ECB-907E-0F9EBDE75356}" type="datetimeFigureOut">
               <a:rPr lang="en-US" smtClean="0"/>
-              <a:t>10/21/2021</a:t>
+              <a:t>12/16/2021</a:t>
             </a:fld>
             <a:endParaRPr lang="en-US"/>
           </a:p>
@@ -1403,7 +1403,7 @@
           <a:p>
             <a:fld id="{1560D20A-E720-4ECB-907E-0F9EBDE75356}" type="datetimeFigureOut">
               <a:rPr lang="en-US" smtClean="0"/>
-              <a:t>10/21/2021</a:t>
+              <a:t>12/16/2021</a:t>
             </a:fld>
             <a:endParaRPr lang="en-US"/>
           </a:p>
@@ -1815,7 +1815,7 @@
           <a:p>
             <a:fld id="{1560D20A-E720-4ECB-907E-0F9EBDE75356}" type="datetimeFigureOut">
               <a:rPr lang="en-US" smtClean="0"/>
-              <a:t>10/21/2021</a:t>
+              <a:t>12/16/2021</a:t>
             </a:fld>
             <a:endParaRPr lang="en-US"/>
           </a:p>
@@ -1956,7 +1956,7 @@
           <a:p>
             <a:fld id="{1560D20A-E720-4ECB-907E-0F9EBDE75356}" type="datetimeFigureOut">
               <a:rPr lang="en-US" smtClean="0"/>
-              <a:t>10/21/2021</a:t>
+              <a:t>12/16/2021</a:t>
             </a:fld>
             <a:endParaRPr lang="en-US"/>
           </a:p>
@@ -2069,7 +2069,7 @@
           <a:p>
             <a:fld id="{1560D20A-E720-4ECB-907E-0F9EBDE75356}" type="datetimeFigureOut">
               <a:rPr lang="en-US" smtClean="0"/>
-              <a:t>10/21/2021</a:t>
+              <a:t>12/16/2021</a:t>
             </a:fld>
             <a:endParaRPr lang="en-US"/>
           </a:p>
@@ -2380,7 +2380,7 @@
           <a:p>
             <a:fld id="{1560D20A-E720-4ECB-907E-0F9EBDE75356}" type="datetimeFigureOut">
               <a:rPr lang="en-US" smtClean="0"/>
-              <a:t>10/21/2021</a:t>
+              <a:t>12/16/2021</a:t>
             </a:fld>
             <a:endParaRPr lang="en-US"/>
           </a:p>
@@ -2668,7 +2668,7 @@
           <a:p>
             <a:fld id="{1560D20A-E720-4ECB-907E-0F9EBDE75356}" type="datetimeFigureOut">
               <a:rPr lang="en-US" smtClean="0"/>
-              <a:t>10/21/2021</a:t>
+              <a:t>12/16/2021</a:t>
             </a:fld>
             <a:endParaRPr lang="en-US"/>
           </a:p>
@@ -2909,7 +2909,7 @@
           <a:p>
             <a:fld id="{1560D20A-E720-4ECB-907E-0F9EBDE75356}" type="datetimeFigureOut">
               <a:rPr lang="en-US" smtClean="0"/>
-              <a:t>10/21/2021</a:t>
+              <a:t>12/16/2021</a:t>
             </a:fld>
             <a:endParaRPr lang="en-US"/>
           </a:p>
@@ -3411,53 +3411,6 @@
           </a:p>
         </p:txBody>
       </p:sp>
-      <p:cxnSp>
-        <p:nvCxnSpPr>
-          <p:cNvPr id="21" name="Straight Arrow Connector 20">
-            <a:extLst>
-              <a:ext uri="{FF2B5EF4-FFF2-40B4-BE49-F238E27FC236}">
-                <a16:creationId xmlns:a16="http://schemas.microsoft.com/office/drawing/2014/main" id="{0D5BF0FB-5C51-42CE-8B1F-1A3BDDE5C017}"/>
-              </a:ext>
-            </a:extLst>
-          </p:cNvPr>
-          <p:cNvCxnSpPr>
-            <a:stCxn id="42" idx="3"/>
-            <a:endCxn id="54" idx="1"/>
-          </p:cNvCxnSpPr>
-          <p:nvPr/>
-        </p:nvCxnSpPr>
-        <p:spPr>
-          <a:xfrm flipV="1">
-            <a:off x="8796135" y="4210339"/>
-            <a:ext cx="391768" cy="1637938"/>
-          </a:xfrm>
-          <a:prstGeom prst="straightConnector1">
-            <a:avLst/>
-          </a:prstGeom>
-          <a:ln w="38100">
-            <a:solidFill>
-              <a:schemeClr val="bg1">
-                <a:lumMod val="50000"/>
-              </a:schemeClr>
-            </a:solidFill>
-            <a:tailEnd type="triangle"/>
-          </a:ln>
-        </p:spPr>
-        <p:style>
-          <a:lnRef idx="1">
-            <a:schemeClr val="accent1"/>
-          </a:lnRef>
-          <a:fillRef idx="0">
-            <a:schemeClr val="accent1"/>
-          </a:fillRef>
-          <a:effectRef idx="0">
-            <a:schemeClr val="accent1"/>
-          </a:effectRef>
-          <a:fontRef idx="minor">
-            <a:schemeClr val="tx1"/>
-          </a:fontRef>
-        </p:style>
-      </p:cxnSp>
       <p:sp>
         <p:nvSpPr>
           <p:cNvPr id="38" name="TextBox 37">
@@ -4478,25 +4431,8 @@
                 <a:latin typeface="Times New Roman" panose="02020603050405020304" pitchFamily="18" charset="0"/>
                 <a:cs typeface="Times New Roman" panose="02020603050405020304" pitchFamily="18" charset="0"/>
               </a:rPr>
-              <a:t>Interactive: </a:t>
-            </a:r>
-            <a:r>
-              <a:rPr lang="en-US" sz="1200" dirty="0" err="1">
-                <a:solidFill>
-                  <a:schemeClr val="tx1"/>
-                </a:solidFill>
-                <a:latin typeface="Times New Roman" panose="02020603050405020304" pitchFamily="18" charset="0"/>
-                <a:cs typeface="Times New Roman" panose="02020603050405020304" pitchFamily="18" charset="0"/>
-              </a:rPr>
-              <a:t>plotly</a:t>
-            </a:r>
-            <a:endParaRPr lang="en-US" sz="1200" dirty="0">
-              <a:solidFill>
-                <a:schemeClr val="tx1"/>
-              </a:solidFill>
-              <a:latin typeface="Times New Roman" panose="02020603050405020304" pitchFamily="18" charset="0"/>
-              <a:cs typeface="Times New Roman" panose="02020603050405020304" pitchFamily="18" charset="0"/>
-            </a:endParaRPr>
+              <a:t>Interactive: plotly</a:t>
+            </a:r>
           </a:p>
           <a:p>
             <a:pPr marL="228600" indent="-228600">
@@ -4511,25 +4447,8 @@
                 <a:latin typeface="Times New Roman" panose="02020603050405020304" pitchFamily="18" charset="0"/>
                 <a:cs typeface="Times New Roman" panose="02020603050405020304" pitchFamily="18" charset="0"/>
               </a:rPr>
-              <a:t>Boxplots: </a:t>
-            </a:r>
-            <a:r>
-              <a:rPr lang="en-US" sz="1200" dirty="0" err="1">
-                <a:solidFill>
-                  <a:schemeClr val="tx1"/>
-                </a:solidFill>
-                <a:latin typeface="Times New Roman" panose="02020603050405020304" pitchFamily="18" charset="0"/>
-                <a:cs typeface="Times New Roman" panose="02020603050405020304" pitchFamily="18" charset="0"/>
-              </a:rPr>
-              <a:t>beeswarm</a:t>
-            </a:r>
-            <a:endParaRPr lang="en-US" sz="1200" dirty="0">
-              <a:solidFill>
-                <a:schemeClr val="tx1"/>
-              </a:solidFill>
-              <a:latin typeface="Times New Roman" panose="02020603050405020304" pitchFamily="18" charset="0"/>
-              <a:cs typeface="Times New Roman" panose="02020603050405020304" pitchFamily="18" charset="0"/>
-            </a:endParaRPr>
+              <a:t>Boxplots: beeswarm</a:t>
+            </a:r>
           </a:p>
           <a:p>
             <a:pPr marL="228600" indent="-228600">
@@ -4544,25 +4463,8 @@
                 <a:latin typeface="Times New Roman" panose="02020603050405020304" pitchFamily="18" charset="0"/>
                 <a:cs typeface="Times New Roman" panose="02020603050405020304" pitchFamily="18" charset="0"/>
               </a:rPr>
-              <a:t>Heatmaps: </a:t>
-            </a:r>
-            <a:r>
-              <a:rPr lang="en-US" sz="1200" dirty="0" err="1">
-                <a:solidFill>
-                  <a:schemeClr val="tx1"/>
-                </a:solidFill>
-                <a:latin typeface="Times New Roman" panose="02020603050405020304" pitchFamily="18" charset="0"/>
-                <a:cs typeface="Times New Roman" panose="02020603050405020304" pitchFamily="18" charset="0"/>
-              </a:rPr>
-              <a:t>heatmaply</a:t>
-            </a:r>
-            <a:endParaRPr lang="en-US" sz="1200" dirty="0">
-              <a:solidFill>
-                <a:schemeClr val="tx1"/>
-              </a:solidFill>
-              <a:latin typeface="Times New Roman" panose="02020603050405020304" pitchFamily="18" charset="0"/>
-              <a:cs typeface="Times New Roman" panose="02020603050405020304" pitchFamily="18" charset="0"/>
-            </a:endParaRPr>
+              <a:t>Heatmaps: heatmaply</a:t>
+            </a:r>
           </a:p>
           <a:p>
             <a:pPr marL="228600" indent="-228600">
@@ -4577,25 +4479,8 @@
                 <a:latin typeface="Times New Roman" panose="02020603050405020304" pitchFamily="18" charset="0"/>
                 <a:cs typeface="Times New Roman" panose="02020603050405020304" pitchFamily="18" charset="0"/>
               </a:rPr>
-              <a:t>Intersections: </a:t>
-            </a:r>
-            <a:r>
-              <a:rPr lang="en-US" sz="1200" dirty="0" err="1">
-                <a:solidFill>
-                  <a:schemeClr val="tx1"/>
-                </a:solidFill>
-                <a:latin typeface="Times New Roman" panose="02020603050405020304" pitchFamily="18" charset="0"/>
-                <a:cs typeface="Times New Roman" panose="02020603050405020304" pitchFamily="18" charset="0"/>
-              </a:rPr>
-              <a:t>VennDiagram</a:t>
-            </a:r>
-            <a:endParaRPr lang="en-US" sz="1200" dirty="0">
-              <a:solidFill>
-                <a:schemeClr val="tx1"/>
-              </a:solidFill>
-              <a:latin typeface="Times New Roman" panose="02020603050405020304" pitchFamily="18" charset="0"/>
-              <a:cs typeface="Times New Roman" panose="02020603050405020304" pitchFamily="18" charset="0"/>
-            </a:endParaRPr>
+              <a:t>Intersections: VennDiagram</a:t>
+            </a:r>
           </a:p>
           <a:p>
             <a:pPr marL="228600" indent="-228600">
@@ -5774,6 +5659,109 @@
           </a:fontRef>
         </p:style>
       </p:cxnSp>
+      <p:sp>
+        <p:nvSpPr>
+          <p:cNvPr id="3" name="Arrow: Curved Up 2">
+            <a:extLst>
+              <a:ext uri="{FF2B5EF4-FFF2-40B4-BE49-F238E27FC236}">
+                <a16:creationId xmlns:a16="http://schemas.microsoft.com/office/drawing/2014/main" id="{BF829807-EAE6-40C4-A0F8-8BB42F200AEA}"/>
+              </a:ext>
+            </a:extLst>
+          </p:cNvPr>
+          <p:cNvSpPr/>
+          <p:nvPr/>
+        </p:nvSpPr>
+        <p:spPr>
+          <a:xfrm>
+            <a:off x="8844577" y="3902859"/>
+            <a:ext cx="278994" cy="159391"/>
+          </a:xfrm>
+          <a:prstGeom prst="curvedUpArrow">
+            <a:avLst/>
+          </a:prstGeom>
+        </p:spPr>
+        <p:style>
+          <a:lnRef idx="2">
+            <a:schemeClr val="accent1">
+              <a:shade val="50000"/>
+            </a:schemeClr>
+          </a:lnRef>
+          <a:fillRef idx="1">
+            <a:schemeClr val="accent1"/>
+          </a:fillRef>
+          <a:effectRef idx="0">
+            <a:schemeClr val="accent1"/>
+          </a:effectRef>
+          <a:fontRef idx="minor">
+            <a:schemeClr val="lt1"/>
+          </a:fontRef>
+        </p:style>
+        <p:txBody>
+          <a:bodyPr rtlCol="0" anchor="ctr"/>
+          <a:lstStyle/>
+          <a:p>
+            <a:pPr algn="ctr"/>
+            <a:endParaRPr lang="en-US">
+              <a:solidFill>
+                <a:schemeClr val="tx1"/>
+              </a:solidFill>
+            </a:endParaRPr>
+          </a:p>
+        </p:txBody>
+      </p:sp>
+      <p:sp>
+        <p:nvSpPr>
+          <p:cNvPr id="34" name="Arrow: Curved Up 33">
+            <a:extLst>
+              <a:ext uri="{FF2B5EF4-FFF2-40B4-BE49-F238E27FC236}">
+                <a16:creationId xmlns:a16="http://schemas.microsoft.com/office/drawing/2014/main" id="{8F73A799-DB67-4C20-A429-CD01CBB3E052}"/>
+              </a:ext>
+            </a:extLst>
+          </p:cNvPr>
+          <p:cNvSpPr/>
+          <p:nvPr/>
+        </p:nvSpPr>
+        <p:spPr>
+          <a:xfrm rot="10800000">
+            <a:off x="8835501" y="3705621"/>
+            <a:ext cx="278994" cy="159391"/>
+          </a:xfrm>
+          <a:prstGeom prst="curvedUpArrow">
+            <a:avLst/>
+          </a:prstGeom>
+          <a:solidFill>
+            <a:srgbClr val="FF0000"/>
+          </a:solidFill>
+        </p:spPr>
+        <p:style>
+          <a:lnRef idx="2">
+            <a:schemeClr val="accent1">
+              <a:shade val="50000"/>
+            </a:schemeClr>
+          </a:lnRef>
+          <a:fillRef idx="1">
+            <a:schemeClr val="accent1"/>
+          </a:fillRef>
+          <a:effectRef idx="0">
+            <a:schemeClr val="accent1"/>
+          </a:effectRef>
+          <a:fontRef idx="minor">
+            <a:schemeClr val="lt1"/>
+          </a:fontRef>
+        </p:style>
+        <p:txBody>
+          <a:bodyPr rtlCol="0" anchor="ctr"/>
+          <a:lstStyle/>
+          <a:p>
+            <a:pPr algn="ctr"/>
+            <a:endParaRPr lang="en-US">
+              <a:solidFill>
+                <a:srgbClr val="FF0000"/>
+              </a:solidFill>
+            </a:endParaRPr>
+          </a:p>
+        </p:txBody>
+      </p:sp>
     </p:spTree>
     <p:extLst>
       <p:ext uri="{BB962C8B-B14F-4D97-AF65-F5344CB8AC3E}">

</xml_diff>

<commit_message>
updated presentation with dependencies diagram
</commit_message>
<xml_diff>
--- a/extras/Explorer_Tool_Workflow_2.pptx
+++ b/extras/Explorer_Tool_Workflow_2.pptx
@@ -6,6 +6,7 @@
   </p:sldMasterIdLst>
   <p:sldIdLst>
     <p:sldId id="256" r:id="rId2"/>
+    <p:sldId id="257" r:id="rId3"/>
   </p:sldIdLst>
   <p:sldSz cx="12192000" cy="6858000"/>
   <p:notesSz cx="6858000" cy="9144000"/>
@@ -259,7 +260,7 @@
           <a:p>
             <a:fld id="{1560D20A-E720-4ECB-907E-0F9EBDE75356}" type="datetimeFigureOut">
               <a:rPr lang="en-US" smtClean="0"/>
-              <a:t>12/16/2021</a:t>
+              <a:t>1/5/2022</a:t>
             </a:fld>
             <a:endParaRPr lang="en-US"/>
           </a:p>
@@ -457,7 +458,7 @@
           <a:p>
             <a:fld id="{1560D20A-E720-4ECB-907E-0F9EBDE75356}" type="datetimeFigureOut">
               <a:rPr lang="en-US" smtClean="0"/>
-              <a:t>12/16/2021</a:t>
+              <a:t>1/5/2022</a:t>
             </a:fld>
             <a:endParaRPr lang="en-US"/>
           </a:p>
@@ -665,7 +666,7 @@
           <a:p>
             <a:fld id="{1560D20A-E720-4ECB-907E-0F9EBDE75356}" type="datetimeFigureOut">
               <a:rPr lang="en-US" smtClean="0"/>
-              <a:t>12/16/2021</a:t>
+              <a:t>1/5/2022</a:t>
             </a:fld>
             <a:endParaRPr lang="en-US"/>
           </a:p>
@@ -863,7 +864,7 @@
           <a:p>
             <a:fld id="{1560D20A-E720-4ECB-907E-0F9EBDE75356}" type="datetimeFigureOut">
               <a:rPr lang="en-US" smtClean="0"/>
-              <a:t>12/16/2021</a:t>
+              <a:t>1/5/2022</a:t>
             </a:fld>
             <a:endParaRPr lang="en-US"/>
           </a:p>
@@ -1138,7 +1139,7 @@
           <a:p>
             <a:fld id="{1560D20A-E720-4ECB-907E-0F9EBDE75356}" type="datetimeFigureOut">
               <a:rPr lang="en-US" smtClean="0"/>
-              <a:t>12/16/2021</a:t>
+              <a:t>1/5/2022</a:t>
             </a:fld>
             <a:endParaRPr lang="en-US"/>
           </a:p>
@@ -1403,7 +1404,7 @@
           <a:p>
             <a:fld id="{1560D20A-E720-4ECB-907E-0F9EBDE75356}" type="datetimeFigureOut">
               <a:rPr lang="en-US" smtClean="0"/>
-              <a:t>12/16/2021</a:t>
+              <a:t>1/5/2022</a:t>
             </a:fld>
             <a:endParaRPr lang="en-US"/>
           </a:p>
@@ -1815,7 +1816,7 @@
           <a:p>
             <a:fld id="{1560D20A-E720-4ECB-907E-0F9EBDE75356}" type="datetimeFigureOut">
               <a:rPr lang="en-US" smtClean="0"/>
-              <a:t>12/16/2021</a:t>
+              <a:t>1/5/2022</a:t>
             </a:fld>
             <a:endParaRPr lang="en-US"/>
           </a:p>
@@ -1956,7 +1957,7 @@
           <a:p>
             <a:fld id="{1560D20A-E720-4ECB-907E-0F9EBDE75356}" type="datetimeFigureOut">
               <a:rPr lang="en-US" smtClean="0"/>
-              <a:t>12/16/2021</a:t>
+              <a:t>1/5/2022</a:t>
             </a:fld>
             <a:endParaRPr lang="en-US"/>
           </a:p>
@@ -2069,7 +2070,7 @@
           <a:p>
             <a:fld id="{1560D20A-E720-4ECB-907E-0F9EBDE75356}" type="datetimeFigureOut">
               <a:rPr lang="en-US" smtClean="0"/>
-              <a:t>12/16/2021</a:t>
+              <a:t>1/5/2022</a:t>
             </a:fld>
             <a:endParaRPr lang="en-US"/>
           </a:p>
@@ -2380,7 +2381,7 @@
           <a:p>
             <a:fld id="{1560D20A-E720-4ECB-907E-0F9EBDE75356}" type="datetimeFigureOut">
               <a:rPr lang="en-US" smtClean="0"/>
-              <a:t>12/16/2021</a:t>
+              <a:t>1/5/2022</a:t>
             </a:fld>
             <a:endParaRPr lang="en-US"/>
           </a:p>
@@ -2668,7 +2669,7 @@
           <a:p>
             <a:fld id="{1560D20A-E720-4ECB-907E-0F9EBDE75356}" type="datetimeFigureOut">
               <a:rPr lang="en-US" smtClean="0"/>
-              <a:t>12/16/2021</a:t>
+              <a:t>1/5/2022</a:t>
             </a:fld>
             <a:endParaRPr lang="en-US"/>
           </a:p>
@@ -2909,7 +2910,7 @@
           <a:p>
             <a:fld id="{1560D20A-E720-4ECB-907E-0F9EBDE75356}" type="datetimeFigureOut">
               <a:rPr lang="en-US" smtClean="0"/>
-              <a:t>12/16/2021</a:t>
+              <a:t>1/5/2022</a:t>
             </a:fld>
             <a:endParaRPr lang="en-US"/>
           </a:p>
@@ -5775,6 +5776,1735 @@
 </p:sld>
 </file>
 
+<file path=ppt/slides/slide2.xml><?xml version="1.0" encoding="utf-8"?>
+<p:sld xmlns:a="http://schemas.openxmlformats.org/drawingml/2006/main" xmlns:r="http://schemas.openxmlformats.org/officeDocument/2006/relationships" xmlns:p="http://schemas.openxmlformats.org/presentationml/2006/main">
+  <p:cSld>
+    <p:spTree>
+      <p:nvGrpSpPr>
+        <p:cNvPr id="1" name=""/>
+        <p:cNvGrpSpPr/>
+        <p:nvPr/>
+      </p:nvGrpSpPr>
+      <p:grpSpPr>
+        <a:xfrm>
+          <a:off x="0" y="0"/>
+          <a:ext cx="0" cy="0"/>
+          <a:chOff x="0" y="0"/>
+          <a:chExt cx="0" cy="0"/>
+        </a:xfrm>
+      </p:grpSpPr>
+      <p:sp>
+        <p:nvSpPr>
+          <p:cNvPr id="70" name="TextBox 69">
+            <a:extLst>
+              <a:ext uri="{FF2B5EF4-FFF2-40B4-BE49-F238E27FC236}">
+                <a16:creationId xmlns:a16="http://schemas.microsoft.com/office/drawing/2014/main" id="{21F68456-9555-4B46-A5FB-4CDC51CBEE72}"/>
+              </a:ext>
+            </a:extLst>
+          </p:cNvPr>
+          <p:cNvSpPr txBox="1"/>
+          <p:nvPr/>
+        </p:nvSpPr>
+        <p:spPr>
+          <a:xfrm>
+            <a:off x="1684704" y="109581"/>
+            <a:ext cx="7711342" cy="276999"/>
+          </a:xfrm>
+          <a:prstGeom prst="rect">
+            <a:avLst/>
+          </a:prstGeom>
+          <a:solidFill>
+            <a:schemeClr val="bg2"/>
+          </a:solidFill>
+          <a:ln/>
+        </p:spPr>
+        <p:style>
+          <a:lnRef idx="2">
+            <a:schemeClr val="accent1"/>
+          </a:lnRef>
+          <a:fillRef idx="1">
+            <a:schemeClr val="lt1"/>
+          </a:fillRef>
+          <a:effectRef idx="0">
+            <a:schemeClr val="accent1"/>
+          </a:effectRef>
+          <a:fontRef idx="minor">
+            <a:schemeClr val="dk1"/>
+          </a:fontRef>
+        </p:style>
+        <p:txBody>
+          <a:bodyPr wrap="square" rtlCol="0">
+            <a:spAutoFit/>
+          </a:bodyPr>
+          <a:lstStyle/>
+          <a:p>
+            <a:pPr algn="ctr"/>
+            <a:r>
+              <a:rPr lang="en-US" sz="1200" b="1" dirty="0">
+                <a:solidFill>
+                  <a:schemeClr val="tx1"/>
+                </a:solidFill>
+                <a:latin typeface="Times New Roman" panose="02020603050405020304" pitchFamily="18" charset="0"/>
+                <a:cs typeface="Times New Roman" panose="02020603050405020304" pitchFamily="18" charset="0"/>
+              </a:rPr>
+              <a:t>install.R</a:t>
+            </a:r>
+            <a:r>
+              <a:rPr lang="en-US" sz="1200" dirty="0">
+                <a:solidFill>
+                  <a:schemeClr val="tx1"/>
+                </a:solidFill>
+                <a:latin typeface="Times New Roman" panose="02020603050405020304" pitchFamily="18" charset="0"/>
+                <a:cs typeface="Times New Roman" panose="02020603050405020304" pitchFamily="18" charset="0"/>
+              </a:rPr>
+              <a:t>: Declares functions, determines the environment, installs packages, and stores the file root.  </a:t>
+            </a:r>
+          </a:p>
+        </p:txBody>
+      </p:sp>
+      <p:sp>
+        <p:nvSpPr>
+          <p:cNvPr id="36" name="TextBox 35">
+            <a:extLst>
+              <a:ext uri="{FF2B5EF4-FFF2-40B4-BE49-F238E27FC236}">
+                <a16:creationId xmlns:a16="http://schemas.microsoft.com/office/drawing/2014/main" id="{BAAD0B62-E9A4-43AE-B1F7-9615289B2EDC}"/>
+              </a:ext>
+            </a:extLst>
+          </p:cNvPr>
+          <p:cNvSpPr txBox="1"/>
+          <p:nvPr/>
+        </p:nvSpPr>
+        <p:spPr>
+          <a:xfrm>
+            <a:off x="2733967" y="1547964"/>
+            <a:ext cx="2363437" cy="461665"/>
+          </a:xfrm>
+          <a:prstGeom prst="rect">
+            <a:avLst/>
+          </a:prstGeom>
+          <a:solidFill>
+            <a:schemeClr val="bg1"/>
+          </a:solidFill>
+          <a:ln/>
+        </p:spPr>
+        <p:style>
+          <a:lnRef idx="2">
+            <a:schemeClr val="accent1"/>
+          </a:lnRef>
+          <a:fillRef idx="1">
+            <a:schemeClr val="lt1"/>
+          </a:fillRef>
+          <a:effectRef idx="0">
+            <a:schemeClr val="accent1"/>
+          </a:effectRef>
+          <a:fontRef idx="minor">
+            <a:schemeClr val="dk1"/>
+          </a:fontRef>
+        </p:style>
+        <p:txBody>
+          <a:bodyPr wrap="square" rtlCol="0">
+            <a:spAutoFit/>
+          </a:bodyPr>
+          <a:lstStyle/>
+          <a:p>
+            <a:pPr algn="ctr"/>
+            <a:r>
+              <a:rPr lang="en-US" sz="1200" b="1" dirty="0">
+                <a:solidFill>
+                  <a:schemeClr val="tx1"/>
+                </a:solidFill>
+                <a:latin typeface="Times New Roman" panose="02020603050405020304" pitchFamily="18" charset="0"/>
+                <a:cs typeface="Times New Roman" panose="02020603050405020304" pitchFamily="18" charset="0"/>
+              </a:rPr>
+              <a:t>workflows.R</a:t>
+            </a:r>
+            <a:r>
+              <a:rPr lang="en-US" sz="1200" dirty="0">
+                <a:solidFill>
+                  <a:schemeClr val="tx1"/>
+                </a:solidFill>
+                <a:latin typeface="Times New Roman" panose="02020603050405020304" pitchFamily="18" charset="0"/>
+                <a:cs typeface="Times New Roman" panose="02020603050405020304" pitchFamily="18" charset="0"/>
+              </a:rPr>
+              <a:t>: Manage folders and app deployment for each workflow.</a:t>
+            </a:r>
+          </a:p>
+        </p:txBody>
+      </p:sp>
+      <p:sp>
+        <p:nvSpPr>
+          <p:cNvPr id="37" name="TextBox 36">
+            <a:extLst>
+              <a:ext uri="{FF2B5EF4-FFF2-40B4-BE49-F238E27FC236}">
+                <a16:creationId xmlns:a16="http://schemas.microsoft.com/office/drawing/2014/main" id="{C2C6C6C6-1069-411B-BF55-0C07A966CAC0}"/>
+              </a:ext>
+            </a:extLst>
+          </p:cNvPr>
+          <p:cNvSpPr txBox="1"/>
+          <p:nvPr/>
+        </p:nvSpPr>
+        <p:spPr>
+          <a:xfrm>
+            <a:off x="5259938" y="5212776"/>
+            <a:ext cx="2363421" cy="1384995"/>
+          </a:xfrm>
+          <a:prstGeom prst="rect">
+            <a:avLst/>
+          </a:prstGeom>
+          <a:solidFill>
+            <a:schemeClr val="bg1"/>
+          </a:solidFill>
+          <a:ln/>
+        </p:spPr>
+        <p:style>
+          <a:lnRef idx="2">
+            <a:schemeClr val="accent1"/>
+          </a:lnRef>
+          <a:fillRef idx="1">
+            <a:schemeClr val="lt1"/>
+          </a:fillRef>
+          <a:effectRef idx="0">
+            <a:schemeClr val="accent1"/>
+          </a:effectRef>
+          <a:fontRef idx="minor">
+            <a:schemeClr val="dk1"/>
+          </a:fontRef>
+        </p:style>
+        <p:txBody>
+          <a:bodyPr wrap="square" rtlCol="0">
+            <a:spAutoFit/>
+          </a:bodyPr>
+          <a:lstStyle/>
+          <a:p>
+            <a:pPr algn="ctr"/>
+            <a:r>
+              <a:rPr lang="en-US" sz="1200" b="1" dirty="0">
+                <a:solidFill>
+                  <a:schemeClr val="tx1"/>
+                </a:solidFill>
+                <a:latin typeface="Times New Roman" panose="02020603050405020304" pitchFamily="18" charset="0"/>
+                <a:cs typeface="Times New Roman" panose="02020603050405020304" pitchFamily="18" charset="0"/>
+              </a:rPr>
+              <a:t>authentication.R</a:t>
+            </a:r>
+            <a:r>
+              <a:rPr lang="en-US" sz="1200" dirty="0">
+                <a:solidFill>
+                  <a:schemeClr val="tx1"/>
+                </a:solidFill>
+                <a:latin typeface="Times New Roman" panose="02020603050405020304" pitchFamily="18" charset="0"/>
+                <a:cs typeface="Times New Roman" panose="02020603050405020304" pitchFamily="18" charset="0"/>
+              </a:rPr>
+              <a:t>: Manages user authentication for the application.</a:t>
+            </a:r>
+          </a:p>
+          <a:p>
+            <a:pPr algn="ctr"/>
+            <a:endParaRPr lang="en-US" sz="1200" dirty="0">
+              <a:solidFill>
+                <a:schemeClr val="tx1"/>
+              </a:solidFill>
+              <a:latin typeface="Times New Roman" panose="02020603050405020304" pitchFamily="18" charset="0"/>
+              <a:cs typeface="Times New Roman" panose="02020603050405020304" pitchFamily="18" charset="0"/>
+            </a:endParaRPr>
+          </a:p>
+          <a:p>
+            <a:pPr algn="ctr"/>
+            <a:r>
+              <a:rPr lang="en-US" sz="1200" b="1" dirty="0">
+                <a:solidFill>
+                  <a:schemeClr val="tx1"/>
+                </a:solidFill>
+                <a:latin typeface="Times New Roman" panose="02020603050405020304" pitchFamily="18" charset="0"/>
+                <a:cs typeface="Times New Roman" panose="02020603050405020304" pitchFamily="18" charset="0"/>
+              </a:rPr>
+              <a:t>plotting.R</a:t>
+            </a:r>
+            <a:r>
+              <a:rPr lang="en-US" sz="1200" dirty="0">
+                <a:solidFill>
+                  <a:schemeClr val="tx1"/>
+                </a:solidFill>
+                <a:latin typeface="Times New Roman" panose="02020603050405020304" pitchFamily="18" charset="0"/>
+                <a:cs typeface="Times New Roman" panose="02020603050405020304" pitchFamily="18" charset="0"/>
+              </a:rPr>
+              <a:t>: Makes ggplot2, plotly, boxplot / beeswarm, DT, UpSetR, heatmaply, and Venn Diagram objects for Shiny applications.</a:t>
+            </a:r>
+          </a:p>
+        </p:txBody>
+      </p:sp>
+      <p:sp>
+        <p:nvSpPr>
+          <p:cNvPr id="44" name="TextBox 43">
+            <a:extLst>
+              <a:ext uri="{FF2B5EF4-FFF2-40B4-BE49-F238E27FC236}">
+                <a16:creationId xmlns:a16="http://schemas.microsoft.com/office/drawing/2014/main" id="{47F8FFAB-12ED-4067-8FEC-65125D573990}"/>
+              </a:ext>
+            </a:extLst>
+          </p:cNvPr>
+          <p:cNvSpPr txBox="1"/>
+          <p:nvPr/>
+        </p:nvSpPr>
+        <p:spPr>
+          <a:xfrm>
+            <a:off x="5266800" y="3581672"/>
+            <a:ext cx="2363437" cy="461665"/>
+          </a:xfrm>
+          <a:prstGeom prst="rect">
+            <a:avLst/>
+          </a:prstGeom>
+          <a:solidFill>
+            <a:schemeClr val="bg1"/>
+          </a:solidFill>
+          <a:ln/>
+        </p:spPr>
+        <p:style>
+          <a:lnRef idx="2">
+            <a:schemeClr val="accent1"/>
+          </a:lnRef>
+          <a:fillRef idx="1">
+            <a:schemeClr val="lt1"/>
+          </a:fillRef>
+          <a:effectRef idx="0">
+            <a:schemeClr val="accent1"/>
+          </a:effectRef>
+          <a:fontRef idx="minor">
+            <a:schemeClr val="dk1"/>
+          </a:fontRef>
+        </p:style>
+        <p:txBody>
+          <a:bodyPr wrap="square" rtlCol="0">
+            <a:spAutoFit/>
+          </a:bodyPr>
+          <a:lstStyle/>
+          <a:p>
+            <a:pPr algn="ctr"/>
+            <a:r>
+              <a:rPr lang="en-US" sz="1200" b="1" dirty="0">
+                <a:solidFill>
+                  <a:schemeClr val="tx1"/>
+                </a:solidFill>
+                <a:latin typeface="Times New Roman" panose="02020603050405020304" pitchFamily="18" charset="0"/>
+                <a:cs typeface="Times New Roman" panose="02020603050405020304" pitchFamily="18" charset="0"/>
+              </a:rPr>
+              <a:t>storage.R</a:t>
+            </a:r>
+            <a:r>
+              <a:rPr lang="en-US" sz="1200" dirty="0">
+                <a:solidFill>
+                  <a:schemeClr val="tx1"/>
+                </a:solidFill>
+                <a:latin typeface="Times New Roman" panose="02020603050405020304" pitchFamily="18" charset="0"/>
+                <a:cs typeface="Times New Roman" panose="02020603050405020304" pitchFamily="18" charset="0"/>
+              </a:rPr>
+              <a:t>: Names, stores, and loads reduction analysis files. </a:t>
+            </a:r>
+          </a:p>
+        </p:txBody>
+      </p:sp>
+      <p:sp>
+        <p:nvSpPr>
+          <p:cNvPr id="50" name="TextBox 49">
+            <a:extLst>
+              <a:ext uri="{FF2B5EF4-FFF2-40B4-BE49-F238E27FC236}">
+                <a16:creationId xmlns:a16="http://schemas.microsoft.com/office/drawing/2014/main" id="{83B2102D-D373-4C95-A96F-FC4023A9A31D}"/>
+              </a:ext>
+            </a:extLst>
+          </p:cNvPr>
+          <p:cNvSpPr txBox="1"/>
+          <p:nvPr/>
+        </p:nvSpPr>
+        <p:spPr>
+          <a:xfrm>
+            <a:off x="2728466" y="3484011"/>
+            <a:ext cx="2363435" cy="646331"/>
+          </a:xfrm>
+          <a:prstGeom prst="rect">
+            <a:avLst/>
+          </a:prstGeom>
+          <a:solidFill>
+            <a:schemeClr val="bg1"/>
+          </a:solidFill>
+          <a:ln/>
+        </p:spPr>
+        <p:style>
+          <a:lnRef idx="2">
+            <a:schemeClr val="accent1"/>
+          </a:lnRef>
+          <a:fillRef idx="1">
+            <a:schemeClr val="lt1"/>
+          </a:fillRef>
+          <a:effectRef idx="0">
+            <a:schemeClr val="accent1"/>
+          </a:effectRef>
+          <a:fontRef idx="minor">
+            <a:schemeClr val="dk1"/>
+          </a:fontRef>
+        </p:style>
+        <p:txBody>
+          <a:bodyPr wrap="square" rtlCol="0">
+            <a:spAutoFit/>
+          </a:bodyPr>
+          <a:lstStyle/>
+          <a:p>
+            <a:pPr algn="ctr"/>
+            <a:r>
+              <a:rPr lang="en-US" sz="1200" b="1" dirty="0">
+                <a:solidFill>
+                  <a:schemeClr val="tx1"/>
+                </a:solidFill>
+                <a:latin typeface="Times New Roman" panose="02020603050405020304" pitchFamily="18" charset="0"/>
+                <a:cs typeface="Times New Roman" panose="02020603050405020304" pitchFamily="18" charset="0"/>
+              </a:rPr>
+              <a:t>preprocess.R</a:t>
+            </a:r>
+            <a:r>
+              <a:rPr lang="en-US" sz="1200" dirty="0">
+                <a:solidFill>
+                  <a:schemeClr val="tx1"/>
+                </a:solidFill>
+                <a:latin typeface="Times New Roman" panose="02020603050405020304" pitchFamily="18" charset="0"/>
+                <a:cs typeface="Times New Roman" panose="02020603050405020304" pitchFamily="18" charset="0"/>
+              </a:rPr>
+              <a:t>: Declares scaling / normalization functions and loads stored category / subset data.</a:t>
+            </a:r>
+          </a:p>
+        </p:txBody>
+      </p:sp>
+      <p:cxnSp>
+        <p:nvCxnSpPr>
+          <p:cNvPr id="51" name="Straight Arrow Connector 50">
+            <a:extLst>
+              <a:ext uri="{FF2B5EF4-FFF2-40B4-BE49-F238E27FC236}">
+                <a16:creationId xmlns:a16="http://schemas.microsoft.com/office/drawing/2014/main" id="{40C47DC1-7BA7-45E6-846C-79D5D7DB91AF}"/>
+              </a:ext>
+            </a:extLst>
+          </p:cNvPr>
+          <p:cNvCxnSpPr>
+            <a:cxnSpLocks/>
+            <a:stCxn id="36" idx="2"/>
+            <a:endCxn id="50" idx="0"/>
+          </p:cNvCxnSpPr>
+          <p:nvPr/>
+        </p:nvCxnSpPr>
+        <p:spPr>
+          <a:xfrm flipH="1">
+            <a:off x="3910184" y="2009629"/>
+            <a:ext cx="5502" cy="1474382"/>
+          </a:xfrm>
+          <a:prstGeom prst="straightConnector1">
+            <a:avLst/>
+          </a:prstGeom>
+          <a:ln>
+            <a:tailEnd type="triangle"/>
+          </a:ln>
+        </p:spPr>
+        <p:style>
+          <a:lnRef idx="1">
+            <a:schemeClr val="accent1"/>
+          </a:lnRef>
+          <a:fillRef idx="0">
+            <a:schemeClr val="accent1"/>
+          </a:fillRef>
+          <a:effectRef idx="0">
+            <a:schemeClr val="accent1"/>
+          </a:effectRef>
+          <a:fontRef idx="minor">
+            <a:schemeClr val="tx1"/>
+          </a:fontRef>
+        </p:style>
+      </p:cxnSp>
+      <p:cxnSp>
+        <p:nvCxnSpPr>
+          <p:cNvPr id="55" name="Straight Arrow Connector 54">
+            <a:extLst>
+              <a:ext uri="{FF2B5EF4-FFF2-40B4-BE49-F238E27FC236}">
+                <a16:creationId xmlns:a16="http://schemas.microsoft.com/office/drawing/2014/main" id="{86217779-404D-44EC-820E-6456D1841D8F}"/>
+              </a:ext>
+            </a:extLst>
+          </p:cNvPr>
+          <p:cNvCxnSpPr>
+            <a:cxnSpLocks/>
+            <a:stCxn id="44" idx="1"/>
+            <a:endCxn id="50" idx="3"/>
+          </p:cNvCxnSpPr>
+          <p:nvPr/>
+        </p:nvCxnSpPr>
+        <p:spPr>
+          <a:xfrm flipH="1" flipV="1">
+            <a:off x="5091901" y="3807177"/>
+            <a:ext cx="174899" cy="5328"/>
+          </a:xfrm>
+          <a:prstGeom prst="straightConnector1">
+            <a:avLst/>
+          </a:prstGeom>
+          <a:ln>
+            <a:tailEnd type="triangle"/>
+          </a:ln>
+        </p:spPr>
+        <p:style>
+          <a:lnRef idx="1">
+            <a:schemeClr val="accent1"/>
+          </a:lnRef>
+          <a:fillRef idx="0">
+            <a:schemeClr val="accent1"/>
+          </a:fillRef>
+          <a:effectRef idx="0">
+            <a:schemeClr val="accent1"/>
+          </a:effectRef>
+          <a:fontRef idx="minor">
+            <a:schemeClr val="tx1"/>
+          </a:fontRef>
+        </p:style>
+      </p:cxnSp>
+      <p:sp>
+        <p:nvSpPr>
+          <p:cNvPr id="57" name="TextBox 56">
+            <a:extLst>
+              <a:ext uri="{FF2B5EF4-FFF2-40B4-BE49-F238E27FC236}">
+                <a16:creationId xmlns:a16="http://schemas.microsoft.com/office/drawing/2014/main" id="{68AD7BA7-2A6A-4680-B127-FE1900A22BDC}"/>
+              </a:ext>
+            </a:extLst>
+          </p:cNvPr>
+          <p:cNvSpPr txBox="1"/>
+          <p:nvPr/>
+        </p:nvSpPr>
+        <p:spPr>
+          <a:xfrm>
+            <a:off x="5271919" y="1455630"/>
+            <a:ext cx="2363435" cy="646331"/>
+          </a:xfrm>
+          <a:prstGeom prst="rect">
+            <a:avLst/>
+          </a:prstGeom>
+          <a:ln/>
+        </p:spPr>
+        <p:style>
+          <a:lnRef idx="2">
+            <a:schemeClr val="accent1"/>
+          </a:lnRef>
+          <a:fillRef idx="1">
+            <a:schemeClr val="lt1"/>
+          </a:fillRef>
+          <a:effectRef idx="0">
+            <a:schemeClr val="accent1"/>
+          </a:effectRef>
+          <a:fontRef idx="minor">
+            <a:schemeClr val="dk1"/>
+          </a:fontRef>
+        </p:style>
+        <p:txBody>
+          <a:bodyPr wrap="square" rtlCol="0">
+            <a:spAutoFit/>
+          </a:bodyPr>
+          <a:lstStyle/>
+          <a:p>
+            <a:pPr algn="ctr"/>
+            <a:r>
+              <a:rPr lang="en-US" sz="1200" b="1" dirty="0">
+                <a:latin typeface="Times New Roman" panose="02020603050405020304" pitchFamily="18" charset="0"/>
+                <a:cs typeface="Times New Roman" panose="02020603050405020304" pitchFamily="18" charset="0"/>
+              </a:rPr>
+              <a:t>converter.R</a:t>
+            </a:r>
+            <a:r>
+              <a:rPr lang="en-US" sz="1200" dirty="0">
+                <a:latin typeface="Times New Roman" panose="02020603050405020304" pitchFamily="18" charset="0"/>
+                <a:cs typeface="Times New Roman" panose="02020603050405020304" pitchFamily="18" charset="0"/>
+              </a:rPr>
+              <a:t>: Standardizes data for downstream processing and generates app configuration files.</a:t>
+            </a:r>
+            <a:endParaRPr lang="en-US" sz="1200" dirty="0">
+              <a:solidFill>
+                <a:srgbClr val="C00000"/>
+              </a:solidFill>
+              <a:latin typeface="Times New Roman" panose="02020603050405020304" pitchFamily="18" charset="0"/>
+              <a:cs typeface="Times New Roman" panose="02020603050405020304" pitchFamily="18" charset="0"/>
+            </a:endParaRPr>
+          </a:p>
+        </p:txBody>
+      </p:sp>
+      <p:sp>
+        <p:nvSpPr>
+          <p:cNvPr id="58" name="TextBox 57">
+            <a:extLst>
+              <a:ext uri="{FF2B5EF4-FFF2-40B4-BE49-F238E27FC236}">
+                <a16:creationId xmlns:a16="http://schemas.microsoft.com/office/drawing/2014/main" id="{202F6C71-5184-44C4-B84B-653193BA4C43}"/>
+              </a:ext>
+            </a:extLst>
+          </p:cNvPr>
+          <p:cNvSpPr txBox="1"/>
+          <p:nvPr/>
+        </p:nvSpPr>
+        <p:spPr>
+          <a:xfrm>
+            <a:off x="5266816" y="668166"/>
+            <a:ext cx="2368538" cy="646331"/>
+          </a:xfrm>
+          <a:prstGeom prst="rect">
+            <a:avLst/>
+          </a:prstGeom>
+          <a:ln/>
+        </p:spPr>
+        <p:style>
+          <a:lnRef idx="2">
+            <a:schemeClr val="accent1"/>
+          </a:lnRef>
+          <a:fillRef idx="1">
+            <a:schemeClr val="lt1"/>
+          </a:fillRef>
+          <a:effectRef idx="0">
+            <a:schemeClr val="accent1"/>
+          </a:effectRef>
+          <a:fontRef idx="minor">
+            <a:schemeClr val="dk1"/>
+          </a:fontRef>
+        </p:style>
+        <p:txBody>
+          <a:bodyPr wrap="square" rtlCol="0">
+            <a:spAutoFit/>
+          </a:bodyPr>
+          <a:lstStyle/>
+          <a:p>
+            <a:pPr algn="ctr"/>
+            <a:r>
+              <a:rPr lang="en-US" sz="1200" b="1" dirty="0">
+                <a:latin typeface="Times New Roman" panose="02020603050405020304" pitchFamily="18" charset="0"/>
+                <a:cs typeface="Times New Roman" panose="02020603050405020304" pitchFamily="18" charset="0"/>
+              </a:rPr>
+              <a:t>find_replace.R</a:t>
+            </a:r>
+            <a:r>
+              <a:rPr lang="en-US" sz="1200" dirty="0">
+                <a:latin typeface="Times New Roman" panose="02020603050405020304" pitchFamily="18" charset="0"/>
+                <a:cs typeface="Times New Roman" panose="02020603050405020304" pitchFamily="18" charset="0"/>
+              </a:rPr>
+              <a:t>: Declares functions for finding / replacing fixed / regex expressions in text.</a:t>
+            </a:r>
+            <a:endParaRPr lang="en-US" sz="1200" dirty="0">
+              <a:solidFill>
+                <a:srgbClr val="C00000"/>
+              </a:solidFill>
+              <a:latin typeface="Times New Roman" panose="02020603050405020304" pitchFamily="18" charset="0"/>
+              <a:cs typeface="Times New Roman" panose="02020603050405020304" pitchFamily="18" charset="0"/>
+            </a:endParaRPr>
+          </a:p>
+        </p:txBody>
+      </p:sp>
+      <p:sp>
+        <p:nvSpPr>
+          <p:cNvPr id="60" name="TextBox 59">
+            <a:extLst>
+              <a:ext uri="{FF2B5EF4-FFF2-40B4-BE49-F238E27FC236}">
+                <a16:creationId xmlns:a16="http://schemas.microsoft.com/office/drawing/2014/main" id="{E4EB0E64-1995-482F-B725-0FF5114DE87B}"/>
+              </a:ext>
+            </a:extLst>
+          </p:cNvPr>
+          <p:cNvSpPr txBox="1"/>
+          <p:nvPr/>
+        </p:nvSpPr>
+        <p:spPr>
+          <a:xfrm>
+            <a:off x="7799637" y="668165"/>
+            <a:ext cx="2363435" cy="646331"/>
+          </a:xfrm>
+          <a:prstGeom prst="rect">
+            <a:avLst/>
+          </a:prstGeom>
+          <a:ln/>
+        </p:spPr>
+        <p:style>
+          <a:lnRef idx="2">
+            <a:schemeClr val="accent1"/>
+          </a:lnRef>
+          <a:fillRef idx="1">
+            <a:schemeClr val="lt1"/>
+          </a:fillRef>
+          <a:effectRef idx="0">
+            <a:schemeClr val="accent1"/>
+          </a:effectRef>
+          <a:fontRef idx="minor">
+            <a:schemeClr val="dk1"/>
+          </a:fontRef>
+        </p:style>
+        <p:txBody>
+          <a:bodyPr wrap="square" rtlCol="0">
+            <a:spAutoFit/>
+          </a:bodyPr>
+          <a:lstStyle/>
+          <a:p>
+            <a:pPr algn="ctr"/>
+            <a:r>
+              <a:rPr lang="en-US" sz="1200" b="1" dirty="0">
+                <a:latin typeface="Times New Roman" panose="02020603050405020304" pitchFamily="18" charset="0"/>
+                <a:cs typeface="Times New Roman" panose="02020603050405020304" pitchFamily="18" charset="0"/>
+              </a:rPr>
+              <a:t>text_work.R</a:t>
+            </a:r>
+            <a:r>
+              <a:rPr lang="en-US" sz="1200" dirty="0">
+                <a:latin typeface="Times New Roman" panose="02020603050405020304" pitchFamily="18" charset="0"/>
+                <a:cs typeface="Times New Roman" panose="02020603050405020304" pitchFamily="18" charset="0"/>
+              </a:rPr>
+              <a:t>: Declares functions for identifying bookmarkable elements, manipulating menu text.</a:t>
+            </a:r>
+            <a:endParaRPr lang="en-US" sz="1200" dirty="0">
+              <a:solidFill>
+                <a:srgbClr val="C00000"/>
+              </a:solidFill>
+              <a:latin typeface="Times New Roman" panose="02020603050405020304" pitchFamily="18" charset="0"/>
+              <a:cs typeface="Times New Roman" panose="02020603050405020304" pitchFamily="18" charset="0"/>
+            </a:endParaRPr>
+          </a:p>
+        </p:txBody>
+      </p:sp>
+      <p:cxnSp>
+        <p:nvCxnSpPr>
+          <p:cNvPr id="61" name="Straight Arrow Connector 60">
+            <a:extLst>
+              <a:ext uri="{FF2B5EF4-FFF2-40B4-BE49-F238E27FC236}">
+                <a16:creationId xmlns:a16="http://schemas.microsoft.com/office/drawing/2014/main" id="{15B1A851-0A37-4A93-82D0-243EA5E58D3B}"/>
+              </a:ext>
+            </a:extLst>
+          </p:cNvPr>
+          <p:cNvCxnSpPr>
+            <a:cxnSpLocks/>
+            <a:stCxn id="58" idx="3"/>
+            <a:endCxn id="60" idx="1"/>
+          </p:cNvCxnSpPr>
+          <p:nvPr/>
+        </p:nvCxnSpPr>
+        <p:spPr>
+          <a:xfrm flipV="1">
+            <a:off x="7635354" y="991331"/>
+            <a:ext cx="164283" cy="1"/>
+          </a:xfrm>
+          <a:prstGeom prst="straightConnector1">
+            <a:avLst/>
+          </a:prstGeom>
+          <a:ln>
+            <a:tailEnd type="triangle"/>
+          </a:ln>
+        </p:spPr>
+        <p:style>
+          <a:lnRef idx="1">
+            <a:schemeClr val="accent1"/>
+          </a:lnRef>
+          <a:fillRef idx="0">
+            <a:schemeClr val="accent1"/>
+          </a:fillRef>
+          <a:effectRef idx="0">
+            <a:schemeClr val="accent1"/>
+          </a:effectRef>
+          <a:fontRef idx="minor">
+            <a:schemeClr val="tx1"/>
+          </a:fontRef>
+        </p:style>
+      </p:cxnSp>
+      <p:cxnSp>
+        <p:nvCxnSpPr>
+          <p:cNvPr id="66" name="Straight Arrow Connector 65">
+            <a:extLst>
+              <a:ext uri="{FF2B5EF4-FFF2-40B4-BE49-F238E27FC236}">
+                <a16:creationId xmlns:a16="http://schemas.microsoft.com/office/drawing/2014/main" id="{5C391A2D-EC4B-4629-8C28-CDADA1EFBDF6}"/>
+              </a:ext>
+            </a:extLst>
+          </p:cNvPr>
+          <p:cNvCxnSpPr>
+            <a:cxnSpLocks/>
+            <a:stCxn id="36" idx="3"/>
+            <a:endCxn id="57" idx="1"/>
+          </p:cNvCxnSpPr>
+          <p:nvPr/>
+        </p:nvCxnSpPr>
+        <p:spPr>
+          <a:xfrm flipV="1">
+            <a:off x="5097404" y="1778796"/>
+            <a:ext cx="174515" cy="1"/>
+          </a:xfrm>
+          <a:prstGeom prst="straightConnector1">
+            <a:avLst/>
+          </a:prstGeom>
+          <a:ln>
+            <a:tailEnd type="triangle"/>
+          </a:ln>
+        </p:spPr>
+        <p:style>
+          <a:lnRef idx="1">
+            <a:schemeClr val="accent1"/>
+          </a:lnRef>
+          <a:fillRef idx="0">
+            <a:schemeClr val="accent1"/>
+          </a:fillRef>
+          <a:effectRef idx="0">
+            <a:schemeClr val="accent1"/>
+          </a:effectRef>
+          <a:fontRef idx="minor">
+            <a:schemeClr val="tx1"/>
+          </a:fontRef>
+        </p:style>
+      </p:cxnSp>
+      <p:cxnSp>
+        <p:nvCxnSpPr>
+          <p:cNvPr id="69" name="Straight Arrow Connector 68">
+            <a:extLst>
+              <a:ext uri="{FF2B5EF4-FFF2-40B4-BE49-F238E27FC236}">
+                <a16:creationId xmlns:a16="http://schemas.microsoft.com/office/drawing/2014/main" id="{574DBF76-4D9E-4EF1-9450-9824C9696607}"/>
+              </a:ext>
+            </a:extLst>
+          </p:cNvPr>
+          <p:cNvCxnSpPr>
+            <a:cxnSpLocks/>
+            <a:stCxn id="58" idx="2"/>
+            <a:endCxn id="57" idx="0"/>
+          </p:cNvCxnSpPr>
+          <p:nvPr/>
+        </p:nvCxnSpPr>
+        <p:spPr>
+          <a:xfrm>
+            <a:off x="6451085" y="1314497"/>
+            <a:ext cx="2552" cy="141133"/>
+          </a:xfrm>
+          <a:prstGeom prst="straightConnector1">
+            <a:avLst/>
+          </a:prstGeom>
+          <a:ln>
+            <a:tailEnd type="triangle"/>
+          </a:ln>
+        </p:spPr>
+        <p:style>
+          <a:lnRef idx="1">
+            <a:schemeClr val="accent1"/>
+          </a:lnRef>
+          <a:fillRef idx="0">
+            <a:schemeClr val="accent1"/>
+          </a:fillRef>
+          <a:effectRef idx="0">
+            <a:schemeClr val="accent1"/>
+          </a:effectRef>
+          <a:fontRef idx="minor">
+            <a:schemeClr val="tx1"/>
+          </a:fontRef>
+        </p:style>
+      </p:cxnSp>
+      <p:sp>
+        <p:nvSpPr>
+          <p:cNvPr id="72" name="TextBox 71">
+            <a:extLst>
+              <a:ext uri="{FF2B5EF4-FFF2-40B4-BE49-F238E27FC236}">
+                <a16:creationId xmlns:a16="http://schemas.microsoft.com/office/drawing/2014/main" id="{0DDBF855-611B-496D-8242-E7680463917E}"/>
+              </a:ext>
+            </a:extLst>
+          </p:cNvPr>
+          <p:cNvSpPr txBox="1"/>
+          <p:nvPr/>
+        </p:nvSpPr>
+        <p:spPr>
+          <a:xfrm>
+            <a:off x="5259938" y="4408533"/>
+            <a:ext cx="2363435" cy="646331"/>
+          </a:xfrm>
+          <a:prstGeom prst="rect">
+            <a:avLst/>
+          </a:prstGeom>
+          <a:solidFill>
+            <a:schemeClr val="bg1"/>
+          </a:solidFill>
+          <a:ln/>
+        </p:spPr>
+        <p:style>
+          <a:lnRef idx="2">
+            <a:schemeClr val="accent1"/>
+          </a:lnRef>
+          <a:fillRef idx="1">
+            <a:schemeClr val="lt1"/>
+          </a:fillRef>
+          <a:effectRef idx="0">
+            <a:schemeClr val="accent1"/>
+          </a:effectRef>
+          <a:fontRef idx="minor">
+            <a:schemeClr val="dk1"/>
+          </a:fontRef>
+        </p:style>
+        <p:txBody>
+          <a:bodyPr wrap="square" rtlCol="0">
+            <a:spAutoFit/>
+          </a:bodyPr>
+          <a:lstStyle/>
+          <a:p>
+            <a:pPr algn="ctr"/>
+            <a:r>
+              <a:rPr lang="en-US" sz="1200" b="1" dirty="0">
+                <a:solidFill>
+                  <a:schemeClr val="tx1"/>
+                </a:solidFill>
+                <a:latin typeface="Times New Roman" panose="02020603050405020304" pitchFamily="18" charset="0"/>
+                <a:cs typeface="Times New Roman" panose="02020603050405020304" pitchFamily="18" charset="0"/>
+              </a:rPr>
+              <a:t>red_methods.R</a:t>
+            </a:r>
+            <a:r>
+              <a:rPr lang="en-US" sz="1200" dirty="0">
+                <a:solidFill>
+                  <a:schemeClr val="tx1"/>
+                </a:solidFill>
+                <a:latin typeface="Times New Roman" panose="02020603050405020304" pitchFamily="18" charset="0"/>
+                <a:cs typeface="Times New Roman" panose="02020603050405020304" pitchFamily="18" charset="0"/>
+              </a:rPr>
+              <a:t>: Implements PCA, VAE, UMAP, PHATE, Sets, and tSNE as reduction methods.</a:t>
+            </a:r>
+          </a:p>
+        </p:txBody>
+      </p:sp>
+      <p:cxnSp>
+        <p:nvCxnSpPr>
+          <p:cNvPr id="73" name="Straight Arrow Connector 72">
+            <a:extLst>
+              <a:ext uri="{FF2B5EF4-FFF2-40B4-BE49-F238E27FC236}">
+                <a16:creationId xmlns:a16="http://schemas.microsoft.com/office/drawing/2014/main" id="{A1587B77-7F6D-4C31-8D06-F59F41E61A98}"/>
+              </a:ext>
+            </a:extLst>
+          </p:cNvPr>
+          <p:cNvCxnSpPr>
+            <a:cxnSpLocks/>
+            <a:stCxn id="50" idx="2"/>
+            <a:endCxn id="75" idx="0"/>
+          </p:cNvCxnSpPr>
+          <p:nvPr/>
+        </p:nvCxnSpPr>
+        <p:spPr>
+          <a:xfrm flipH="1">
+            <a:off x="3907449" y="4130342"/>
+            <a:ext cx="2735" cy="192719"/>
+          </a:xfrm>
+          <a:prstGeom prst="straightConnector1">
+            <a:avLst/>
+          </a:prstGeom>
+          <a:ln>
+            <a:tailEnd type="triangle"/>
+          </a:ln>
+        </p:spPr>
+        <p:style>
+          <a:lnRef idx="1">
+            <a:schemeClr val="accent1"/>
+          </a:lnRef>
+          <a:fillRef idx="0">
+            <a:schemeClr val="accent1"/>
+          </a:fillRef>
+          <a:effectRef idx="0">
+            <a:schemeClr val="accent1"/>
+          </a:effectRef>
+          <a:fontRef idx="minor">
+            <a:schemeClr val="tx1"/>
+          </a:fontRef>
+        </p:style>
+      </p:cxnSp>
+      <p:sp>
+        <p:nvSpPr>
+          <p:cNvPr id="75" name="TextBox 74">
+            <a:extLst>
+              <a:ext uri="{FF2B5EF4-FFF2-40B4-BE49-F238E27FC236}">
+                <a16:creationId xmlns:a16="http://schemas.microsoft.com/office/drawing/2014/main" id="{9442B296-0C54-4F5A-894E-60788236002A}"/>
+              </a:ext>
+            </a:extLst>
+          </p:cNvPr>
+          <p:cNvSpPr txBox="1"/>
+          <p:nvPr/>
+        </p:nvSpPr>
+        <p:spPr>
+          <a:xfrm>
+            <a:off x="2725731" y="4323061"/>
+            <a:ext cx="2363435" cy="830997"/>
+          </a:xfrm>
+          <a:prstGeom prst="rect">
+            <a:avLst/>
+          </a:prstGeom>
+          <a:solidFill>
+            <a:schemeClr val="bg1"/>
+          </a:solidFill>
+          <a:ln/>
+        </p:spPr>
+        <p:style>
+          <a:lnRef idx="2">
+            <a:schemeClr val="accent1"/>
+          </a:lnRef>
+          <a:fillRef idx="1">
+            <a:schemeClr val="lt1"/>
+          </a:fillRef>
+          <a:effectRef idx="0">
+            <a:schemeClr val="accent1"/>
+          </a:effectRef>
+          <a:fontRef idx="minor">
+            <a:schemeClr val="dk1"/>
+          </a:fontRef>
+        </p:style>
+        <p:txBody>
+          <a:bodyPr wrap="square" rtlCol="0">
+            <a:spAutoFit/>
+          </a:bodyPr>
+          <a:lstStyle/>
+          <a:p>
+            <a:pPr algn="ctr"/>
+            <a:r>
+              <a:rPr lang="en-US" sz="1200" b="1" dirty="0">
+                <a:solidFill>
+                  <a:schemeClr val="tx1"/>
+                </a:solidFill>
+                <a:latin typeface="Times New Roman" panose="02020603050405020304" pitchFamily="18" charset="0"/>
+                <a:cs typeface="Times New Roman" panose="02020603050405020304" pitchFamily="18" charset="0"/>
+              </a:rPr>
+              <a:t>red_requests.R</a:t>
+            </a:r>
+            <a:r>
+              <a:rPr lang="en-US" sz="1200" dirty="0">
+                <a:solidFill>
+                  <a:schemeClr val="tx1"/>
+                </a:solidFill>
+                <a:latin typeface="Times New Roman" panose="02020603050405020304" pitchFamily="18" charset="0"/>
+                <a:cs typeface="Times New Roman" panose="02020603050405020304" pitchFamily="18" charset="0"/>
+              </a:rPr>
+              <a:t>: Declares efficient functions for creating, validating, performing, combining, and storing valid reduction requests.</a:t>
+            </a:r>
+          </a:p>
+        </p:txBody>
+      </p:sp>
+      <p:cxnSp>
+        <p:nvCxnSpPr>
+          <p:cNvPr id="86" name="Straight Arrow Connector 85">
+            <a:extLst>
+              <a:ext uri="{FF2B5EF4-FFF2-40B4-BE49-F238E27FC236}">
+                <a16:creationId xmlns:a16="http://schemas.microsoft.com/office/drawing/2014/main" id="{20B010BD-418B-45F6-90E1-D70589449D1F}"/>
+              </a:ext>
+            </a:extLst>
+          </p:cNvPr>
+          <p:cNvCxnSpPr>
+            <a:cxnSpLocks/>
+            <a:stCxn id="72" idx="1"/>
+            <a:endCxn id="75" idx="3"/>
+          </p:cNvCxnSpPr>
+          <p:nvPr/>
+        </p:nvCxnSpPr>
+        <p:spPr>
+          <a:xfrm flipH="1">
+            <a:off x="5089166" y="4731699"/>
+            <a:ext cx="170772" cy="6861"/>
+          </a:xfrm>
+          <a:prstGeom prst="straightConnector1">
+            <a:avLst/>
+          </a:prstGeom>
+          <a:ln>
+            <a:tailEnd type="triangle"/>
+          </a:ln>
+        </p:spPr>
+        <p:style>
+          <a:lnRef idx="1">
+            <a:schemeClr val="accent1"/>
+          </a:lnRef>
+          <a:fillRef idx="0">
+            <a:schemeClr val="accent1"/>
+          </a:fillRef>
+          <a:effectRef idx="0">
+            <a:schemeClr val="accent1"/>
+          </a:effectRef>
+          <a:fontRef idx="minor">
+            <a:schemeClr val="tx1"/>
+          </a:fontRef>
+        </p:style>
+      </p:cxnSp>
+      <p:sp>
+        <p:nvSpPr>
+          <p:cNvPr id="89" name="TextBox 88">
+            <a:extLst>
+              <a:ext uri="{FF2B5EF4-FFF2-40B4-BE49-F238E27FC236}">
+                <a16:creationId xmlns:a16="http://schemas.microsoft.com/office/drawing/2014/main" id="{C725F408-E273-454E-B8F7-65747149875B}"/>
+              </a:ext>
+            </a:extLst>
+          </p:cNvPr>
+          <p:cNvSpPr txBox="1"/>
+          <p:nvPr/>
+        </p:nvSpPr>
+        <p:spPr>
+          <a:xfrm>
+            <a:off x="7799637" y="3484011"/>
+            <a:ext cx="2363434" cy="646331"/>
+          </a:xfrm>
+          <a:prstGeom prst="rect">
+            <a:avLst/>
+          </a:prstGeom>
+          <a:solidFill>
+            <a:schemeClr val="bg1"/>
+          </a:solidFill>
+          <a:ln/>
+        </p:spPr>
+        <p:style>
+          <a:lnRef idx="2">
+            <a:schemeClr val="accent1"/>
+          </a:lnRef>
+          <a:fillRef idx="1">
+            <a:schemeClr val="lt1"/>
+          </a:fillRef>
+          <a:effectRef idx="0">
+            <a:schemeClr val="accent1"/>
+          </a:effectRef>
+          <a:fontRef idx="minor">
+            <a:schemeClr val="dk1"/>
+          </a:fontRef>
+        </p:style>
+        <p:txBody>
+          <a:bodyPr wrap="square" rtlCol="0">
+            <a:spAutoFit/>
+          </a:bodyPr>
+          <a:lstStyle/>
+          <a:p>
+            <a:pPr algn="ctr"/>
+            <a:r>
+              <a:rPr lang="en-US" sz="1200" b="1" dirty="0">
+                <a:solidFill>
+                  <a:schemeClr val="tx1"/>
+                </a:solidFill>
+                <a:latin typeface="Times New Roman" panose="02020603050405020304" pitchFamily="18" charset="0"/>
+                <a:cs typeface="Times New Roman" panose="02020603050405020304" pitchFamily="18" charset="0"/>
+              </a:rPr>
+              <a:t>options.R</a:t>
+            </a:r>
+            <a:r>
+              <a:rPr lang="en-US" sz="1200" dirty="0">
+                <a:solidFill>
+                  <a:schemeClr val="tx1"/>
+                </a:solidFill>
+                <a:latin typeface="Times New Roman" panose="02020603050405020304" pitchFamily="18" charset="0"/>
+                <a:cs typeface="Times New Roman" panose="02020603050405020304" pitchFamily="18" charset="0"/>
+              </a:rPr>
+              <a:t>: Tests storage systems, generates menus, and assembles user interfaces for the application. </a:t>
+            </a:r>
+          </a:p>
+        </p:txBody>
+      </p:sp>
+      <p:sp>
+        <p:nvSpPr>
+          <p:cNvPr id="90" name="TextBox 89">
+            <a:extLst>
+              <a:ext uri="{FF2B5EF4-FFF2-40B4-BE49-F238E27FC236}">
+                <a16:creationId xmlns:a16="http://schemas.microsoft.com/office/drawing/2014/main" id="{9DA55329-65F0-4F3A-B710-F4D59D756E1A}"/>
+              </a:ext>
+            </a:extLst>
+          </p:cNvPr>
+          <p:cNvSpPr txBox="1"/>
+          <p:nvPr/>
+        </p:nvSpPr>
+        <p:spPr>
+          <a:xfrm>
+            <a:off x="7804483" y="2076087"/>
+            <a:ext cx="2363434" cy="646331"/>
+          </a:xfrm>
+          <a:prstGeom prst="rect">
+            <a:avLst/>
+          </a:prstGeom>
+          <a:solidFill>
+            <a:schemeClr val="bg1"/>
+          </a:solidFill>
+          <a:ln/>
+        </p:spPr>
+        <p:style>
+          <a:lnRef idx="2">
+            <a:schemeClr val="accent1"/>
+          </a:lnRef>
+          <a:fillRef idx="1">
+            <a:schemeClr val="lt1"/>
+          </a:fillRef>
+          <a:effectRef idx="0">
+            <a:schemeClr val="accent1"/>
+          </a:effectRef>
+          <a:fontRef idx="minor">
+            <a:schemeClr val="dk1"/>
+          </a:fontRef>
+        </p:style>
+        <p:txBody>
+          <a:bodyPr wrap="square" rtlCol="0">
+            <a:spAutoFit/>
+          </a:bodyPr>
+          <a:lstStyle/>
+          <a:p>
+            <a:pPr algn="ctr"/>
+            <a:r>
+              <a:rPr lang="en-US" sz="1200" b="1" dirty="0">
+                <a:solidFill>
+                  <a:schemeClr val="tx1"/>
+                </a:solidFill>
+                <a:latin typeface="Times New Roman" panose="02020603050405020304" pitchFamily="18" charset="0"/>
+                <a:cs typeface="Times New Roman" panose="02020603050405020304" pitchFamily="18" charset="0"/>
+              </a:rPr>
+              <a:t>ui_functions.R</a:t>
+            </a:r>
+            <a:r>
+              <a:rPr lang="en-US" sz="1200" dirty="0">
+                <a:solidFill>
+                  <a:schemeClr val="tx1"/>
+                </a:solidFill>
+                <a:latin typeface="Times New Roman" panose="02020603050405020304" pitchFamily="18" charset="0"/>
+                <a:cs typeface="Times New Roman" panose="02020603050405020304" pitchFamily="18" charset="0"/>
+              </a:rPr>
+              <a:t>: Declares functions that generate interactive HTML widgets for Shiny applications.</a:t>
+            </a:r>
+          </a:p>
+        </p:txBody>
+      </p:sp>
+      <p:sp>
+        <p:nvSpPr>
+          <p:cNvPr id="91" name="TextBox 90">
+            <a:extLst>
+              <a:ext uri="{FF2B5EF4-FFF2-40B4-BE49-F238E27FC236}">
+                <a16:creationId xmlns:a16="http://schemas.microsoft.com/office/drawing/2014/main" id="{F6F9E16A-6C86-470D-9A79-6EDD3DF8873C}"/>
+              </a:ext>
+            </a:extLst>
+          </p:cNvPr>
+          <p:cNvSpPr txBox="1"/>
+          <p:nvPr/>
+        </p:nvSpPr>
+        <p:spPr>
+          <a:xfrm>
+            <a:off x="7794130" y="5579278"/>
+            <a:ext cx="2363426" cy="646331"/>
+          </a:xfrm>
+          <a:prstGeom prst="rect">
+            <a:avLst/>
+          </a:prstGeom>
+          <a:solidFill>
+            <a:srgbClr val="FFC5C5"/>
+          </a:solidFill>
+          <a:ln/>
+        </p:spPr>
+        <p:style>
+          <a:lnRef idx="2">
+            <a:schemeClr val="accent1"/>
+          </a:lnRef>
+          <a:fillRef idx="1">
+            <a:schemeClr val="lt1"/>
+          </a:fillRef>
+          <a:effectRef idx="0">
+            <a:schemeClr val="accent1"/>
+          </a:effectRef>
+          <a:fontRef idx="minor">
+            <a:schemeClr val="dk1"/>
+          </a:fontRef>
+        </p:style>
+        <p:txBody>
+          <a:bodyPr wrap="square" rtlCol="0">
+            <a:spAutoFit/>
+          </a:bodyPr>
+          <a:lstStyle/>
+          <a:p>
+            <a:pPr algn="ctr"/>
+            <a:r>
+              <a:rPr lang="en-US" sz="1200" b="1" dirty="0">
+                <a:solidFill>
+                  <a:schemeClr val="tx1"/>
+                </a:solidFill>
+                <a:latin typeface="Times New Roman" panose="02020603050405020304" pitchFamily="18" charset="0"/>
+                <a:cs typeface="Times New Roman" panose="02020603050405020304" pitchFamily="18" charset="0"/>
+              </a:rPr>
+              <a:t>app.R</a:t>
+            </a:r>
+            <a:r>
+              <a:rPr lang="en-US" sz="1200" dirty="0">
+                <a:solidFill>
+                  <a:schemeClr val="tx1"/>
+                </a:solidFill>
+                <a:latin typeface="Times New Roman" panose="02020603050405020304" pitchFamily="18" charset="0"/>
+                <a:cs typeface="Times New Roman" panose="02020603050405020304" pitchFamily="18" charset="0"/>
+              </a:rPr>
+              <a:t>: Makes an interactive Shiny application capable of visualizing dimensionally reduced data.</a:t>
+            </a:r>
+          </a:p>
+        </p:txBody>
+      </p:sp>
+      <p:cxnSp>
+        <p:nvCxnSpPr>
+          <p:cNvPr id="92" name="Straight Arrow Connector 91">
+            <a:extLst>
+              <a:ext uri="{FF2B5EF4-FFF2-40B4-BE49-F238E27FC236}">
+                <a16:creationId xmlns:a16="http://schemas.microsoft.com/office/drawing/2014/main" id="{842D5465-4D26-49C8-8AF8-FF3282C2C34B}"/>
+              </a:ext>
+            </a:extLst>
+          </p:cNvPr>
+          <p:cNvCxnSpPr>
+            <a:cxnSpLocks/>
+            <a:stCxn id="37" idx="3"/>
+            <a:endCxn id="91" idx="1"/>
+          </p:cNvCxnSpPr>
+          <p:nvPr/>
+        </p:nvCxnSpPr>
+        <p:spPr>
+          <a:xfrm flipV="1">
+            <a:off x="7623359" y="5902444"/>
+            <a:ext cx="170771" cy="2830"/>
+          </a:xfrm>
+          <a:prstGeom prst="straightConnector1">
+            <a:avLst/>
+          </a:prstGeom>
+          <a:ln>
+            <a:tailEnd type="triangle"/>
+          </a:ln>
+        </p:spPr>
+        <p:style>
+          <a:lnRef idx="1">
+            <a:schemeClr val="accent1"/>
+          </a:lnRef>
+          <a:fillRef idx="0">
+            <a:schemeClr val="accent1"/>
+          </a:fillRef>
+          <a:effectRef idx="0">
+            <a:schemeClr val="accent1"/>
+          </a:effectRef>
+          <a:fontRef idx="minor">
+            <a:schemeClr val="tx1"/>
+          </a:fontRef>
+        </p:style>
+      </p:cxnSp>
+      <p:sp>
+        <p:nvSpPr>
+          <p:cNvPr id="99" name="TextBox 98">
+            <a:extLst>
+              <a:ext uri="{FF2B5EF4-FFF2-40B4-BE49-F238E27FC236}">
+                <a16:creationId xmlns:a16="http://schemas.microsoft.com/office/drawing/2014/main" id="{EF381171-67B5-4BFC-AD3E-8631338DF517}"/>
+              </a:ext>
+            </a:extLst>
+          </p:cNvPr>
+          <p:cNvSpPr txBox="1"/>
+          <p:nvPr/>
+        </p:nvSpPr>
+        <p:spPr>
+          <a:xfrm>
+            <a:off x="2725732" y="5339038"/>
+            <a:ext cx="2363435" cy="646331"/>
+          </a:xfrm>
+          <a:prstGeom prst="rect">
+            <a:avLst/>
+          </a:prstGeom>
+          <a:solidFill>
+            <a:schemeClr val="accent5">
+              <a:lumMod val="20000"/>
+              <a:lumOff val="80000"/>
+            </a:schemeClr>
+          </a:solidFill>
+          <a:ln/>
+        </p:spPr>
+        <p:style>
+          <a:lnRef idx="2">
+            <a:schemeClr val="accent1"/>
+          </a:lnRef>
+          <a:fillRef idx="1">
+            <a:schemeClr val="lt1"/>
+          </a:fillRef>
+          <a:effectRef idx="0">
+            <a:schemeClr val="accent1"/>
+          </a:effectRef>
+          <a:fontRef idx="minor">
+            <a:schemeClr val="dk1"/>
+          </a:fontRef>
+        </p:style>
+        <p:txBody>
+          <a:bodyPr wrap="square" rtlCol="0">
+            <a:spAutoFit/>
+          </a:bodyPr>
+          <a:lstStyle/>
+          <a:p>
+            <a:pPr algn="ctr"/>
+            <a:r>
+              <a:rPr lang="en-US" sz="1200" b="1" dirty="0">
+                <a:solidFill>
+                  <a:schemeClr val="tx1"/>
+                </a:solidFill>
+                <a:latin typeface="Times New Roman" panose="02020603050405020304" pitchFamily="18" charset="0"/>
+                <a:cs typeface="Times New Roman" panose="02020603050405020304" pitchFamily="18" charset="0"/>
+              </a:rPr>
+              <a:t>packaging.R</a:t>
+            </a:r>
+            <a:r>
+              <a:rPr lang="en-US" sz="1200" dirty="0">
+                <a:solidFill>
+                  <a:schemeClr val="tx1"/>
+                </a:solidFill>
+                <a:latin typeface="Times New Roman" panose="02020603050405020304" pitchFamily="18" charset="0"/>
+                <a:cs typeface="Times New Roman" panose="02020603050405020304" pitchFamily="18" charset="0"/>
+              </a:rPr>
+              <a:t>: Assembles a broad set of reduction requests, executes them, and syncs data to AWS.</a:t>
+            </a:r>
+          </a:p>
+        </p:txBody>
+      </p:sp>
+      <p:cxnSp>
+        <p:nvCxnSpPr>
+          <p:cNvPr id="102" name="Straight Arrow Connector 101">
+            <a:extLst>
+              <a:ext uri="{FF2B5EF4-FFF2-40B4-BE49-F238E27FC236}">
+                <a16:creationId xmlns:a16="http://schemas.microsoft.com/office/drawing/2014/main" id="{53584A7D-CA14-42E2-A9AC-F88242C1902B}"/>
+              </a:ext>
+            </a:extLst>
+          </p:cNvPr>
+          <p:cNvCxnSpPr>
+            <a:cxnSpLocks/>
+            <a:stCxn id="75" idx="2"/>
+            <a:endCxn id="99" idx="0"/>
+          </p:cNvCxnSpPr>
+          <p:nvPr/>
+        </p:nvCxnSpPr>
+        <p:spPr>
+          <a:xfrm>
+            <a:off x="3907449" y="5154058"/>
+            <a:ext cx="1" cy="184980"/>
+          </a:xfrm>
+          <a:prstGeom prst="straightConnector1">
+            <a:avLst/>
+          </a:prstGeom>
+          <a:ln>
+            <a:tailEnd type="triangle"/>
+          </a:ln>
+        </p:spPr>
+        <p:style>
+          <a:lnRef idx="1">
+            <a:schemeClr val="accent1"/>
+          </a:lnRef>
+          <a:fillRef idx="0">
+            <a:schemeClr val="accent1"/>
+          </a:fillRef>
+          <a:effectRef idx="0">
+            <a:schemeClr val="accent1"/>
+          </a:effectRef>
+          <a:fontRef idx="minor">
+            <a:schemeClr val="tx1"/>
+          </a:fontRef>
+        </p:style>
+      </p:cxnSp>
+      <p:cxnSp>
+        <p:nvCxnSpPr>
+          <p:cNvPr id="145" name="Straight Arrow Connector 144">
+            <a:extLst>
+              <a:ext uri="{FF2B5EF4-FFF2-40B4-BE49-F238E27FC236}">
+                <a16:creationId xmlns:a16="http://schemas.microsoft.com/office/drawing/2014/main" id="{23FA99E0-EBBC-4C8D-8061-31BFC97FEA14}"/>
+              </a:ext>
+            </a:extLst>
+          </p:cNvPr>
+          <p:cNvCxnSpPr>
+            <a:cxnSpLocks/>
+            <a:stCxn id="89" idx="2"/>
+            <a:endCxn id="91" idx="0"/>
+          </p:cNvCxnSpPr>
+          <p:nvPr/>
+        </p:nvCxnSpPr>
+        <p:spPr>
+          <a:xfrm flipH="1">
+            <a:off x="8975843" y="4130342"/>
+            <a:ext cx="5511" cy="1448936"/>
+          </a:xfrm>
+          <a:prstGeom prst="straightConnector1">
+            <a:avLst/>
+          </a:prstGeom>
+          <a:ln>
+            <a:tailEnd type="triangle"/>
+          </a:ln>
+        </p:spPr>
+        <p:style>
+          <a:lnRef idx="1">
+            <a:schemeClr val="accent1"/>
+          </a:lnRef>
+          <a:fillRef idx="0">
+            <a:schemeClr val="accent1"/>
+          </a:fillRef>
+          <a:effectRef idx="0">
+            <a:schemeClr val="accent1"/>
+          </a:effectRef>
+          <a:fontRef idx="minor">
+            <a:schemeClr val="tx1"/>
+          </a:fontRef>
+        </p:style>
+      </p:cxnSp>
+      <p:cxnSp>
+        <p:nvCxnSpPr>
+          <p:cNvPr id="151" name="Straight Arrow Connector 150">
+            <a:extLst>
+              <a:ext uri="{FF2B5EF4-FFF2-40B4-BE49-F238E27FC236}">
+                <a16:creationId xmlns:a16="http://schemas.microsoft.com/office/drawing/2014/main" id="{A94AF1FF-D4B7-421F-A229-9769D55E7ED4}"/>
+              </a:ext>
+            </a:extLst>
+          </p:cNvPr>
+          <p:cNvCxnSpPr>
+            <a:cxnSpLocks/>
+            <a:stCxn id="60" idx="2"/>
+            <a:endCxn id="90" idx="0"/>
+          </p:cNvCxnSpPr>
+          <p:nvPr/>
+        </p:nvCxnSpPr>
+        <p:spPr>
+          <a:xfrm>
+            <a:off x="8981355" y="1314496"/>
+            <a:ext cx="4845" cy="761591"/>
+          </a:xfrm>
+          <a:prstGeom prst="straightConnector1">
+            <a:avLst/>
+          </a:prstGeom>
+          <a:ln>
+            <a:tailEnd type="triangle"/>
+          </a:ln>
+        </p:spPr>
+        <p:style>
+          <a:lnRef idx="1">
+            <a:schemeClr val="accent1"/>
+          </a:lnRef>
+          <a:fillRef idx="0">
+            <a:schemeClr val="accent1"/>
+          </a:fillRef>
+          <a:effectRef idx="0">
+            <a:schemeClr val="accent1"/>
+          </a:effectRef>
+          <a:fontRef idx="minor">
+            <a:schemeClr val="tx1"/>
+          </a:fontRef>
+        </p:style>
+      </p:cxnSp>
+      <p:cxnSp>
+        <p:nvCxnSpPr>
+          <p:cNvPr id="182" name="Straight Arrow Connector 181">
+            <a:extLst>
+              <a:ext uri="{FF2B5EF4-FFF2-40B4-BE49-F238E27FC236}">
+                <a16:creationId xmlns:a16="http://schemas.microsoft.com/office/drawing/2014/main" id="{36E4DBB6-A5C2-4276-84AE-90E303EBFC8E}"/>
+              </a:ext>
+            </a:extLst>
+          </p:cNvPr>
+          <p:cNvCxnSpPr>
+            <a:cxnSpLocks/>
+            <a:stCxn id="90" idx="2"/>
+            <a:endCxn id="89" idx="0"/>
+          </p:cNvCxnSpPr>
+          <p:nvPr/>
+        </p:nvCxnSpPr>
+        <p:spPr>
+          <a:xfrm flipH="1">
+            <a:off x="8981354" y="2722418"/>
+            <a:ext cx="4846" cy="761593"/>
+          </a:xfrm>
+          <a:prstGeom prst="straightConnector1">
+            <a:avLst/>
+          </a:prstGeom>
+          <a:ln>
+            <a:tailEnd type="triangle"/>
+          </a:ln>
+        </p:spPr>
+        <p:style>
+          <a:lnRef idx="1">
+            <a:schemeClr val="accent1"/>
+          </a:lnRef>
+          <a:fillRef idx="0">
+            <a:schemeClr val="accent1"/>
+          </a:fillRef>
+          <a:effectRef idx="0">
+            <a:schemeClr val="accent1"/>
+          </a:effectRef>
+          <a:fontRef idx="minor">
+            <a:schemeClr val="tx1"/>
+          </a:fontRef>
+        </p:style>
+      </p:cxnSp>
+      <p:sp>
+        <p:nvSpPr>
+          <p:cNvPr id="242" name="TextBox 241">
+            <a:extLst>
+              <a:ext uri="{FF2B5EF4-FFF2-40B4-BE49-F238E27FC236}">
+                <a16:creationId xmlns:a16="http://schemas.microsoft.com/office/drawing/2014/main" id="{9B6B1A3E-3E66-40CA-9245-ECC9004C6D3B}"/>
+              </a:ext>
+            </a:extLst>
+          </p:cNvPr>
+          <p:cNvSpPr txBox="1"/>
+          <p:nvPr/>
+        </p:nvSpPr>
+        <p:spPr>
+          <a:xfrm>
+            <a:off x="5266800" y="2241652"/>
+            <a:ext cx="2363167" cy="1200329"/>
+          </a:xfrm>
+          <a:prstGeom prst="rect">
+            <a:avLst/>
+          </a:prstGeom>
+          <a:solidFill>
+            <a:schemeClr val="bg1"/>
+          </a:solidFill>
+          <a:ln/>
+        </p:spPr>
+        <p:style>
+          <a:lnRef idx="2">
+            <a:schemeClr val="accent1"/>
+          </a:lnRef>
+          <a:fillRef idx="1">
+            <a:schemeClr val="lt1"/>
+          </a:fillRef>
+          <a:effectRef idx="0">
+            <a:schemeClr val="accent1"/>
+          </a:effectRef>
+          <a:fontRef idx="minor">
+            <a:schemeClr val="dk1"/>
+          </a:fontRef>
+        </p:style>
+        <p:txBody>
+          <a:bodyPr wrap="square" rtlCol="0">
+            <a:spAutoFit/>
+          </a:bodyPr>
+          <a:lstStyle/>
+          <a:p>
+            <a:pPr algn="ctr"/>
+            <a:r>
+              <a:rPr lang="en-US" sz="1200" b="1" dirty="0">
+                <a:latin typeface="Times New Roman" panose="02020603050405020304" pitchFamily="18" charset="0"/>
+                <a:cs typeface="Times New Roman" panose="02020603050405020304" pitchFamily="18" charset="0"/>
+              </a:rPr>
+              <a:t>read_write.R</a:t>
+            </a:r>
+            <a:r>
+              <a:rPr lang="en-US" sz="1200" dirty="0">
+                <a:latin typeface="Times New Roman" panose="02020603050405020304" pitchFamily="18" charset="0"/>
+                <a:cs typeface="Times New Roman" panose="02020603050405020304" pitchFamily="18" charset="0"/>
+              </a:rPr>
+              <a:t>: Declares functions for listing / reading / writing files on operating systems / AWS.</a:t>
+            </a:r>
+          </a:p>
+          <a:p>
+            <a:pPr algn="ctr"/>
+            <a:endParaRPr lang="en-US" sz="1200" dirty="0">
+              <a:latin typeface="Times New Roman" panose="02020603050405020304" pitchFamily="18" charset="0"/>
+              <a:cs typeface="Times New Roman" panose="02020603050405020304" pitchFamily="18" charset="0"/>
+            </a:endParaRPr>
+          </a:p>
+          <a:p>
+            <a:pPr algn="ctr"/>
+            <a:r>
+              <a:rPr lang="en-US" sz="1200" b="1" dirty="0">
+                <a:latin typeface="Times New Roman" panose="02020603050405020304" pitchFamily="18" charset="0"/>
+                <a:cs typeface="Times New Roman" panose="02020603050405020304" pitchFamily="18" charset="0"/>
+              </a:rPr>
+              <a:t>parameters.R</a:t>
+            </a:r>
+            <a:r>
+              <a:rPr lang="en-US" sz="1200" dirty="0">
+                <a:latin typeface="Times New Roman" panose="02020603050405020304" pitchFamily="18" charset="0"/>
+                <a:cs typeface="Times New Roman" panose="02020603050405020304" pitchFamily="18" charset="0"/>
+              </a:rPr>
+              <a:t>: Specifies names and roles for reduction parameters</a:t>
+            </a:r>
+            <a:r>
+              <a:rPr lang="en-US" sz="1200" dirty="0">
+                <a:solidFill>
+                  <a:schemeClr val="tx1"/>
+                </a:solidFill>
+                <a:latin typeface="Times New Roman" panose="02020603050405020304" pitchFamily="18" charset="0"/>
+                <a:cs typeface="Times New Roman" panose="02020603050405020304" pitchFamily="18" charset="0"/>
+              </a:rPr>
+              <a:t>.</a:t>
+            </a:r>
+            <a:endParaRPr lang="en-US" sz="1200" dirty="0">
+              <a:latin typeface="Times New Roman" panose="02020603050405020304" pitchFamily="18" charset="0"/>
+              <a:cs typeface="Times New Roman" panose="02020603050405020304" pitchFamily="18" charset="0"/>
+            </a:endParaRPr>
+          </a:p>
+        </p:txBody>
+      </p:sp>
+      <p:cxnSp>
+        <p:nvCxnSpPr>
+          <p:cNvPr id="253" name="Straight Arrow Connector 252">
+            <a:extLst>
+              <a:ext uri="{FF2B5EF4-FFF2-40B4-BE49-F238E27FC236}">
+                <a16:creationId xmlns:a16="http://schemas.microsoft.com/office/drawing/2014/main" id="{2E7B6505-B033-4B5F-9E74-CD836A84169F}"/>
+              </a:ext>
+            </a:extLst>
+          </p:cNvPr>
+          <p:cNvCxnSpPr>
+            <a:cxnSpLocks/>
+            <a:stCxn id="242" idx="2"/>
+            <a:endCxn id="44" idx="0"/>
+          </p:cNvCxnSpPr>
+          <p:nvPr/>
+        </p:nvCxnSpPr>
+        <p:spPr>
+          <a:xfrm>
+            <a:off x="6448384" y="3441981"/>
+            <a:ext cx="135" cy="139691"/>
+          </a:xfrm>
+          <a:prstGeom prst="straightConnector1">
+            <a:avLst/>
+          </a:prstGeom>
+          <a:ln>
+            <a:tailEnd type="triangle"/>
+          </a:ln>
+        </p:spPr>
+        <p:style>
+          <a:lnRef idx="1">
+            <a:schemeClr val="accent1"/>
+          </a:lnRef>
+          <a:fillRef idx="0">
+            <a:schemeClr val="accent1"/>
+          </a:fillRef>
+          <a:effectRef idx="0">
+            <a:schemeClr val="accent1"/>
+          </a:effectRef>
+          <a:fontRef idx="minor">
+            <a:schemeClr val="tx1"/>
+          </a:fontRef>
+        </p:style>
+      </p:cxnSp>
+      <p:cxnSp>
+        <p:nvCxnSpPr>
+          <p:cNvPr id="269" name="Straight Arrow Connector 268">
+            <a:extLst>
+              <a:ext uri="{FF2B5EF4-FFF2-40B4-BE49-F238E27FC236}">
+                <a16:creationId xmlns:a16="http://schemas.microsoft.com/office/drawing/2014/main" id="{EDDD2A27-C497-4272-AC5A-EDE1AF86D86E}"/>
+              </a:ext>
+            </a:extLst>
+          </p:cNvPr>
+          <p:cNvCxnSpPr>
+            <a:cxnSpLocks/>
+            <a:stCxn id="44" idx="3"/>
+            <a:endCxn id="89" idx="1"/>
+          </p:cNvCxnSpPr>
+          <p:nvPr/>
+        </p:nvCxnSpPr>
+        <p:spPr>
+          <a:xfrm flipV="1">
+            <a:off x="7630237" y="3807177"/>
+            <a:ext cx="169400" cy="5328"/>
+          </a:xfrm>
+          <a:prstGeom prst="straightConnector1">
+            <a:avLst/>
+          </a:prstGeom>
+          <a:ln>
+            <a:tailEnd type="triangle"/>
+          </a:ln>
+        </p:spPr>
+        <p:style>
+          <a:lnRef idx="1">
+            <a:schemeClr val="accent1"/>
+          </a:lnRef>
+          <a:fillRef idx="0">
+            <a:schemeClr val="accent1"/>
+          </a:fillRef>
+          <a:effectRef idx="0">
+            <a:schemeClr val="accent1"/>
+          </a:effectRef>
+          <a:fontRef idx="minor">
+            <a:schemeClr val="tx1"/>
+          </a:fontRef>
+        </p:style>
+      </p:cxnSp>
+    </p:spTree>
+    <p:extLst>
+      <p:ext uri="{BB962C8B-B14F-4D97-AF65-F5344CB8AC3E}">
+        <p14:creationId xmlns:p14="http://schemas.microsoft.com/office/powerpoint/2010/main" val="2483493740"/>
+      </p:ext>
+    </p:extLst>
+  </p:cSld>
+  <p:clrMapOvr>
+    <a:masterClrMapping/>
+  </p:clrMapOvr>
+</p:sld>
+</file>
+
 <file path=ppt/theme/theme1.xml><?xml version="1.0" encoding="utf-8"?>
 <a:theme xmlns:a="http://schemas.openxmlformats.org/drawingml/2006/main" name="Office Theme">
   <a:themeElements>

</xml_diff>

<commit_message>
added storage list function, corrected dependencies, added assign_global, added simplifying functions to replace self_save, self_load, get_from_dir
</commit_message>
<xml_diff>
--- a/extras/Explorer_Tool_Workflow_2.pptx
+++ b/extras/Explorer_Tool_Workflow_2.pptx
@@ -260,7 +260,7 @@
           <a:p>
             <a:fld id="{1560D20A-E720-4ECB-907E-0F9EBDE75356}" type="datetimeFigureOut">
               <a:rPr lang="en-US" smtClean="0"/>
-              <a:t>1/5/2022</a:t>
+              <a:t>1/8/2022</a:t>
             </a:fld>
             <a:endParaRPr lang="en-US"/>
           </a:p>
@@ -458,7 +458,7 @@
           <a:p>
             <a:fld id="{1560D20A-E720-4ECB-907E-0F9EBDE75356}" type="datetimeFigureOut">
               <a:rPr lang="en-US" smtClean="0"/>
-              <a:t>1/5/2022</a:t>
+              <a:t>1/8/2022</a:t>
             </a:fld>
             <a:endParaRPr lang="en-US"/>
           </a:p>
@@ -666,7 +666,7 @@
           <a:p>
             <a:fld id="{1560D20A-E720-4ECB-907E-0F9EBDE75356}" type="datetimeFigureOut">
               <a:rPr lang="en-US" smtClean="0"/>
-              <a:t>1/5/2022</a:t>
+              <a:t>1/8/2022</a:t>
             </a:fld>
             <a:endParaRPr lang="en-US"/>
           </a:p>
@@ -864,7 +864,7 @@
           <a:p>
             <a:fld id="{1560D20A-E720-4ECB-907E-0F9EBDE75356}" type="datetimeFigureOut">
               <a:rPr lang="en-US" smtClean="0"/>
-              <a:t>1/5/2022</a:t>
+              <a:t>1/8/2022</a:t>
             </a:fld>
             <a:endParaRPr lang="en-US"/>
           </a:p>
@@ -1139,7 +1139,7 @@
           <a:p>
             <a:fld id="{1560D20A-E720-4ECB-907E-0F9EBDE75356}" type="datetimeFigureOut">
               <a:rPr lang="en-US" smtClean="0"/>
-              <a:t>1/5/2022</a:t>
+              <a:t>1/8/2022</a:t>
             </a:fld>
             <a:endParaRPr lang="en-US"/>
           </a:p>
@@ -1404,7 +1404,7 @@
           <a:p>
             <a:fld id="{1560D20A-E720-4ECB-907E-0F9EBDE75356}" type="datetimeFigureOut">
               <a:rPr lang="en-US" smtClean="0"/>
-              <a:t>1/5/2022</a:t>
+              <a:t>1/8/2022</a:t>
             </a:fld>
             <a:endParaRPr lang="en-US"/>
           </a:p>
@@ -1816,7 +1816,7 @@
           <a:p>
             <a:fld id="{1560D20A-E720-4ECB-907E-0F9EBDE75356}" type="datetimeFigureOut">
               <a:rPr lang="en-US" smtClean="0"/>
-              <a:t>1/5/2022</a:t>
+              <a:t>1/8/2022</a:t>
             </a:fld>
             <a:endParaRPr lang="en-US"/>
           </a:p>
@@ -1957,7 +1957,7 @@
           <a:p>
             <a:fld id="{1560D20A-E720-4ECB-907E-0F9EBDE75356}" type="datetimeFigureOut">
               <a:rPr lang="en-US" smtClean="0"/>
-              <a:t>1/5/2022</a:t>
+              <a:t>1/8/2022</a:t>
             </a:fld>
             <a:endParaRPr lang="en-US"/>
           </a:p>
@@ -2070,7 +2070,7 @@
           <a:p>
             <a:fld id="{1560D20A-E720-4ECB-907E-0F9EBDE75356}" type="datetimeFigureOut">
               <a:rPr lang="en-US" smtClean="0"/>
-              <a:t>1/5/2022</a:t>
+              <a:t>1/8/2022</a:t>
             </a:fld>
             <a:endParaRPr lang="en-US"/>
           </a:p>
@@ -2381,7 +2381,7 @@
           <a:p>
             <a:fld id="{1560D20A-E720-4ECB-907E-0F9EBDE75356}" type="datetimeFigureOut">
               <a:rPr lang="en-US" smtClean="0"/>
-              <a:t>1/5/2022</a:t>
+              <a:t>1/8/2022</a:t>
             </a:fld>
             <a:endParaRPr lang="en-US"/>
           </a:p>
@@ -2669,7 +2669,7 @@
           <a:p>
             <a:fld id="{1560D20A-E720-4ECB-907E-0F9EBDE75356}" type="datetimeFigureOut">
               <a:rPr lang="en-US" smtClean="0"/>
-              <a:t>1/5/2022</a:t>
+              <a:t>1/8/2022</a:t>
             </a:fld>
             <a:endParaRPr lang="en-US"/>
           </a:p>
@@ -2910,7 +2910,7 @@
           <a:p>
             <a:fld id="{1560D20A-E720-4ECB-907E-0F9EBDE75356}" type="datetimeFigureOut">
               <a:rPr lang="en-US" smtClean="0"/>
-              <a:t>1/5/2022</a:t>
+              <a:t>1/8/2022</a:t>
             </a:fld>
             <a:endParaRPr lang="en-US"/>
           </a:p>
@@ -7380,7 +7380,7 @@
                 <a:latin typeface="Times New Roman" panose="02020603050405020304" pitchFamily="18" charset="0"/>
                 <a:cs typeface="Times New Roman" panose="02020603050405020304" pitchFamily="18" charset="0"/>
               </a:rPr>
-              <a:t>parameters.R</a:t>
+              <a:t>parameters.R*</a:t>
             </a:r>
             <a:r>
               <a:rPr lang="en-US" sz="1200" dirty="0">
@@ -7492,6 +7492,126 @@
           </a:fontRef>
         </p:style>
       </p:cxnSp>
+      <p:cxnSp>
+        <p:nvCxnSpPr>
+          <p:cNvPr id="31" name="Straight Arrow Connector 30">
+            <a:extLst>
+              <a:ext uri="{FF2B5EF4-FFF2-40B4-BE49-F238E27FC236}">
+                <a16:creationId xmlns:a16="http://schemas.microsoft.com/office/drawing/2014/main" id="{BCF9682C-EFFE-468E-B0CB-EF390D0FF338}"/>
+              </a:ext>
+            </a:extLst>
+          </p:cNvPr>
+          <p:cNvCxnSpPr>
+            <a:cxnSpLocks/>
+            <a:stCxn id="242" idx="0"/>
+            <a:endCxn id="57" idx="2"/>
+          </p:cNvCxnSpPr>
+          <p:nvPr/>
+        </p:nvCxnSpPr>
+        <p:spPr>
+          <a:xfrm flipV="1">
+            <a:off x="6448384" y="2101961"/>
+            <a:ext cx="5253" cy="139691"/>
+          </a:xfrm>
+          <a:prstGeom prst="straightConnector1">
+            <a:avLst/>
+          </a:prstGeom>
+          <a:ln>
+            <a:tailEnd type="triangle"/>
+          </a:ln>
+        </p:spPr>
+        <p:style>
+          <a:lnRef idx="1">
+            <a:schemeClr val="accent1"/>
+          </a:lnRef>
+          <a:fillRef idx="0">
+            <a:schemeClr val="accent1"/>
+          </a:fillRef>
+          <a:effectRef idx="0">
+            <a:schemeClr val="accent1"/>
+          </a:effectRef>
+          <a:fontRef idx="minor">
+            <a:schemeClr val="tx1"/>
+          </a:fontRef>
+        </p:style>
+      </p:cxnSp>
+      <p:sp>
+        <p:nvSpPr>
+          <p:cNvPr id="34" name="TextBox 33">
+            <a:extLst>
+              <a:ext uri="{FF2B5EF4-FFF2-40B4-BE49-F238E27FC236}">
+                <a16:creationId xmlns:a16="http://schemas.microsoft.com/office/drawing/2014/main" id="{BF7C1383-BBEE-431F-83DB-1A80CBAEBFB7}"/>
+              </a:ext>
+            </a:extLst>
+          </p:cNvPr>
+          <p:cNvSpPr txBox="1"/>
+          <p:nvPr/>
+        </p:nvSpPr>
+        <p:spPr>
+          <a:xfrm>
+            <a:off x="362564" y="736439"/>
+            <a:ext cx="2363167" cy="461665"/>
+          </a:xfrm>
+          <a:prstGeom prst="rect">
+            <a:avLst/>
+          </a:prstGeom>
+          <a:solidFill>
+            <a:schemeClr val="bg1"/>
+          </a:solidFill>
+          <a:ln/>
+        </p:spPr>
+        <p:style>
+          <a:lnRef idx="2">
+            <a:schemeClr val="accent1"/>
+          </a:lnRef>
+          <a:fillRef idx="1">
+            <a:schemeClr val="lt1"/>
+          </a:fillRef>
+          <a:effectRef idx="0">
+            <a:schemeClr val="accent1"/>
+          </a:effectRef>
+          <a:fontRef idx="minor">
+            <a:schemeClr val="dk1"/>
+          </a:fontRef>
+        </p:style>
+        <p:txBody>
+          <a:bodyPr wrap="square" rtlCol="0">
+            <a:spAutoFit/>
+          </a:bodyPr>
+          <a:lstStyle/>
+          <a:p>
+            <a:pPr algn="ctr"/>
+            <a:r>
+              <a:rPr lang="en-US" sz="1200" b="1" dirty="0">
+                <a:latin typeface="Times New Roman" panose="02020603050405020304" pitchFamily="18" charset="0"/>
+                <a:cs typeface="Times New Roman" panose="02020603050405020304" pitchFamily="18" charset="0"/>
+              </a:rPr>
+              <a:t>parameters.R*</a:t>
+            </a:r>
+            <a:r>
+              <a:rPr lang="en-US" sz="1200" dirty="0">
+                <a:latin typeface="Times New Roman" panose="02020603050405020304" pitchFamily="18" charset="0"/>
+                <a:cs typeface="Times New Roman" panose="02020603050405020304" pitchFamily="18" charset="0"/>
+              </a:rPr>
+              <a:t>: Not included in converter.R</a:t>
+            </a:r>
+            <a:r>
+              <a:rPr lang="en-US" sz="1200" dirty="0">
+                <a:solidFill>
+                  <a:schemeClr val="tx1"/>
+                </a:solidFill>
+                <a:latin typeface="Times New Roman" panose="02020603050405020304" pitchFamily="18" charset="0"/>
+                <a:cs typeface="Times New Roman" panose="02020603050405020304" pitchFamily="18" charset="0"/>
+              </a:rPr>
+              <a:t>.</a:t>
+            </a:r>
+            <a:endParaRPr lang="en-US" sz="1200" dirty="0">
+              <a:latin typeface="Times New Roman" panose="02020603050405020304" pitchFamily="18" charset="0"/>
+              <a:cs typeface="Times New Roman" panose="02020603050405020304" pitchFamily="18" charset="0"/>
+            </a:endParaRPr>
+          </a:p>
+        </p:txBody>
+      </p:sp>
     </p:spTree>
     <p:extLst>
       <p:ext uri="{BB962C8B-B14F-4D97-AF65-F5344CB8AC3E}">

</xml_diff>

<commit_message>
pipeline figure now has packages
</commit_message>
<xml_diff>
--- a/extras/Explorer_Tool_Workflow_2.pptx
+++ b/extras/Explorer_Tool_Workflow_2.pptx
@@ -260,7 +260,7 @@
           <a:p>
             <a:fld id="{1560D20A-E720-4ECB-907E-0F9EBDE75356}" type="datetimeFigureOut">
               <a:rPr lang="en-US" smtClean="0"/>
-              <a:t>1/8/2022</a:t>
+              <a:t>1/9/2022</a:t>
             </a:fld>
             <a:endParaRPr lang="en-US"/>
           </a:p>
@@ -458,7 +458,7 @@
           <a:p>
             <a:fld id="{1560D20A-E720-4ECB-907E-0F9EBDE75356}" type="datetimeFigureOut">
               <a:rPr lang="en-US" smtClean="0"/>
-              <a:t>1/8/2022</a:t>
+              <a:t>1/9/2022</a:t>
             </a:fld>
             <a:endParaRPr lang="en-US"/>
           </a:p>
@@ -666,7 +666,7 @@
           <a:p>
             <a:fld id="{1560D20A-E720-4ECB-907E-0F9EBDE75356}" type="datetimeFigureOut">
               <a:rPr lang="en-US" smtClean="0"/>
-              <a:t>1/8/2022</a:t>
+              <a:t>1/9/2022</a:t>
             </a:fld>
             <a:endParaRPr lang="en-US"/>
           </a:p>
@@ -864,7 +864,7 @@
           <a:p>
             <a:fld id="{1560D20A-E720-4ECB-907E-0F9EBDE75356}" type="datetimeFigureOut">
               <a:rPr lang="en-US" smtClean="0"/>
-              <a:t>1/8/2022</a:t>
+              <a:t>1/9/2022</a:t>
             </a:fld>
             <a:endParaRPr lang="en-US"/>
           </a:p>
@@ -1139,7 +1139,7 @@
           <a:p>
             <a:fld id="{1560D20A-E720-4ECB-907E-0F9EBDE75356}" type="datetimeFigureOut">
               <a:rPr lang="en-US" smtClean="0"/>
-              <a:t>1/8/2022</a:t>
+              <a:t>1/9/2022</a:t>
             </a:fld>
             <a:endParaRPr lang="en-US"/>
           </a:p>
@@ -1404,7 +1404,7 @@
           <a:p>
             <a:fld id="{1560D20A-E720-4ECB-907E-0F9EBDE75356}" type="datetimeFigureOut">
               <a:rPr lang="en-US" smtClean="0"/>
-              <a:t>1/8/2022</a:t>
+              <a:t>1/9/2022</a:t>
             </a:fld>
             <a:endParaRPr lang="en-US"/>
           </a:p>
@@ -1816,7 +1816,7 @@
           <a:p>
             <a:fld id="{1560D20A-E720-4ECB-907E-0F9EBDE75356}" type="datetimeFigureOut">
               <a:rPr lang="en-US" smtClean="0"/>
-              <a:t>1/8/2022</a:t>
+              <a:t>1/9/2022</a:t>
             </a:fld>
             <a:endParaRPr lang="en-US"/>
           </a:p>
@@ -1957,7 +1957,7 @@
           <a:p>
             <a:fld id="{1560D20A-E720-4ECB-907E-0F9EBDE75356}" type="datetimeFigureOut">
               <a:rPr lang="en-US" smtClean="0"/>
-              <a:t>1/8/2022</a:t>
+              <a:t>1/9/2022</a:t>
             </a:fld>
             <a:endParaRPr lang="en-US"/>
           </a:p>
@@ -2070,7 +2070,7 @@
           <a:p>
             <a:fld id="{1560D20A-E720-4ECB-907E-0F9EBDE75356}" type="datetimeFigureOut">
               <a:rPr lang="en-US" smtClean="0"/>
-              <a:t>1/8/2022</a:t>
+              <a:t>1/9/2022</a:t>
             </a:fld>
             <a:endParaRPr lang="en-US"/>
           </a:p>
@@ -2381,7 +2381,7 @@
           <a:p>
             <a:fld id="{1560D20A-E720-4ECB-907E-0F9EBDE75356}" type="datetimeFigureOut">
               <a:rPr lang="en-US" smtClean="0"/>
-              <a:t>1/8/2022</a:t>
+              <a:t>1/9/2022</a:t>
             </a:fld>
             <a:endParaRPr lang="en-US"/>
           </a:p>
@@ -2669,7 +2669,7 @@
           <a:p>
             <a:fld id="{1560D20A-E720-4ECB-907E-0F9EBDE75356}" type="datetimeFigureOut">
               <a:rPr lang="en-US" smtClean="0"/>
-              <a:t>1/8/2022</a:t>
+              <a:t>1/9/2022</a:t>
             </a:fld>
             <a:endParaRPr lang="en-US"/>
           </a:p>
@@ -2910,7 +2910,7 @@
           <a:p>
             <a:fld id="{1560D20A-E720-4ECB-907E-0F9EBDE75356}" type="datetimeFigureOut">
               <a:rPr lang="en-US" smtClean="0"/>
-              <a:t>1/8/2022</a:t>
+              <a:t>1/9/2022</a:t>
             </a:fld>
             <a:endParaRPr lang="en-US"/>
           </a:p>
@@ -5807,8 +5807,8 @@
         </p:nvSpPr>
         <p:spPr>
           <a:xfrm>
-            <a:off x="1684704" y="109581"/>
-            <a:ext cx="7711342" cy="276999"/>
+            <a:off x="172427" y="137252"/>
+            <a:ext cx="2363437" cy="646331"/>
           </a:xfrm>
           <a:prstGeom prst="rect">
             <a:avLst/>
@@ -5847,7 +5847,7 @@
                 <a:latin typeface="Times New Roman" panose="02020603050405020304" pitchFamily="18" charset="0"/>
                 <a:cs typeface="Times New Roman" panose="02020603050405020304" pitchFamily="18" charset="0"/>
               </a:rPr>
-              <a:t>install.R</a:t>
+              <a:t>install.R*</a:t>
             </a:r>
             <a:r>
               <a:rPr lang="en-US" sz="1200" dirty="0">
@@ -5857,7 +5857,7 @@
                 <a:latin typeface="Times New Roman" panose="02020603050405020304" pitchFamily="18" charset="0"/>
                 <a:cs typeface="Times New Roman" panose="02020603050405020304" pitchFamily="18" charset="0"/>
               </a:rPr>
-              <a:t>: Declares functions, determines the environment, installs packages, and stores the file root.  </a:t>
+              <a:t>: Declares functions, determines the environment, installs packages, and sets root.  </a:t>
             </a:r>
           </a:p>
         </p:txBody>
@@ -5945,8 +5945,163 @@
         </p:nvSpPr>
         <p:spPr>
           <a:xfrm>
-            <a:off x="5259938" y="5212776"/>
-            <a:ext cx="2363421" cy="1384995"/>
+            <a:off x="5203177" y="6058316"/>
+            <a:ext cx="2476926" cy="461665"/>
+          </a:xfrm>
+          <a:prstGeom prst="rect">
+            <a:avLst/>
+          </a:prstGeom>
+          <a:solidFill>
+            <a:srgbClr val="FFC5C5"/>
+          </a:solidFill>
+          <a:ln/>
+        </p:spPr>
+        <p:style>
+          <a:lnRef idx="2">
+            <a:schemeClr val="accent1"/>
+          </a:lnRef>
+          <a:fillRef idx="1">
+            <a:schemeClr val="lt1"/>
+          </a:fillRef>
+          <a:effectRef idx="0">
+            <a:schemeClr val="accent1"/>
+          </a:effectRef>
+          <a:fontRef idx="minor">
+            <a:schemeClr val="dk1"/>
+          </a:fontRef>
+        </p:style>
+        <p:txBody>
+          <a:bodyPr wrap="square" rtlCol="0">
+            <a:spAutoFit/>
+          </a:bodyPr>
+          <a:lstStyle/>
+          <a:p>
+            <a:pPr algn="ctr"/>
+            <a:r>
+              <a:rPr lang="en-US" sz="1200" b="1" dirty="0">
+                <a:solidFill>
+                  <a:schemeClr val="tx1"/>
+                </a:solidFill>
+                <a:latin typeface="Times New Roman" panose="02020603050405020304" pitchFamily="18" charset="0"/>
+                <a:cs typeface="Times New Roman" panose="02020603050405020304" pitchFamily="18" charset="0"/>
+              </a:rPr>
+              <a:t>authentication.R*</a:t>
+            </a:r>
+            <a:r>
+              <a:rPr lang="en-US" sz="1200" dirty="0">
+                <a:solidFill>
+                  <a:schemeClr val="tx1"/>
+                </a:solidFill>
+                <a:latin typeface="Times New Roman" panose="02020603050405020304" pitchFamily="18" charset="0"/>
+                <a:cs typeface="Times New Roman" panose="02020603050405020304" pitchFamily="18" charset="0"/>
+              </a:rPr>
+              <a:t>: Manages user authentication for the application.</a:t>
+            </a:r>
+          </a:p>
+        </p:txBody>
+      </p:sp>
+      <p:sp>
+        <p:nvSpPr>
+          <p:cNvPr id="44" name="TextBox 43">
+            <a:extLst>
+              <a:ext uri="{FF2B5EF4-FFF2-40B4-BE49-F238E27FC236}">
+                <a16:creationId xmlns:a16="http://schemas.microsoft.com/office/drawing/2014/main" id="{47F8FFAB-12ED-4067-8FEC-65125D573990}"/>
+              </a:ext>
+            </a:extLst>
+          </p:cNvPr>
+          <p:cNvSpPr txBox="1"/>
+          <p:nvPr/>
+        </p:nvSpPr>
+        <p:spPr>
+          <a:xfrm>
+            <a:off x="5259922" y="3478422"/>
+            <a:ext cx="2363437" cy="646331"/>
+          </a:xfrm>
+          <a:prstGeom prst="rect">
+            <a:avLst/>
+          </a:prstGeom>
+          <a:solidFill>
+            <a:srgbClr val="FFC5C5"/>
+          </a:solidFill>
+          <a:ln/>
+        </p:spPr>
+        <p:style>
+          <a:lnRef idx="2">
+            <a:schemeClr val="accent1"/>
+          </a:lnRef>
+          <a:fillRef idx="1">
+            <a:schemeClr val="lt1"/>
+          </a:fillRef>
+          <a:effectRef idx="0">
+            <a:schemeClr val="accent1"/>
+          </a:effectRef>
+          <a:fontRef idx="minor">
+            <a:schemeClr val="dk1"/>
+          </a:fontRef>
+        </p:style>
+        <p:txBody>
+          <a:bodyPr wrap="square" rtlCol="0">
+            <a:spAutoFit/>
+          </a:bodyPr>
+          <a:lstStyle/>
+          <a:p>
+            <a:pPr algn="ctr"/>
+            <a:r>
+              <a:rPr lang="en-US" sz="1200" b="1" dirty="0">
+                <a:solidFill>
+                  <a:schemeClr val="tx1"/>
+                </a:solidFill>
+                <a:latin typeface="Times New Roman" panose="02020603050405020304" pitchFamily="18" charset="0"/>
+                <a:cs typeface="Times New Roman" panose="02020603050405020304" pitchFamily="18" charset="0"/>
+              </a:rPr>
+              <a:t>storage.R</a:t>
+            </a:r>
+            <a:r>
+              <a:rPr lang="en-US" sz="1200" dirty="0">
+                <a:solidFill>
+                  <a:schemeClr val="tx1"/>
+                </a:solidFill>
+                <a:latin typeface="Times New Roman" panose="02020603050405020304" pitchFamily="18" charset="0"/>
+                <a:cs typeface="Times New Roman" panose="02020603050405020304" pitchFamily="18" charset="0"/>
+              </a:rPr>
+              <a:t>: </a:t>
+            </a:r>
+            <a:r>
+              <a:rPr lang="en-US" sz="1200" dirty="0">
+                <a:latin typeface="Times New Roman" panose="02020603050405020304" pitchFamily="18" charset="0"/>
+                <a:cs typeface="Times New Roman" panose="02020603050405020304" pitchFamily="18" charset="0"/>
+              </a:rPr>
+              <a:t>Names and initializes reduction parameters</a:t>
+            </a:r>
+            <a:r>
+              <a:rPr lang="en-US" sz="1200" dirty="0">
+                <a:solidFill>
+                  <a:schemeClr val="tx1"/>
+                </a:solidFill>
+                <a:latin typeface="Times New Roman" panose="02020603050405020304" pitchFamily="18" charset="0"/>
+                <a:cs typeface="Times New Roman" panose="02020603050405020304" pitchFamily="18" charset="0"/>
+              </a:rPr>
+              <a:t>. Names, stores, and loads reduction files. </a:t>
+            </a:r>
+          </a:p>
+        </p:txBody>
+      </p:sp>
+      <p:sp>
+        <p:nvSpPr>
+          <p:cNvPr id="50" name="TextBox 49">
+            <a:extLst>
+              <a:ext uri="{FF2B5EF4-FFF2-40B4-BE49-F238E27FC236}">
+                <a16:creationId xmlns:a16="http://schemas.microsoft.com/office/drawing/2014/main" id="{83B2102D-D373-4C95-A96F-FC4023A9A31D}"/>
+              </a:ext>
+            </a:extLst>
+          </p:cNvPr>
+          <p:cNvSpPr txBox="1"/>
+          <p:nvPr/>
+        </p:nvSpPr>
+        <p:spPr>
+          <a:xfrm>
+            <a:off x="2728466" y="3484011"/>
+            <a:ext cx="2363435" cy="461665"/>
           </a:xfrm>
           <a:prstGeom prst="rect">
             <a:avLst/>
@@ -5985,7 +6140,7 @@
                 <a:latin typeface="Times New Roman" panose="02020603050405020304" pitchFamily="18" charset="0"/>
                 <a:cs typeface="Times New Roman" panose="02020603050405020304" pitchFamily="18" charset="0"/>
               </a:rPr>
-              <a:t>authentication.R</a:t>
+              <a:t>preprocess.R</a:t>
             </a:r>
             <a:r>
               <a:rPr lang="en-US" sz="1200" dirty="0">
@@ -5995,178 +6150,7 @@
                 <a:latin typeface="Times New Roman" panose="02020603050405020304" pitchFamily="18" charset="0"/>
                 <a:cs typeface="Times New Roman" panose="02020603050405020304" pitchFamily="18" charset="0"/>
               </a:rPr>
-              <a:t>: Manages user authentication for the application.</a:t>
-            </a:r>
-          </a:p>
-          <a:p>
-            <a:pPr algn="ctr"/>
-            <a:endParaRPr lang="en-US" sz="1200" dirty="0">
-              <a:solidFill>
-                <a:schemeClr val="tx1"/>
-              </a:solidFill>
-              <a:latin typeface="Times New Roman" panose="02020603050405020304" pitchFamily="18" charset="0"/>
-              <a:cs typeface="Times New Roman" panose="02020603050405020304" pitchFamily="18" charset="0"/>
-            </a:endParaRPr>
-          </a:p>
-          <a:p>
-            <a:pPr algn="ctr"/>
-            <a:r>
-              <a:rPr lang="en-US" sz="1200" b="1" dirty="0">
-                <a:solidFill>
-                  <a:schemeClr val="tx1"/>
-                </a:solidFill>
-                <a:latin typeface="Times New Roman" panose="02020603050405020304" pitchFamily="18" charset="0"/>
-                <a:cs typeface="Times New Roman" panose="02020603050405020304" pitchFamily="18" charset="0"/>
-              </a:rPr>
-              <a:t>plotting.R</a:t>
-            </a:r>
-            <a:r>
-              <a:rPr lang="en-US" sz="1200" dirty="0">
-                <a:solidFill>
-                  <a:schemeClr val="tx1"/>
-                </a:solidFill>
-                <a:latin typeface="Times New Roman" panose="02020603050405020304" pitchFamily="18" charset="0"/>
-                <a:cs typeface="Times New Roman" panose="02020603050405020304" pitchFamily="18" charset="0"/>
-              </a:rPr>
-              <a:t>: Makes ggplot2, plotly, boxplot / beeswarm, DT, UpSetR, heatmaply, and Venn Diagram objects for Shiny applications.</a:t>
-            </a:r>
-          </a:p>
-        </p:txBody>
-      </p:sp>
-      <p:sp>
-        <p:nvSpPr>
-          <p:cNvPr id="44" name="TextBox 43">
-            <a:extLst>
-              <a:ext uri="{FF2B5EF4-FFF2-40B4-BE49-F238E27FC236}">
-                <a16:creationId xmlns:a16="http://schemas.microsoft.com/office/drawing/2014/main" id="{47F8FFAB-12ED-4067-8FEC-65125D573990}"/>
-              </a:ext>
-            </a:extLst>
-          </p:cNvPr>
-          <p:cNvSpPr txBox="1"/>
-          <p:nvPr/>
-        </p:nvSpPr>
-        <p:spPr>
-          <a:xfrm>
-            <a:off x="5266800" y="3581672"/>
-            <a:ext cx="2363437" cy="461665"/>
-          </a:xfrm>
-          <a:prstGeom prst="rect">
-            <a:avLst/>
-          </a:prstGeom>
-          <a:solidFill>
-            <a:schemeClr val="bg1"/>
-          </a:solidFill>
-          <a:ln/>
-        </p:spPr>
-        <p:style>
-          <a:lnRef idx="2">
-            <a:schemeClr val="accent1"/>
-          </a:lnRef>
-          <a:fillRef idx="1">
-            <a:schemeClr val="lt1"/>
-          </a:fillRef>
-          <a:effectRef idx="0">
-            <a:schemeClr val="accent1"/>
-          </a:effectRef>
-          <a:fontRef idx="minor">
-            <a:schemeClr val="dk1"/>
-          </a:fontRef>
-        </p:style>
-        <p:txBody>
-          <a:bodyPr wrap="square" rtlCol="0">
-            <a:spAutoFit/>
-          </a:bodyPr>
-          <a:lstStyle/>
-          <a:p>
-            <a:pPr algn="ctr"/>
-            <a:r>
-              <a:rPr lang="en-US" sz="1200" b="1" dirty="0">
-                <a:solidFill>
-                  <a:schemeClr val="tx1"/>
-                </a:solidFill>
-                <a:latin typeface="Times New Roman" panose="02020603050405020304" pitchFamily="18" charset="0"/>
-                <a:cs typeface="Times New Roman" panose="02020603050405020304" pitchFamily="18" charset="0"/>
-              </a:rPr>
-              <a:t>storage.R</a:t>
-            </a:r>
-            <a:r>
-              <a:rPr lang="en-US" sz="1200" dirty="0">
-                <a:solidFill>
-                  <a:schemeClr val="tx1"/>
-                </a:solidFill>
-                <a:latin typeface="Times New Roman" panose="02020603050405020304" pitchFamily="18" charset="0"/>
-                <a:cs typeface="Times New Roman" panose="02020603050405020304" pitchFamily="18" charset="0"/>
-              </a:rPr>
-              <a:t>: Names, stores, and loads reduction analysis files. </a:t>
-            </a:r>
-          </a:p>
-        </p:txBody>
-      </p:sp>
-      <p:sp>
-        <p:nvSpPr>
-          <p:cNvPr id="50" name="TextBox 49">
-            <a:extLst>
-              <a:ext uri="{FF2B5EF4-FFF2-40B4-BE49-F238E27FC236}">
-                <a16:creationId xmlns:a16="http://schemas.microsoft.com/office/drawing/2014/main" id="{83B2102D-D373-4C95-A96F-FC4023A9A31D}"/>
-              </a:ext>
-            </a:extLst>
-          </p:cNvPr>
-          <p:cNvSpPr txBox="1"/>
-          <p:nvPr/>
-        </p:nvSpPr>
-        <p:spPr>
-          <a:xfrm>
-            <a:off x="2728466" y="3484011"/>
-            <a:ext cx="2363435" cy="646331"/>
-          </a:xfrm>
-          <a:prstGeom prst="rect">
-            <a:avLst/>
-          </a:prstGeom>
-          <a:solidFill>
-            <a:schemeClr val="bg1"/>
-          </a:solidFill>
-          <a:ln/>
-        </p:spPr>
-        <p:style>
-          <a:lnRef idx="2">
-            <a:schemeClr val="accent1"/>
-          </a:lnRef>
-          <a:fillRef idx="1">
-            <a:schemeClr val="lt1"/>
-          </a:fillRef>
-          <a:effectRef idx="0">
-            <a:schemeClr val="accent1"/>
-          </a:effectRef>
-          <a:fontRef idx="minor">
-            <a:schemeClr val="dk1"/>
-          </a:fontRef>
-        </p:style>
-        <p:txBody>
-          <a:bodyPr wrap="square" rtlCol="0">
-            <a:spAutoFit/>
-          </a:bodyPr>
-          <a:lstStyle/>
-          <a:p>
-            <a:pPr algn="ctr"/>
-            <a:r>
-              <a:rPr lang="en-US" sz="1200" b="1" dirty="0">
-                <a:solidFill>
-                  <a:schemeClr val="tx1"/>
-                </a:solidFill>
-                <a:latin typeface="Times New Roman" panose="02020603050405020304" pitchFamily="18" charset="0"/>
-                <a:cs typeface="Times New Roman" panose="02020603050405020304" pitchFamily="18" charset="0"/>
-              </a:rPr>
-              <a:t>preprocess.R</a:t>
-            </a:r>
-            <a:r>
-              <a:rPr lang="en-US" sz="1200" dirty="0">
-                <a:solidFill>
-                  <a:schemeClr val="tx1"/>
-                </a:solidFill>
-                <a:latin typeface="Times New Roman" panose="02020603050405020304" pitchFamily="18" charset="0"/>
-                <a:cs typeface="Times New Roman" panose="02020603050405020304" pitchFamily="18" charset="0"/>
-              </a:rPr>
-              <a:t>: Declares scaling / normalization functions and loads stored category / subset data.</a:t>
+              <a:t>: Loads stored category / subset data.</a:t>
             </a:r>
           </a:p>
         </p:txBody>
@@ -6232,8 +6216,8 @@
         </p:nvCxnSpPr>
         <p:spPr>
           <a:xfrm flipH="1" flipV="1">
-            <a:off x="5091901" y="3807177"/>
-            <a:ext cx="174899" cy="5328"/>
+            <a:off x="5091901" y="3714844"/>
+            <a:ext cx="168021" cy="86744"/>
           </a:xfrm>
           <a:prstGeom prst="straightConnector1">
             <a:avLst/>
@@ -6338,12 +6322,15 @@
         </p:nvSpPr>
         <p:spPr>
           <a:xfrm>
-            <a:off x="5266816" y="668166"/>
+            <a:off x="5269368" y="476518"/>
             <a:ext cx="2368538" cy="646331"/>
           </a:xfrm>
           <a:prstGeom prst="rect">
             <a:avLst/>
           </a:prstGeom>
+          <a:solidFill>
+            <a:srgbClr val="FFC5C5"/>
+          </a:solidFill>
           <a:ln/>
         </p:spPr>
         <p:style>
@@ -6372,7 +6359,7 @@
                 <a:latin typeface="Times New Roman" panose="02020603050405020304" pitchFamily="18" charset="0"/>
                 <a:cs typeface="Times New Roman" panose="02020603050405020304" pitchFamily="18" charset="0"/>
               </a:rPr>
-              <a:t>find_replace.R</a:t>
+              <a:t>find_replace.R*</a:t>
             </a:r>
             <a:r>
               <a:rPr lang="en-US" sz="1200" dirty="0">
@@ -6411,6 +6398,9 @@
           <a:prstGeom prst="rect">
             <a:avLst/>
           </a:prstGeom>
+          <a:solidFill>
+            <a:srgbClr val="FFC5C5"/>
+          </a:solidFill>
           <a:ln/>
         </p:spPr>
         <p:style>
@@ -6475,9 +6465,9 @@
           <p:nvPr/>
         </p:nvCxnSpPr>
         <p:spPr>
-          <a:xfrm flipV="1">
-            <a:off x="7635354" y="991331"/>
-            <a:ext cx="164283" cy="1"/>
+          <a:xfrm>
+            <a:off x="7637906" y="799684"/>
+            <a:ext cx="161731" cy="191647"/>
           </a:xfrm>
           <a:prstGeom prst="straightConnector1">
             <a:avLst/>
@@ -6555,15 +6545,15 @@
           </p:cNvPr>
           <p:cNvCxnSpPr>
             <a:cxnSpLocks/>
-            <a:stCxn id="58" idx="2"/>
+            <a:stCxn id="49" idx="2"/>
             <a:endCxn id="57" idx="0"/>
           </p:cNvCxnSpPr>
           <p:nvPr/>
         </p:nvCxnSpPr>
         <p:spPr>
           <a:xfrm>
-            <a:off x="6451085" y="1314497"/>
-            <a:ext cx="2552" cy="141133"/>
+            <a:off x="6441640" y="1395822"/>
+            <a:ext cx="11997" cy="59808"/>
           </a:xfrm>
           <a:prstGeom prst="straightConnector1">
             <a:avLst/>
@@ -6641,7 +6631,7 @@
                 <a:latin typeface="Times New Roman" panose="02020603050405020304" pitchFamily="18" charset="0"/>
                 <a:cs typeface="Times New Roman" panose="02020603050405020304" pitchFamily="18" charset="0"/>
               </a:rPr>
-              <a:t>red_methods.R</a:t>
+              <a:t>red_methods.R*</a:t>
             </a:r>
             <a:r>
               <a:rPr lang="en-US" sz="1200" dirty="0">
@@ -6674,8 +6664,8 @@
         </p:nvCxnSpPr>
         <p:spPr>
           <a:xfrm flipH="1">
-            <a:off x="3907449" y="4130342"/>
-            <a:ext cx="2735" cy="192719"/>
+            <a:off x="3850704" y="3945676"/>
+            <a:ext cx="59480" cy="377385"/>
           </a:xfrm>
           <a:prstGeom prst="straightConnector1">
             <a:avLst/>
@@ -6713,8 +6703,8 @@
         </p:nvSpPr>
         <p:spPr>
           <a:xfrm>
-            <a:off x="2725731" y="4323061"/>
-            <a:ext cx="2363435" cy="830997"/>
+            <a:off x="2612241" y="4323061"/>
+            <a:ext cx="2476925" cy="830997"/>
           </a:xfrm>
           <a:prstGeom prst="rect">
             <a:avLst/>
@@ -6753,7 +6743,7 @@
                 <a:latin typeface="Times New Roman" panose="02020603050405020304" pitchFamily="18" charset="0"/>
                 <a:cs typeface="Times New Roman" panose="02020603050405020304" pitchFamily="18" charset="0"/>
               </a:rPr>
-              <a:t>red_requests.R</a:t>
+              <a:t>red_requests.R*</a:t>
             </a:r>
             <a:r>
               <a:rPr lang="en-US" sz="1200" dirty="0">
@@ -6832,7 +6822,7 @@
             <a:avLst/>
           </a:prstGeom>
           <a:solidFill>
-            <a:schemeClr val="bg1"/>
+            <a:srgbClr val="FFC5C5"/>
           </a:solidFill>
           <a:ln/>
         </p:spPr>
@@ -6896,75 +6886,6 @@
           <a:xfrm>
             <a:off x="7804483" y="2076087"/>
             <a:ext cx="2363434" cy="646331"/>
-          </a:xfrm>
-          <a:prstGeom prst="rect">
-            <a:avLst/>
-          </a:prstGeom>
-          <a:solidFill>
-            <a:schemeClr val="bg1"/>
-          </a:solidFill>
-          <a:ln/>
-        </p:spPr>
-        <p:style>
-          <a:lnRef idx="2">
-            <a:schemeClr val="accent1"/>
-          </a:lnRef>
-          <a:fillRef idx="1">
-            <a:schemeClr val="lt1"/>
-          </a:fillRef>
-          <a:effectRef idx="0">
-            <a:schemeClr val="accent1"/>
-          </a:effectRef>
-          <a:fontRef idx="minor">
-            <a:schemeClr val="dk1"/>
-          </a:fontRef>
-        </p:style>
-        <p:txBody>
-          <a:bodyPr wrap="square" rtlCol="0">
-            <a:spAutoFit/>
-          </a:bodyPr>
-          <a:lstStyle/>
-          <a:p>
-            <a:pPr algn="ctr"/>
-            <a:r>
-              <a:rPr lang="en-US" sz="1200" b="1" dirty="0">
-                <a:solidFill>
-                  <a:schemeClr val="tx1"/>
-                </a:solidFill>
-                <a:latin typeface="Times New Roman" panose="02020603050405020304" pitchFamily="18" charset="0"/>
-                <a:cs typeface="Times New Roman" panose="02020603050405020304" pitchFamily="18" charset="0"/>
-              </a:rPr>
-              <a:t>ui_functions.R</a:t>
-            </a:r>
-            <a:r>
-              <a:rPr lang="en-US" sz="1200" dirty="0">
-                <a:solidFill>
-                  <a:schemeClr val="tx1"/>
-                </a:solidFill>
-                <a:latin typeface="Times New Roman" panose="02020603050405020304" pitchFamily="18" charset="0"/>
-                <a:cs typeface="Times New Roman" panose="02020603050405020304" pitchFamily="18" charset="0"/>
-              </a:rPr>
-              <a:t>: Declares functions that generate interactive HTML widgets for Shiny applications.</a:t>
-            </a:r>
-          </a:p>
-        </p:txBody>
-      </p:sp>
-      <p:sp>
-        <p:nvSpPr>
-          <p:cNvPr id="91" name="TextBox 90">
-            <a:extLst>
-              <a:ext uri="{FF2B5EF4-FFF2-40B4-BE49-F238E27FC236}">
-                <a16:creationId xmlns:a16="http://schemas.microsoft.com/office/drawing/2014/main" id="{F6F9E16A-6C86-470D-9A79-6EDD3DF8873C}"/>
-              </a:ext>
-            </a:extLst>
-          </p:cNvPr>
-          <p:cNvSpPr txBox="1"/>
-          <p:nvPr/>
-        </p:nvSpPr>
-        <p:spPr>
-          <a:xfrm>
-            <a:off x="7794130" y="5579278"/>
-            <a:ext cx="2363426" cy="646331"/>
           </a:xfrm>
           <a:prstGeom prst="rect">
             <a:avLst/>
@@ -7003,6 +6924,75 @@
                 <a:latin typeface="Times New Roman" panose="02020603050405020304" pitchFamily="18" charset="0"/>
                 <a:cs typeface="Times New Roman" panose="02020603050405020304" pitchFamily="18" charset="0"/>
               </a:rPr>
+              <a:t>ui_functions.R</a:t>
+            </a:r>
+            <a:r>
+              <a:rPr lang="en-US" sz="1200" dirty="0">
+                <a:solidFill>
+                  <a:schemeClr val="tx1"/>
+                </a:solidFill>
+                <a:latin typeface="Times New Roman" panose="02020603050405020304" pitchFamily="18" charset="0"/>
+                <a:cs typeface="Times New Roman" panose="02020603050405020304" pitchFamily="18" charset="0"/>
+              </a:rPr>
+              <a:t>: Declares functions that generate interactive HTML widgets for Shiny applications.</a:t>
+            </a:r>
+          </a:p>
+        </p:txBody>
+      </p:sp>
+      <p:sp>
+        <p:nvSpPr>
+          <p:cNvPr id="91" name="TextBox 90">
+            <a:extLst>
+              <a:ext uri="{FF2B5EF4-FFF2-40B4-BE49-F238E27FC236}">
+                <a16:creationId xmlns:a16="http://schemas.microsoft.com/office/drawing/2014/main" id="{F6F9E16A-6C86-470D-9A79-6EDD3DF8873C}"/>
+              </a:ext>
+            </a:extLst>
+          </p:cNvPr>
+          <p:cNvSpPr txBox="1"/>
+          <p:nvPr/>
+        </p:nvSpPr>
+        <p:spPr>
+          <a:xfrm>
+            <a:off x="7794130" y="5579278"/>
+            <a:ext cx="2363426" cy="646331"/>
+          </a:xfrm>
+          <a:prstGeom prst="rect">
+            <a:avLst/>
+          </a:prstGeom>
+          <a:solidFill>
+            <a:srgbClr val="FFC5C5"/>
+          </a:solidFill>
+          <a:ln/>
+        </p:spPr>
+        <p:style>
+          <a:lnRef idx="2">
+            <a:schemeClr val="accent1"/>
+          </a:lnRef>
+          <a:fillRef idx="1">
+            <a:schemeClr val="lt1"/>
+          </a:fillRef>
+          <a:effectRef idx="0">
+            <a:schemeClr val="accent1"/>
+          </a:effectRef>
+          <a:fontRef idx="minor">
+            <a:schemeClr val="dk1"/>
+          </a:fontRef>
+        </p:style>
+        <p:txBody>
+          <a:bodyPr wrap="square" rtlCol="0">
+            <a:spAutoFit/>
+          </a:bodyPr>
+          <a:lstStyle/>
+          <a:p>
+            <a:pPr algn="ctr"/>
+            <a:r>
+              <a:rPr lang="en-US" sz="1200" b="1" dirty="0">
+                <a:solidFill>
+                  <a:schemeClr val="tx1"/>
+                </a:solidFill>
+                <a:latin typeface="Times New Roman" panose="02020603050405020304" pitchFamily="18" charset="0"/>
+                <a:cs typeface="Times New Roman" panose="02020603050405020304" pitchFamily="18" charset="0"/>
+              </a:rPr>
               <a:t>app.R</a:t>
             </a:r>
             <a:r>
@@ -7036,8 +7026,8 @@
         </p:nvCxnSpPr>
         <p:spPr>
           <a:xfrm flipV="1">
-            <a:off x="7623359" y="5902444"/>
-            <a:ext cx="170771" cy="2830"/>
+            <a:off x="7680103" y="5902444"/>
+            <a:ext cx="114027" cy="386705"/>
           </a:xfrm>
           <a:prstGeom prst="straightConnector1">
             <a:avLst/>
@@ -7081,12 +7071,7 @@
           <a:prstGeom prst="rect">
             <a:avLst/>
           </a:prstGeom>
-          <a:solidFill>
-            <a:schemeClr val="accent5">
-              <a:lumMod val="20000"/>
-              <a:lumOff val="80000"/>
-            </a:schemeClr>
-          </a:solidFill>
+          <a:noFill/>
           <a:ln/>
         </p:spPr>
         <p:style>
@@ -7151,8 +7136,8 @@
         </p:nvCxnSpPr>
         <p:spPr>
           <a:xfrm>
-            <a:off x="3907449" y="5154058"/>
-            <a:ext cx="1" cy="184980"/>
+            <a:off x="3850704" y="5154058"/>
+            <a:ext cx="56746" cy="184980"/>
           </a:xfrm>
           <a:prstGeom prst="straightConnector1">
             <a:avLst/>
@@ -7187,15 +7172,14 @@
           </p:cNvPr>
           <p:cNvCxnSpPr>
             <a:cxnSpLocks/>
-            <a:stCxn id="89" idx="2"/>
             <a:endCxn id="91" idx="0"/>
           </p:cNvCxnSpPr>
           <p:nvPr/>
         </p:nvCxnSpPr>
         <p:spPr>
-          <a:xfrm flipH="1">
-            <a:off x="8975843" y="4130342"/>
-            <a:ext cx="5511" cy="1448936"/>
+          <a:xfrm>
+            <a:off x="8975843" y="4639365"/>
+            <a:ext cx="0" cy="939913"/>
           </a:xfrm>
           <a:prstGeom prst="straightConnector1">
             <a:avLst/>
@@ -7273,15 +7257,15 @@
           </p:cNvPr>
           <p:cNvCxnSpPr>
             <a:cxnSpLocks/>
-            <a:stCxn id="90" idx="2"/>
+            <a:stCxn id="65" idx="2"/>
             <a:endCxn id="89" idx="0"/>
           </p:cNvCxnSpPr>
           <p:nvPr/>
         </p:nvCxnSpPr>
         <p:spPr>
           <a:xfrm flipH="1">
-            <a:off x="8981354" y="2722418"/>
-            <a:ext cx="4846" cy="761593"/>
+            <a:off x="8981354" y="3158790"/>
+            <a:ext cx="4841" cy="325221"/>
           </a:xfrm>
           <a:prstGeom prst="straightConnector1">
             <a:avLst/>
@@ -7320,13 +7304,13 @@
         <p:spPr>
           <a:xfrm>
             <a:off x="5266800" y="2241652"/>
-            <a:ext cx="2363167" cy="1200329"/>
+            <a:ext cx="2363167" cy="646331"/>
           </a:xfrm>
           <a:prstGeom prst="rect">
             <a:avLst/>
           </a:prstGeom>
           <a:solidFill>
-            <a:schemeClr val="bg1"/>
+            <a:srgbClr val="FFC5C5"/>
           </a:solidFill>
           <a:ln/>
         </p:spPr>
@@ -7363,46 +7347,8 @@
                 <a:latin typeface="Times New Roman" panose="02020603050405020304" pitchFamily="18" charset="0"/>
                 <a:cs typeface="Times New Roman" panose="02020603050405020304" pitchFamily="18" charset="0"/>
               </a:rPr>
-              <a:t>: Declares functions for listing / reading / writing files on operating systems / AWS.</a:t>
-            </a:r>
-          </a:p>
-          <a:p>
-            <a:pPr algn="ctr"/>
-            <a:endParaRPr lang="en-US" sz="1200" dirty="0">
-              <a:latin typeface="Times New Roman" panose="02020603050405020304" pitchFamily="18" charset="0"/>
-              <a:cs typeface="Times New Roman" panose="02020603050405020304" pitchFamily="18" charset="0"/>
-            </a:endParaRPr>
-          </a:p>
-          <a:p>
-            <a:pPr algn="ctr"/>
-            <a:r>
-              <a:rPr lang="en-US" sz="1200" b="1" dirty="0">
-                <a:latin typeface="Times New Roman" panose="02020603050405020304" pitchFamily="18" charset="0"/>
-                <a:cs typeface="Times New Roman" panose="02020603050405020304" pitchFamily="18" charset="0"/>
-              </a:rPr>
-              <a:t>parameters.R*</a:t>
-            </a:r>
-            <a:r>
-              <a:rPr lang="en-US" sz="1200" dirty="0">
-                <a:latin typeface="Times New Roman" panose="02020603050405020304" pitchFamily="18" charset="0"/>
-                <a:cs typeface="Times New Roman" panose="02020603050405020304" pitchFamily="18" charset="0"/>
-              </a:rPr>
-              <a:t>: Specifies names and roles for reduction parameters</a:t>
-            </a:r>
-            <a:r>
-              <a:rPr lang="en-US" sz="1200" dirty="0">
-                <a:solidFill>
-                  <a:schemeClr val="tx1"/>
-                </a:solidFill>
-                <a:latin typeface="Times New Roman" panose="02020603050405020304" pitchFamily="18" charset="0"/>
-                <a:cs typeface="Times New Roman" panose="02020603050405020304" pitchFamily="18" charset="0"/>
-              </a:rPr>
-              <a:t>.</a:t>
-            </a:r>
-            <a:endParaRPr lang="en-US" sz="1200" dirty="0">
-              <a:latin typeface="Times New Roman" panose="02020603050405020304" pitchFamily="18" charset="0"/>
-              <a:cs typeface="Times New Roman" panose="02020603050405020304" pitchFamily="18" charset="0"/>
-            </a:endParaRPr>
+              <a:t>: Declares functions to list, find, read, and write files on operating systems / AWS.</a:t>
+            </a:r>
           </a:p>
         </p:txBody>
       </p:sp>
@@ -7417,15 +7363,15 @@
           </p:cNvPr>
           <p:cNvCxnSpPr>
             <a:cxnSpLocks/>
-            <a:stCxn id="242" idx="2"/>
+            <a:stCxn id="46" idx="2"/>
             <a:endCxn id="44" idx="0"/>
           </p:cNvCxnSpPr>
           <p:nvPr/>
         </p:nvCxnSpPr>
         <p:spPr>
-          <a:xfrm>
-            <a:off x="6448384" y="3441981"/>
-            <a:ext cx="135" cy="139691"/>
+          <a:xfrm flipH="1">
+            <a:off x="6441641" y="3160846"/>
+            <a:ext cx="6878" cy="317576"/>
           </a:xfrm>
           <a:prstGeom prst="straightConnector1">
             <a:avLst/>
@@ -7466,9 +7412,9 @@
           <p:nvPr/>
         </p:nvCxnSpPr>
         <p:spPr>
-          <a:xfrm flipV="1">
-            <a:off x="7630237" y="3807177"/>
-            <a:ext cx="169400" cy="5328"/>
+          <a:xfrm>
+            <a:off x="7623359" y="3801588"/>
+            <a:ext cx="176278" cy="5589"/>
           </a:xfrm>
           <a:prstGeom prst="straightConnector1">
             <a:avLst/>
@@ -7537,10 +7483,10 @@
       </p:cxnSp>
       <p:sp>
         <p:nvSpPr>
-          <p:cNvPr id="34" name="TextBox 33">
-            <a:extLst>
-              <a:ext uri="{FF2B5EF4-FFF2-40B4-BE49-F238E27FC236}">
-                <a16:creationId xmlns:a16="http://schemas.microsoft.com/office/drawing/2014/main" id="{BF7C1383-BBEE-431F-83DB-1A80CBAEBFB7}"/>
+          <p:cNvPr id="39" name="TextBox 38">
+            <a:extLst>
+              <a:ext uri="{FF2B5EF4-FFF2-40B4-BE49-F238E27FC236}">
+                <a16:creationId xmlns:a16="http://schemas.microsoft.com/office/drawing/2014/main" id="{029103AD-A728-4D0B-9FEE-183866445CA4}"/>
               </a:ext>
             </a:extLst>
           </p:cNvPr>
@@ -7549,8 +7495,70 @@
         </p:nvSpPr>
         <p:spPr>
           <a:xfrm>
-            <a:off x="362564" y="736439"/>
-            <a:ext cx="2363167" cy="461665"/>
+            <a:off x="172426" y="780809"/>
+            <a:ext cx="2363437" cy="646331"/>
+          </a:xfrm>
+          <a:prstGeom prst="rect">
+            <a:avLst/>
+          </a:prstGeom>
+          <a:solidFill>
+            <a:schemeClr val="accent1">
+              <a:lumMod val="20000"/>
+              <a:lumOff val="80000"/>
+            </a:schemeClr>
+          </a:solidFill>
+          <a:ln/>
+        </p:spPr>
+        <p:style>
+          <a:lnRef idx="2">
+            <a:schemeClr val="accent1"/>
+          </a:lnRef>
+          <a:fillRef idx="1">
+            <a:schemeClr val="lt1"/>
+          </a:fillRef>
+          <a:effectRef idx="0">
+            <a:schemeClr val="accent1"/>
+          </a:effectRef>
+          <a:fontRef idx="minor">
+            <a:schemeClr val="dk1"/>
+          </a:fontRef>
+        </p:style>
+        <p:txBody>
+          <a:bodyPr wrap="square" rtlCol="0">
+            <a:spAutoFit/>
+          </a:bodyPr>
+          <a:lstStyle/>
+          <a:p>
+            <a:pPr algn="ctr"/>
+            <a:r>
+              <a:rPr lang="en-US" sz="1200" dirty="0">
+                <a:solidFill>
+                  <a:schemeClr val="tx1"/>
+                </a:solidFill>
+                <a:latin typeface="Times New Roman" panose="02020603050405020304" pitchFamily="18" charset="0"/>
+                <a:cs typeface="Times New Roman" panose="02020603050405020304" pitchFamily="18" charset="0"/>
+              </a:rPr>
+              <a:t>library(shiny), library(dplyr), library(BiocManager) [only necessary for reduction]</a:t>
+            </a:r>
+          </a:p>
+        </p:txBody>
+      </p:sp>
+      <p:sp>
+        <p:nvSpPr>
+          <p:cNvPr id="33" name="TextBox 32">
+            <a:extLst>
+              <a:ext uri="{FF2B5EF4-FFF2-40B4-BE49-F238E27FC236}">
+                <a16:creationId xmlns:a16="http://schemas.microsoft.com/office/drawing/2014/main" id="{0441AD0E-A153-4EC3-A49F-65D0E2C4D285}"/>
+              </a:ext>
+            </a:extLst>
+          </p:cNvPr>
+          <p:cNvSpPr txBox="1"/>
+          <p:nvPr/>
+        </p:nvSpPr>
+        <p:spPr>
+          <a:xfrm>
+            <a:off x="155681" y="3484010"/>
+            <a:ext cx="2363435" cy="461665"/>
           </a:xfrm>
           <a:prstGeom prst="rect">
             <a:avLst/>
@@ -7583,32 +7591,787 @@
             <a:pPr algn="ctr"/>
             <a:r>
               <a:rPr lang="en-US" sz="1200" b="1" dirty="0">
-                <a:latin typeface="Times New Roman" panose="02020603050405020304" pitchFamily="18" charset="0"/>
-                <a:cs typeface="Times New Roman" panose="02020603050405020304" pitchFamily="18" charset="0"/>
-              </a:rPr>
-              <a:t>parameters.R*</a:t>
-            </a:r>
-            <a:r>
-              <a:rPr lang="en-US" sz="1200" dirty="0">
-                <a:latin typeface="Times New Roman" panose="02020603050405020304" pitchFamily="18" charset="0"/>
-                <a:cs typeface="Times New Roman" panose="02020603050405020304" pitchFamily="18" charset="0"/>
-              </a:rPr>
-              <a:t>: Not included in converter.R</a:t>
-            </a:r>
-            <a:r>
-              <a:rPr lang="en-US" sz="1200" dirty="0">
                 <a:solidFill>
                   <a:schemeClr val="tx1"/>
                 </a:solidFill>
                 <a:latin typeface="Times New Roman" panose="02020603050405020304" pitchFamily="18" charset="0"/>
                 <a:cs typeface="Times New Roman" panose="02020603050405020304" pitchFamily="18" charset="0"/>
               </a:rPr>
-              <a:t>.</a:t>
-            </a:r>
-            <a:endParaRPr lang="en-US" sz="1200" dirty="0">
-              <a:latin typeface="Times New Roman" panose="02020603050405020304" pitchFamily="18" charset="0"/>
-              <a:cs typeface="Times New Roman" panose="02020603050405020304" pitchFamily="18" charset="0"/>
-            </a:endParaRPr>
+              <a:t>sca_nor_fun.R</a:t>
+            </a:r>
+            <a:r>
+              <a:rPr lang="en-US" sz="1200" dirty="0">
+                <a:solidFill>
+                  <a:schemeClr val="tx1"/>
+                </a:solidFill>
+                <a:latin typeface="Times New Roman" panose="02020603050405020304" pitchFamily="18" charset="0"/>
+                <a:cs typeface="Times New Roman" panose="02020603050405020304" pitchFamily="18" charset="0"/>
+              </a:rPr>
+              <a:t>: Declares scaling / normalization functions.</a:t>
+            </a:r>
+          </a:p>
+        </p:txBody>
+      </p:sp>
+      <p:cxnSp>
+        <p:nvCxnSpPr>
+          <p:cNvPr id="34" name="Straight Arrow Connector 33">
+            <a:extLst>
+              <a:ext uri="{FF2B5EF4-FFF2-40B4-BE49-F238E27FC236}">
+                <a16:creationId xmlns:a16="http://schemas.microsoft.com/office/drawing/2014/main" id="{D7A9CDE0-CA41-4289-A132-CA3A9915970E}"/>
+              </a:ext>
+            </a:extLst>
+          </p:cNvPr>
+          <p:cNvCxnSpPr>
+            <a:cxnSpLocks/>
+            <a:stCxn id="33" idx="3"/>
+            <a:endCxn id="50" idx="1"/>
+          </p:cNvCxnSpPr>
+          <p:nvPr/>
+        </p:nvCxnSpPr>
+        <p:spPr>
+          <a:xfrm>
+            <a:off x="2519116" y="3714843"/>
+            <a:ext cx="209350" cy="1"/>
+          </a:xfrm>
+          <a:prstGeom prst="straightConnector1">
+            <a:avLst/>
+          </a:prstGeom>
+          <a:ln>
+            <a:tailEnd type="triangle"/>
+          </a:ln>
+        </p:spPr>
+        <p:style>
+          <a:lnRef idx="1">
+            <a:schemeClr val="accent1"/>
+          </a:lnRef>
+          <a:fillRef idx="0">
+            <a:schemeClr val="accent1"/>
+          </a:fillRef>
+          <a:effectRef idx="0">
+            <a:schemeClr val="accent1"/>
+          </a:effectRef>
+          <a:fontRef idx="minor">
+            <a:schemeClr val="tx1"/>
+          </a:fontRef>
+        </p:style>
+      </p:cxnSp>
+      <p:sp>
+        <p:nvSpPr>
+          <p:cNvPr id="40" name="TextBox 39">
+            <a:extLst>
+              <a:ext uri="{FF2B5EF4-FFF2-40B4-BE49-F238E27FC236}">
+                <a16:creationId xmlns:a16="http://schemas.microsoft.com/office/drawing/2014/main" id="{958CB991-4541-4D29-9ADD-1354203EF18E}"/>
+              </a:ext>
+            </a:extLst>
+          </p:cNvPr>
+          <p:cNvSpPr txBox="1"/>
+          <p:nvPr/>
+        </p:nvSpPr>
+        <p:spPr>
+          <a:xfrm>
+            <a:off x="84504" y="6470870"/>
+            <a:ext cx="2363437" cy="276999"/>
+          </a:xfrm>
+          <a:prstGeom prst="rect">
+            <a:avLst/>
+          </a:prstGeom>
+          <a:solidFill>
+            <a:srgbClr val="D8C2DC"/>
+          </a:solidFill>
+          <a:ln/>
+        </p:spPr>
+        <p:style>
+          <a:lnRef idx="2">
+            <a:schemeClr val="accent1"/>
+          </a:lnRef>
+          <a:fillRef idx="1">
+            <a:schemeClr val="lt1"/>
+          </a:fillRef>
+          <a:effectRef idx="0">
+            <a:schemeClr val="accent1"/>
+          </a:effectRef>
+          <a:fontRef idx="minor">
+            <a:schemeClr val="dk1"/>
+          </a:fontRef>
+        </p:style>
+        <p:txBody>
+          <a:bodyPr wrap="square" rtlCol="0">
+            <a:spAutoFit/>
+          </a:bodyPr>
+          <a:lstStyle/>
+          <a:p>
+            <a:pPr algn="ctr"/>
+            <a:r>
+              <a:rPr lang="en-US" sz="1200" b="1" dirty="0">
+                <a:solidFill>
+                  <a:schemeClr val="tx1"/>
+                </a:solidFill>
+                <a:latin typeface="Times New Roman" panose="02020603050405020304" pitchFamily="18" charset="0"/>
+                <a:cs typeface="Times New Roman" panose="02020603050405020304" pitchFamily="18" charset="0"/>
+              </a:rPr>
+              <a:t>*Has unit tests.</a:t>
+            </a:r>
+          </a:p>
+        </p:txBody>
+      </p:sp>
+      <p:sp>
+        <p:nvSpPr>
+          <p:cNvPr id="45" name="TextBox 44">
+            <a:extLst>
+              <a:ext uri="{FF2B5EF4-FFF2-40B4-BE49-F238E27FC236}">
+                <a16:creationId xmlns:a16="http://schemas.microsoft.com/office/drawing/2014/main" id="{E72BEC92-76D3-4036-8161-FACCC10C6E2A}"/>
+              </a:ext>
+            </a:extLst>
+          </p:cNvPr>
+          <p:cNvSpPr txBox="1"/>
+          <p:nvPr/>
+        </p:nvSpPr>
+        <p:spPr>
+          <a:xfrm>
+            <a:off x="155679" y="3940126"/>
+            <a:ext cx="2363437" cy="276999"/>
+          </a:xfrm>
+          <a:prstGeom prst="rect">
+            <a:avLst/>
+          </a:prstGeom>
+          <a:solidFill>
+            <a:schemeClr val="accent1">
+              <a:lumMod val="20000"/>
+              <a:lumOff val="80000"/>
+            </a:schemeClr>
+          </a:solidFill>
+          <a:ln/>
+        </p:spPr>
+        <p:style>
+          <a:lnRef idx="2">
+            <a:schemeClr val="accent1"/>
+          </a:lnRef>
+          <a:fillRef idx="1">
+            <a:schemeClr val="lt1"/>
+          </a:fillRef>
+          <a:effectRef idx="0">
+            <a:schemeClr val="accent1"/>
+          </a:effectRef>
+          <a:fontRef idx="minor">
+            <a:schemeClr val="dk1"/>
+          </a:fontRef>
+        </p:style>
+        <p:txBody>
+          <a:bodyPr wrap="square" rtlCol="0">
+            <a:spAutoFit/>
+          </a:bodyPr>
+          <a:lstStyle/>
+          <a:p>
+            <a:pPr algn="ctr"/>
+            <a:r>
+              <a:rPr lang="en-US" sz="1200" dirty="0">
+                <a:solidFill>
+                  <a:schemeClr val="tx1"/>
+                </a:solidFill>
+                <a:latin typeface="Times New Roman" panose="02020603050405020304" pitchFamily="18" charset="0"/>
+                <a:cs typeface="Times New Roman" panose="02020603050405020304" pitchFamily="18" charset="0"/>
+              </a:rPr>
+              <a:t>library(limma)</a:t>
+            </a:r>
+          </a:p>
+        </p:txBody>
+      </p:sp>
+      <p:sp>
+        <p:nvSpPr>
+          <p:cNvPr id="46" name="TextBox 45">
+            <a:extLst>
+              <a:ext uri="{FF2B5EF4-FFF2-40B4-BE49-F238E27FC236}">
+                <a16:creationId xmlns:a16="http://schemas.microsoft.com/office/drawing/2014/main" id="{594EF328-46BE-46EE-B6F6-4D322FF359AF}"/>
+              </a:ext>
+            </a:extLst>
+          </p:cNvPr>
+          <p:cNvSpPr txBox="1"/>
+          <p:nvPr/>
+        </p:nvSpPr>
+        <p:spPr>
+          <a:xfrm>
+            <a:off x="5266800" y="2883847"/>
+            <a:ext cx="2363437" cy="276999"/>
+          </a:xfrm>
+          <a:prstGeom prst="rect">
+            <a:avLst/>
+          </a:prstGeom>
+          <a:solidFill>
+            <a:schemeClr val="accent1">
+              <a:lumMod val="20000"/>
+              <a:lumOff val="80000"/>
+            </a:schemeClr>
+          </a:solidFill>
+          <a:ln/>
+        </p:spPr>
+        <p:style>
+          <a:lnRef idx="2">
+            <a:schemeClr val="accent1"/>
+          </a:lnRef>
+          <a:fillRef idx="1">
+            <a:schemeClr val="lt1"/>
+          </a:fillRef>
+          <a:effectRef idx="0">
+            <a:schemeClr val="accent1"/>
+          </a:effectRef>
+          <a:fontRef idx="minor">
+            <a:schemeClr val="dk1"/>
+          </a:fontRef>
+        </p:style>
+        <p:txBody>
+          <a:bodyPr wrap="square" rtlCol="0">
+            <a:spAutoFit/>
+          </a:bodyPr>
+          <a:lstStyle/>
+          <a:p>
+            <a:pPr algn="ctr"/>
+            <a:r>
+              <a:rPr lang="en-US" sz="1200" dirty="0">
+                <a:solidFill>
+                  <a:schemeClr val="tx1"/>
+                </a:solidFill>
+                <a:latin typeface="Times New Roman" panose="02020603050405020304" pitchFamily="18" charset="0"/>
+                <a:cs typeface="Times New Roman" panose="02020603050405020304" pitchFamily="18" charset="0"/>
+              </a:rPr>
+              <a:t>library(aws.s3)</a:t>
+            </a:r>
+          </a:p>
+        </p:txBody>
+      </p:sp>
+      <p:sp>
+        <p:nvSpPr>
+          <p:cNvPr id="49" name="TextBox 48">
+            <a:extLst>
+              <a:ext uri="{FF2B5EF4-FFF2-40B4-BE49-F238E27FC236}">
+                <a16:creationId xmlns:a16="http://schemas.microsoft.com/office/drawing/2014/main" id="{A7EA7F8B-331A-4065-90D3-B478790CF16F}"/>
+              </a:ext>
+            </a:extLst>
+          </p:cNvPr>
+          <p:cNvSpPr txBox="1"/>
+          <p:nvPr/>
+        </p:nvSpPr>
+        <p:spPr>
+          <a:xfrm>
+            <a:off x="5259921" y="1118823"/>
+            <a:ext cx="2363437" cy="276999"/>
+          </a:xfrm>
+          <a:prstGeom prst="rect">
+            <a:avLst/>
+          </a:prstGeom>
+          <a:solidFill>
+            <a:schemeClr val="accent1">
+              <a:lumMod val="20000"/>
+              <a:lumOff val="80000"/>
+            </a:schemeClr>
+          </a:solidFill>
+          <a:ln/>
+        </p:spPr>
+        <p:style>
+          <a:lnRef idx="2">
+            <a:schemeClr val="accent1"/>
+          </a:lnRef>
+          <a:fillRef idx="1">
+            <a:schemeClr val="lt1"/>
+          </a:fillRef>
+          <a:effectRef idx="0">
+            <a:schemeClr val="accent1"/>
+          </a:effectRef>
+          <a:fontRef idx="minor">
+            <a:schemeClr val="dk1"/>
+          </a:fontRef>
+        </p:style>
+        <p:txBody>
+          <a:bodyPr wrap="square" rtlCol="0">
+            <a:spAutoFit/>
+          </a:bodyPr>
+          <a:lstStyle/>
+          <a:p>
+            <a:pPr algn="ctr"/>
+            <a:r>
+              <a:rPr lang="en-US" sz="1200" dirty="0">
+                <a:solidFill>
+                  <a:schemeClr val="tx1"/>
+                </a:solidFill>
+                <a:latin typeface="Times New Roman" panose="02020603050405020304" pitchFamily="18" charset="0"/>
+                <a:cs typeface="Times New Roman" panose="02020603050405020304" pitchFamily="18" charset="0"/>
+              </a:rPr>
+              <a:t>library(stringi)</a:t>
+            </a:r>
+          </a:p>
+        </p:txBody>
+      </p:sp>
+      <p:sp>
+        <p:nvSpPr>
+          <p:cNvPr id="54" name="TextBox 53">
+            <a:extLst>
+              <a:ext uri="{FF2B5EF4-FFF2-40B4-BE49-F238E27FC236}">
+                <a16:creationId xmlns:a16="http://schemas.microsoft.com/office/drawing/2014/main" id="{B9A9D995-A727-4999-95D8-89EBF3439DE8}"/>
+              </a:ext>
+            </a:extLst>
+          </p:cNvPr>
+          <p:cNvSpPr txBox="1"/>
+          <p:nvPr/>
+        </p:nvSpPr>
+        <p:spPr>
+          <a:xfrm>
+            <a:off x="10391809" y="5470362"/>
+            <a:ext cx="2476926" cy="1015663"/>
+          </a:xfrm>
+          <a:prstGeom prst="rect">
+            <a:avLst/>
+          </a:prstGeom>
+          <a:solidFill>
+            <a:schemeClr val="accent1">
+              <a:lumMod val="20000"/>
+              <a:lumOff val="80000"/>
+            </a:schemeClr>
+          </a:solidFill>
+          <a:ln/>
+        </p:spPr>
+        <p:style>
+          <a:lnRef idx="2">
+            <a:schemeClr val="accent1"/>
+          </a:lnRef>
+          <a:fillRef idx="1">
+            <a:schemeClr val="lt1"/>
+          </a:fillRef>
+          <a:effectRef idx="0">
+            <a:schemeClr val="accent1"/>
+          </a:effectRef>
+          <a:fontRef idx="minor">
+            <a:schemeClr val="dk1"/>
+          </a:fontRef>
+        </p:style>
+        <p:txBody>
+          <a:bodyPr wrap="square" rtlCol="0">
+            <a:spAutoFit/>
+          </a:bodyPr>
+          <a:lstStyle/>
+          <a:p>
+            <a:pPr algn="ctr"/>
+            <a:r>
+              <a:rPr lang="en-US" sz="1200" dirty="0">
+                <a:solidFill>
+                  <a:schemeClr val="tx1"/>
+                </a:solidFill>
+                <a:latin typeface="Times New Roman" panose="02020603050405020304" pitchFamily="18" charset="0"/>
+                <a:cs typeface="Times New Roman" panose="02020603050405020304" pitchFamily="18" charset="0"/>
+              </a:rPr>
+              <a:t>library(</a:t>
+            </a:r>
+            <a:r>
+              <a:rPr lang="en-US" sz="1200" dirty="0" err="1">
+                <a:solidFill>
+                  <a:schemeClr val="tx1"/>
+                </a:solidFill>
+                <a:latin typeface="Times New Roman" panose="02020603050405020304" pitchFamily="18" charset="0"/>
+                <a:cs typeface="Times New Roman" panose="02020603050405020304" pitchFamily="18" charset="0"/>
+              </a:rPr>
+              <a:t>viridis</a:t>
+            </a:r>
+            <a:r>
+              <a:rPr lang="en-US" sz="1200" dirty="0">
+                <a:solidFill>
+                  <a:schemeClr val="tx1"/>
+                </a:solidFill>
+                <a:latin typeface="Times New Roman" panose="02020603050405020304" pitchFamily="18" charset="0"/>
+                <a:cs typeface="Times New Roman" panose="02020603050405020304" pitchFamily="18" charset="0"/>
+              </a:rPr>
+              <a:t>), library(ggplot2), library(plotly), library(UpSetR), library(VennDiagram),</a:t>
+            </a:r>
+          </a:p>
+          <a:p>
+            <a:pPr algn="ctr"/>
+            <a:r>
+              <a:rPr lang="en-US" sz="1200" dirty="0">
+                <a:solidFill>
+                  <a:schemeClr val="tx1"/>
+                </a:solidFill>
+                <a:latin typeface="Times New Roman" panose="02020603050405020304" pitchFamily="18" charset="0"/>
+                <a:cs typeface="Times New Roman" panose="02020603050405020304" pitchFamily="18" charset="0"/>
+              </a:rPr>
+              <a:t>library(beeswarm),  library(heatmaply), library(DT)</a:t>
+            </a:r>
+          </a:p>
+        </p:txBody>
+      </p:sp>
+      <p:sp>
+        <p:nvSpPr>
+          <p:cNvPr id="56" name="TextBox 55">
+            <a:extLst>
+              <a:ext uri="{FF2B5EF4-FFF2-40B4-BE49-F238E27FC236}">
+                <a16:creationId xmlns:a16="http://schemas.microsoft.com/office/drawing/2014/main" id="{7822B8AA-2875-418F-8908-0D7DB347535D}"/>
+              </a:ext>
+            </a:extLst>
+          </p:cNvPr>
+          <p:cNvSpPr txBox="1"/>
+          <p:nvPr/>
+        </p:nvSpPr>
+        <p:spPr>
+          <a:xfrm>
+            <a:off x="7804484" y="4134368"/>
+            <a:ext cx="2363424" cy="461665"/>
+          </a:xfrm>
+          <a:prstGeom prst="rect">
+            <a:avLst/>
+          </a:prstGeom>
+          <a:solidFill>
+            <a:schemeClr val="accent1">
+              <a:lumMod val="20000"/>
+              <a:lumOff val="80000"/>
+            </a:schemeClr>
+          </a:solidFill>
+          <a:ln/>
+        </p:spPr>
+        <p:style>
+          <a:lnRef idx="2">
+            <a:schemeClr val="accent1"/>
+          </a:lnRef>
+          <a:fillRef idx="1">
+            <a:schemeClr val="lt1"/>
+          </a:fillRef>
+          <a:effectRef idx="0">
+            <a:schemeClr val="accent1"/>
+          </a:effectRef>
+          <a:fontRef idx="minor">
+            <a:schemeClr val="dk1"/>
+          </a:fontRef>
+        </p:style>
+        <p:txBody>
+          <a:bodyPr wrap="square" rtlCol="0">
+            <a:spAutoFit/>
+          </a:bodyPr>
+          <a:lstStyle/>
+          <a:p>
+            <a:pPr algn="ctr"/>
+            <a:r>
+              <a:rPr lang="en-US" sz="1200" dirty="0">
+                <a:solidFill>
+                  <a:schemeClr val="tx1"/>
+                </a:solidFill>
+                <a:latin typeface="Times New Roman" panose="02020603050405020304" pitchFamily="18" charset="0"/>
+                <a:cs typeface="Times New Roman" panose="02020603050405020304" pitchFamily="18" charset="0"/>
+              </a:rPr>
+              <a:t>library(shinyjs), library(shinydashboard)</a:t>
+            </a:r>
+          </a:p>
+        </p:txBody>
+      </p:sp>
+      <p:sp>
+        <p:nvSpPr>
+          <p:cNvPr id="59" name="TextBox 58">
+            <a:extLst>
+              <a:ext uri="{FF2B5EF4-FFF2-40B4-BE49-F238E27FC236}">
+                <a16:creationId xmlns:a16="http://schemas.microsoft.com/office/drawing/2014/main" id="{C9C150DD-F239-4C59-AA92-42F5C818089B}"/>
+              </a:ext>
+            </a:extLst>
+          </p:cNvPr>
+          <p:cNvSpPr txBox="1"/>
+          <p:nvPr/>
+        </p:nvSpPr>
+        <p:spPr>
+          <a:xfrm>
+            <a:off x="10391809" y="4639365"/>
+            <a:ext cx="2476926" cy="830997"/>
+          </a:xfrm>
+          <a:prstGeom prst="rect">
+            <a:avLst/>
+          </a:prstGeom>
+          <a:solidFill>
+            <a:srgbClr val="FFC5C5"/>
+          </a:solidFill>
+          <a:ln/>
+        </p:spPr>
+        <p:style>
+          <a:lnRef idx="2">
+            <a:schemeClr val="accent1"/>
+          </a:lnRef>
+          <a:fillRef idx="1">
+            <a:schemeClr val="lt1"/>
+          </a:fillRef>
+          <a:effectRef idx="0">
+            <a:schemeClr val="accent1"/>
+          </a:effectRef>
+          <a:fontRef idx="minor">
+            <a:schemeClr val="dk1"/>
+          </a:fontRef>
+        </p:style>
+        <p:txBody>
+          <a:bodyPr wrap="square" rtlCol="0">
+            <a:spAutoFit/>
+          </a:bodyPr>
+          <a:lstStyle/>
+          <a:p>
+            <a:pPr algn="ctr"/>
+            <a:r>
+              <a:rPr lang="en-US" sz="1200" b="1" dirty="0">
+                <a:solidFill>
+                  <a:schemeClr val="tx1"/>
+                </a:solidFill>
+                <a:latin typeface="Times New Roman" panose="02020603050405020304" pitchFamily="18" charset="0"/>
+                <a:cs typeface="Times New Roman" panose="02020603050405020304" pitchFamily="18" charset="0"/>
+              </a:rPr>
+              <a:t>plotting.R*</a:t>
+            </a:r>
+            <a:r>
+              <a:rPr lang="en-US" sz="1200" dirty="0">
+                <a:solidFill>
+                  <a:schemeClr val="tx1"/>
+                </a:solidFill>
+                <a:latin typeface="Times New Roman" panose="02020603050405020304" pitchFamily="18" charset="0"/>
+                <a:cs typeface="Times New Roman" panose="02020603050405020304" pitchFamily="18" charset="0"/>
+              </a:rPr>
+              <a:t>: Makes ggplot2, plotly, boxplot / beeswarm, DT, UpSetR, heatmaply, and Venn Diagram objects for Shiny applications.</a:t>
+            </a:r>
+          </a:p>
+        </p:txBody>
+      </p:sp>
+      <p:cxnSp>
+        <p:nvCxnSpPr>
+          <p:cNvPr id="62" name="Straight Arrow Connector 61">
+            <a:extLst>
+              <a:ext uri="{FF2B5EF4-FFF2-40B4-BE49-F238E27FC236}">
+                <a16:creationId xmlns:a16="http://schemas.microsoft.com/office/drawing/2014/main" id="{130E0494-7416-4E9A-84F3-F779A6FD4B60}"/>
+              </a:ext>
+            </a:extLst>
+          </p:cNvPr>
+          <p:cNvCxnSpPr>
+            <a:cxnSpLocks/>
+            <a:stCxn id="59" idx="1"/>
+            <a:endCxn id="91" idx="3"/>
+          </p:cNvCxnSpPr>
+          <p:nvPr/>
+        </p:nvCxnSpPr>
+        <p:spPr>
+          <a:xfrm flipH="1">
+            <a:off x="10157556" y="5054864"/>
+            <a:ext cx="234253" cy="847580"/>
+          </a:xfrm>
+          <a:prstGeom prst="straightConnector1">
+            <a:avLst/>
+          </a:prstGeom>
+          <a:ln>
+            <a:tailEnd type="triangle"/>
+          </a:ln>
+        </p:spPr>
+        <p:style>
+          <a:lnRef idx="1">
+            <a:schemeClr val="accent1"/>
+          </a:lnRef>
+          <a:fillRef idx="0">
+            <a:schemeClr val="accent1"/>
+          </a:fillRef>
+          <a:effectRef idx="0">
+            <a:schemeClr val="accent1"/>
+          </a:effectRef>
+          <a:fontRef idx="minor">
+            <a:schemeClr val="tx1"/>
+          </a:fontRef>
+        </p:style>
+      </p:cxnSp>
+      <p:sp>
+        <p:nvSpPr>
+          <p:cNvPr id="63" name="TextBox 62">
+            <a:extLst>
+              <a:ext uri="{FF2B5EF4-FFF2-40B4-BE49-F238E27FC236}">
+                <a16:creationId xmlns:a16="http://schemas.microsoft.com/office/drawing/2014/main" id="{1FA21350-8FE0-4C16-B2E6-F797B6173834}"/>
+              </a:ext>
+            </a:extLst>
+          </p:cNvPr>
+          <p:cNvSpPr txBox="1"/>
+          <p:nvPr/>
+        </p:nvSpPr>
+        <p:spPr>
+          <a:xfrm>
+            <a:off x="5217725" y="6525570"/>
+            <a:ext cx="2476926" cy="276999"/>
+          </a:xfrm>
+          <a:prstGeom prst="rect">
+            <a:avLst/>
+          </a:prstGeom>
+          <a:solidFill>
+            <a:schemeClr val="accent1">
+              <a:lumMod val="20000"/>
+              <a:lumOff val="80000"/>
+            </a:schemeClr>
+          </a:solidFill>
+          <a:ln/>
+        </p:spPr>
+        <p:style>
+          <a:lnRef idx="2">
+            <a:schemeClr val="accent1"/>
+          </a:lnRef>
+          <a:fillRef idx="1">
+            <a:schemeClr val="lt1"/>
+          </a:fillRef>
+          <a:effectRef idx="0">
+            <a:schemeClr val="accent1"/>
+          </a:effectRef>
+          <a:fontRef idx="minor">
+            <a:schemeClr val="dk1"/>
+          </a:fontRef>
+        </p:style>
+        <p:txBody>
+          <a:bodyPr wrap="square" rtlCol="0">
+            <a:spAutoFit/>
+          </a:bodyPr>
+          <a:lstStyle/>
+          <a:p>
+            <a:pPr algn="ctr"/>
+            <a:r>
+              <a:rPr lang="en-US" sz="1200" dirty="0">
+                <a:solidFill>
+                  <a:schemeClr val="tx1"/>
+                </a:solidFill>
+                <a:latin typeface="Times New Roman" panose="02020603050405020304" pitchFamily="18" charset="0"/>
+                <a:cs typeface="Times New Roman" panose="02020603050405020304" pitchFamily="18" charset="0"/>
+              </a:rPr>
+              <a:t>library(</a:t>
+            </a:r>
+            <a:r>
+              <a:rPr lang="en-US" sz="1200" dirty="0" err="1">
+                <a:solidFill>
+                  <a:schemeClr val="tx1"/>
+                </a:solidFill>
+                <a:latin typeface="Times New Roman" panose="02020603050405020304" pitchFamily="18" charset="0"/>
+                <a:cs typeface="Times New Roman" panose="02020603050405020304" pitchFamily="18" charset="0"/>
+              </a:rPr>
+              <a:t>bcrypt</a:t>
+            </a:r>
+            <a:r>
+              <a:rPr lang="en-US" sz="1200" dirty="0">
+                <a:solidFill>
+                  <a:schemeClr val="tx1"/>
+                </a:solidFill>
+                <a:latin typeface="Times New Roman" panose="02020603050405020304" pitchFamily="18" charset="0"/>
+                <a:cs typeface="Times New Roman" panose="02020603050405020304" pitchFamily="18" charset="0"/>
+              </a:rPr>
+              <a:t>)</a:t>
+            </a:r>
+          </a:p>
+        </p:txBody>
+      </p:sp>
+      <p:sp>
+        <p:nvSpPr>
+          <p:cNvPr id="64" name="TextBox 63">
+            <a:extLst>
+              <a:ext uri="{FF2B5EF4-FFF2-40B4-BE49-F238E27FC236}">
+                <a16:creationId xmlns:a16="http://schemas.microsoft.com/office/drawing/2014/main" id="{4C573B83-433F-4431-9FB2-152F211F8AB0}"/>
+              </a:ext>
+            </a:extLst>
+          </p:cNvPr>
+          <p:cNvSpPr txBox="1"/>
+          <p:nvPr/>
+        </p:nvSpPr>
+        <p:spPr>
+          <a:xfrm>
+            <a:off x="5259920" y="5053945"/>
+            <a:ext cx="2363435" cy="830997"/>
+          </a:xfrm>
+          <a:prstGeom prst="rect">
+            <a:avLst/>
+          </a:prstGeom>
+          <a:solidFill>
+            <a:schemeClr val="accent1">
+              <a:lumMod val="20000"/>
+              <a:lumOff val="80000"/>
+            </a:schemeClr>
+          </a:solidFill>
+          <a:ln/>
+        </p:spPr>
+        <p:style>
+          <a:lnRef idx="2">
+            <a:schemeClr val="accent1"/>
+          </a:lnRef>
+          <a:fillRef idx="1">
+            <a:schemeClr val="lt1"/>
+          </a:fillRef>
+          <a:effectRef idx="0">
+            <a:schemeClr val="accent1"/>
+          </a:effectRef>
+          <a:fontRef idx="minor">
+            <a:schemeClr val="dk1"/>
+          </a:fontRef>
+        </p:style>
+        <p:txBody>
+          <a:bodyPr wrap="square" rtlCol="0">
+            <a:spAutoFit/>
+          </a:bodyPr>
+          <a:lstStyle/>
+          <a:p>
+            <a:pPr algn="ctr"/>
+            <a:r>
+              <a:rPr lang="en-US" sz="1200" dirty="0">
+                <a:solidFill>
+                  <a:schemeClr val="tx1"/>
+                </a:solidFill>
+                <a:latin typeface="Times New Roman" panose="02020603050405020304" pitchFamily="18" charset="0"/>
+                <a:cs typeface="Times New Roman" panose="02020603050405020304" pitchFamily="18" charset="0"/>
+              </a:rPr>
+              <a:t>library(reticulate), library(tensorflow), library(keras), library(phateR), library(umap), library(Rtsne), library(Matrix)</a:t>
+            </a:r>
+          </a:p>
+        </p:txBody>
+      </p:sp>
+      <p:sp>
+        <p:nvSpPr>
+          <p:cNvPr id="65" name="TextBox 64">
+            <a:extLst>
+              <a:ext uri="{FF2B5EF4-FFF2-40B4-BE49-F238E27FC236}">
+                <a16:creationId xmlns:a16="http://schemas.microsoft.com/office/drawing/2014/main" id="{612FA4AC-40BD-44CC-84D2-2B9B9081BC58}"/>
+              </a:ext>
+            </a:extLst>
+          </p:cNvPr>
+          <p:cNvSpPr txBox="1"/>
+          <p:nvPr/>
+        </p:nvSpPr>
+        <p:spPr>
+          <a:xfrm>
+            <a:off x="7804483" y="2697125"/>
+            <a:ext cx="2363424" cy="461665"/>
+          </a:xfrm>
+          <a:prstGeom prst="rect">
+            <a:avLst/>
+          </a:prstGeom>
+          <a:solidFill>
+            <a:schemeClr val="accent1">
+              <a:lumMod val="20000"/>
+              <a:lumOff val="80000"/>
+            </a:schemeClr>
+          </a:solidFill>
+          <a:ln/>
+        </p:spPr>
+        <p:style>
+          <a:lnRef idx="2">
+            <a:schemeClr val="accent1"/>
+          </a:lnRef>
+          <a:fillRef idx="1">
+            <a:schemeClr val="lt1"/>
+          </a:fillRef>
+          <a:effectRef idx="0">
+            <a:schemeClr val="accent1"/>
+          </a:effectRef>
+          <a:fontRef idx="minor">
+            <a:schemeClr val="dk1"/>
+          </a:fontRef>
+        </p:style>
+        <p:txBody>
+          <a:bodyPr wrap="square" rtlCol="0">
+            <a:spAutoFit/>
+          </a:bodyPr>
+          <a:lstStyle/>
+          <a:p>
+            <a:pPr algn="ctr"/>
+            <a:r>
+              <a:rPr lang="en-US" sz="1200" dirty="0">
+                <a:solidFill>
+                  <a:schemeClr val="tx1"/>
+                </a:solidFill>
+                <a:latin typeface="Times New Roman" panose="02020603050405020304" pitchFamily="18" charset="0"/>
+                <a:cs typeface="Times New Roman" panose="02020603050405020304" pitchFamily="18" charset="0"/>
+              </a:rPr>
+              <a:t>library(shinycssloaders), library(shinywidgets)</a:t>
+            </a:r>
           </a:p>
         </p:txBody>
       </p:sp>

</xml_diff>

<commit_message>
improved figure, fixed a bug
</commit_message>
<xml_diff>
--- a/extras/Explorer_Tool_Workflow_2.pptx
+++ b/extras/Explorer_Tool_Workflow_2.pptx
@@ -7,6 +7,7 @@
   <p:sldIdLst>
     <p:sldId id="256" r:id="rId2"/>
     <p:sldId id="257" r:id="rId3"/>
+    <p:sldId id="258" r:id="rId4"/>
   </p:sldIdLst>
   <p:sldSz cx="12192000" cy="6858000"/>
   <p:notesSz cx="6858000" cy="9144000"/>
@@ -260,7 +261,7 @@
           <a:p>
             <a:fld id="{1560D20A-E720-4ECB-907E-0F9EBDE75356}" type="datetimeFigureOut">
               <a:rPr lang="en-US" smtClean="0"/>
-              <a:t>2/23/2022</a:t>
+              <a:t>2/24/2022</a:t>
             </a:fld>
             <a:endParaRPr lang="en-US"/>
           </a:p>
@@ -458,7 +459,7 @@
           <a:p>
             <a:fld id="{1560D20A-E720-4ECB-907E-0F9EBDE75356}" type="datetimeFigureOut">
               <a:rPr lang="en-US" smtClean="0"/>
-              <a:t>2/23/2022</a:t>
+              <a:t>2/24/2022</a:t>
             </a:fld>
             <a:endParaRPr lang="en-US"/>
           </a:p>
@@ -666,7 +667,7 @@
           <a:p>
             <a:fld id="{1560D20A-E720-4ECB-907E-0F9EBDE75356}" type="datetimeFigureOut">
               <a:rPr lang="en-US" smtClean="0"/>
-              <a:t>2/23/2022</a:t>
+              <a:t>2/24/2022</a:t>
             </a:fld>
             <a:endParaRPr lang="en-US"/>
           </a:p>
@@ -864,7 +865,7 @@
           <a:p>
             <a:fld id="{1560D20A-E720-4ECB-907E-0F9EBDE75356}" type="datetimeFigureOut">
               <a:rPr lang="en-US" smtClean="0"/>
-              <a:t>2/23/2022</a:t>
+              <a:t>2/24/2022</a:t>
             </a:fld>
             <a:endParaRPr lang="en-US"/>
           </a:p>
@@ -1139,7 +1140,7 @@
           <a:p>
             <a:fld id="{1560D20A-E720-4ECB-907E-0F9EBDE75356}" type="datetimeFigureOut">
               <a:rPr lang="en-US" smtClean="0"/>
-              <a:t>2/23/2022</a:t>
+              <a:t>2/24/2022</a:t>
             </a:fld>
             <a:endParaRPr lang="en-US"/>
           </a:p>
@@ -1404,7 +1405,7 @@
           <a:p>
             <a:fld id="{1560D20A-E720-4ECB-907E-0F9EBDE75356}" type="datetimeFigureOut">
               <a:rPr lang="en-US" smtClean="0"/>
-              <a:t>2/23/2022</a:t>
+              <a:t>2/24/2022</a:t>
             </a:fld>
             <a:endParaRPr lang="en-US"/>
           </a:p>
@@ -1816,7 +1817,7 @@
           <a:p>
             <a:fld id="{1560D20A-E720-4ECB-907E-0F9EBDE75356}" type="datetimeFigureOut">
               <a:rPr lang="en-US" smtClean="0"/>
-              <a:t>2/23/2022</a:t>
+              <a:t>2/24/2022</a:t>
             </a:fld>
             <a:endParaRPr lang="en-US"/>
           </a:p>
@@ -1957,7 +1958,7 @@
           <a:p>
             <a:fld id="{1560D20A-E720-4ECB-907E-0F9EBDE75356}" type="datetimeFigureOut">
               <a:rPr lang="en-US" smtClean="0"/>
-              <a:t>2/23/2022</a:t>
+              <a:t>2/24/2022</a:t>
             </a:fld>
             <a:endParaRPr lang="en-US"/>
           </a:p>
@@ -2070,7 +2071,7 @@
           <a:p>
             <a:fld id="{1560D20A-E720-4ECB-907E-0F9EBDE75356}" type="datetimeFigureOut">
               <a:rPr lang="en-US" smtClean="0"/>
-              <a:t>2/23/2022</a:t>
+              <a:t>2/24/2022</a:t>
             </a:fld>
             <a:endParaRPr lang="en-US"/>
           </a:p>
@@ -2381,7 +2382,7 @@
           <a:p>
             <a:fld id="{1560D20A-E720-4ECB-907E-0F9EBDE75356}" type="datetimeFigureOut">
               <a:rPr lang="en-US" smtClean="0"/>
-              <a:t>2/23/2022</a:t>
+              <a:t>2/24/2022</a:t>
             </a:fld>
             <a:endParaRPr lang="en-US"/>
           </a:p>
@@ -2669,7 +2670,7 @@
           <a:p>
             <a:fld id="{1560D20A-E720-4ECB-907E-0F9EBDE75356}" type="datetimeFigureOut">
               <a:rPr lang="en-US" smtClean="0"/>
-              <a:t>2/23/2022</a:t>
+              <a:t>2/24/2022</a:t>
             </a:fld>
             <a:endParaRPr lang="en-US"/>
           </a:p>
@@ -2910,7 +2911,7 @@
           <a:p>
             <a:fld id="{1560D20A-E720-4ECB-907E-0F9EBDE75356}" type="datetimeFigureOut">
               <a:rPr lang="en-US" smtClean="0"/>
-              <a:t>2/23/2022</a:t>
+              <a:t>2/24/2022</a:t>
             </a:fld>
             <a:endParaRPr lang="en-US"/>
           </a:p>
@@ -8561,6 +8562,1399 @@
 </p:sld>
 </file>
 
+<file path=ppt/slides/slide3.xml><?xml version="1.0" encoding="utf-8"?>
+<p:sld xmlns:a="http://schemas.openxmlformats.org/drawingml/2006/main" xmlns:r="http://schemas.openxmlformats.org/officeDocument/2006/relationships" xmlns:p="http://schemas.openxmlformats.org/presentationml/2006/main">
+  <p:cSld>
+    <p:spTree>
+      <p:nvGrpSpPr>
+        <p:cNvPr id="1" name=""/>
+        <p:cNvGrpSpPr/>
+        <p:nvPr/>
+      </p:nvGrpSpPr>
+      <p:grpSpPr>
+        <a:xfrm>
+          <a:off x="0" y="0"/>
+          <a:ext cx="0" cy="0"/>
+          <a:chOff x="0" y="0"/>
+          <a:chExt cx="0" cy="0"/>
+        </a:xfrm>
+      </p:grpSpPr>
+      <p:pic>
+        <p:nvPicPr>
+          <p:cNvPr id="6" name="Picture 5">
+            <a:extLst>
+              <a:ext uri="{FF2B5EF4-FFF2-40B4-BE49-F238E27FC236}">
+                <a16:creationId xmlns:a16="http://schemas.microsoft.com/office/drawing/2014/main" id="{EE2157D2-151A-43D7-8210-247EE8C61730}"/>
+              </a:ext>
+            </a:extLst>
+          </p:cNvPr>
+          <p:cNvPicPr>
+            <a:picLocks noChangeAspect="1"/>
+          </p:cNvPicPr>
+          <p:nvPr/>
+        </p:nvPicPr>
+        <p:blipFill>
+          <a:blip r:embed="rId2"/>
+          <a:stretch>
+            <a:fillRect/>
+          </a:stretch>
+        </p:blipFill>
+        <p:spPr>
+          <a:xfrm>
+            <a:off x="107602" y="111369"/>
+            <a:ext cx="4423479" cy="2573215"/>
+          </a:xfrm>
+          <a:prstGeom prst="rect">
+            <a:avLst/>
+          </a:prstGeom>
+        </p:spPr>
+      </p:pic>
+      <p:pic>
+        <p:nvPicPr>
+          <p:cNvPr id="8" name="Picture 7">
+            <a:extLst>
+              <a:ext uri="{FF2B5EF4-FFF2-40B4-BE49-F238E27FC236}">
+                <a16:creationId xmlns:a16="http://schemas.microsoft.com/office/drawing/2014/main" id="{ED16A521-B0F3-4C26-9B91-6F18D3DEA885}"/>
+              </a:ext>
+            </a:extLst>
+          </p:cNvPr>
+          <p:cNvPicPr>
+            <a:picLocks noChangeAspect="1"/>
+          </p:cNvPicPr>
+          <p:nvPr/>
+        </p:nvPicPr>
+        <p:blipFill>
+          <a:blip r:embed="rId3"/>
+          <a:stretch>
+            <a:fillRect/>
+          </a:stretch>
+        </p:blipFill>
+        <p:spPr>
+          <a:xfrm>
+            <a:off x="107602" y="2964086"/>
+            <a:ext cx="4378569" cy="1152565"/>
+          </a:xfrm>
+          <a:prstGeom prst="rect">
+            <a:avLst/>
+          </a:prstGeom>
+        </p:spPr>
+      </p:pic>
+      <p:pic>
+        <p:nvPicPr>
+          <p:cNvPr id="1026" name="Picture 2">
+            <a:extLst>
+              <a:ext uri="{FF2B5EF4-FFF2-40B4-BE49-F238E27FC236}">
+                <a16:creationId xmlns:a16="http://schemas.microsoft.com/office/drawing/2014/main" id="{61A09DD3-F82C-49C8-9D42-F62E03E164A2}"/>
+              </a:ext>
+            </a:extLst>
+          </p:cNvPr>
+          <p:cNvPicPr>
+            <a:picLocks noChangeAspect="1" noChangeArrowheads="1"/>
+          </p:cNvPicPr>
+          <p:nvPr/>
+        </p:nvPicPr>
+        <p:blipFill>
+          <a:blip r:embed="rId4">
+            <a:extLst>
+              <a:ext uri="{28A0092B-C50C-407E-A947-70E740481C1C}">
+                <a14:useLocalDpi xmlns:a14="http://schemas.microsoft.com/office/drawing/2010/main" val="0"/>
+              </a:ext>
+            </a:extLst>
+          </a:blip>
+          <a:srcRect/>
+          <a:stretch>
+            <a:fillRect/>
+          </a:stretch>
+        </p:blipFill>
+        <p:spPr bwMode="auto">
+          <a:xfrm>
+            <a:off x="104646" y="4601921"/>
+            <a:ext cx="3576113" cy="2147903"/>
+          </a:xfrm>
+          <a:prstGeom prst="rect">
+            <a:avLst/>
+          </a:prstGeom>
+          <a:noFill/>
+          <a:extLst>
+            <a:ext uri="{909E8E84-426E-40DD-AFC4-6F175D3DCCD1}">
+              <a14:hiddenFill xmlns:a14="http://schemas.microsoft.com/office/drawing/2010/main">
+                <a:solidFill>
+                  <a:srgbClr val="FFFFFF"/>
+                </a:solidFill>
+              </a14:hiddenFill>
+            </a:ext>
+          </a:extLst>
+        </p:spPr>
+      </p:pic>
+      <p:sp>
+        <p:nvSpPr>
+          <p:cNvPr id="10" name="TextBox 9">
+            <a:extLst>
+              <a:ext uri="{FF2B5EF4-FFF2-40B4-BE49-F238E27FC236}">
+                <a16:creationId xmlns:a16="http://schemas.microsoft.com/office/drawing/2014/main" id="{7F273C64-B7BF-4448-8502-D08F3565864F}"/>
+              </a:ext>
+            </a:extLst>
+          </p:cNvPr>
+          <p:cNvSpPr txBox="1"/>
+          <p:nvPr/>
+        </p:nvSpPr>
+        <p:spPr>
+          <a:xfrm>
+            <a:off x="1277814" y="2684585"/>
+            <a:ext cx="2086709" cy="369332"/>
+          </a:xfrm>
+          <a:prstGeom prst="rect">
+            <a:avLst/>
+          </a:prstGeom>
+          <a:noFill/>
+        </p:spPr>
+        <p:txBody>
+          <a:bodyPr wrap="square" rtlCol="0">
+            <a:spAutoFit/>
+          </a:bodyPr>
+          <a:lstStyle/>
+          <a:p>
+            <a:r>
+              <a:rPr lang="en-US" dirty="0"/>
+              <a:t>Approved Requests</a:t>
+            </a:r>
+          </a:p>
+        </p:txBody>
+      </p:sp>
+      <p:sp>
+        <p:nvSpPr>
+          <p:cNvPr id="67" name="TextBox 66">
+            <a:extLst>
+              <a:ext uri="{FF2B5EF4-FFF2-40B4-BE49-F238E27FC236}">
+                <a16:creationId xmlns:a16="http://schemas.microsoft.com/office/drawing/2014/main" id="{3AAC601C-EF12-4A03-836A-66E9B855CC55}"/>
+              </a:ext>
+            </a:extLst>
+          </p:cNvPr>
+          <p:cNvSpPr txBox="1"/>
+          <p:nvPr/>
+        </p:nvSpPr>
+        <p:spPr>
+          <a:xfrm>
+            <a:off x="915143" y="4211486"/>
+            <a:ext cx="1955117" cy="369332"/>
+          </a:xfrm>
+          <a:prstGeom prst="rect">
+            <a:avLst/>
+          </a:prstGeom>
+          <a:noFill/>
+        </p:spPr>
+        <p:txBody>
+          <a:bodyPr wrap="square" rtlCol="0">
+            <a:spAutoFit/>
+          </a:bodyPr>
+          <a:lstStyle/>
+          <a:p>
+            <a:r>
+              <a:rPr lang="en-US" dirty="0"/>
+              <a:t>Downloading Data</a:t>
+            </a:r>
+          </a:p>
+        </p:txBody>
+      </p:sp>
+      <p:sp>
+        <p:nvSpPr>
+          <p:cNvPr id="11" name="TextBox 10">
+            <a:extLst>
+              <a:ext uri="{FF2B5EF4-FFF2-40B4-BE49-F238E27FC236}">
+                <a16:creationId xmlns:a16="http://schemas.microsoft.com/office/drawing/2014/main" id="{01B5DF31-0CCC-4F71-ABC4-7DC8791019A7}"/>
+              </a:ext>
+            </a:extLst>
+          </p:cNvPr>
+          <p:cNvSpPr txBox="1"/>
+          <p:nvPr/>
+        </p:nvSpPr>
+        <p:spPr>
+          <a:xfrm>
+            <a:off x="4958860" y="1989658"/>
+            <a:ext cx="1236785" cy="369332"/>
+          </a:xfrm>
+          <a:prstGeom prst="rect">
+            <a:avLst/>
+          </a:prstGeom>
+          <a:noFill/>
+        </p:spPr>
+        <p:txBody>
+          <a:bodyPr wrap="square" rtlCol="0">
+            <a:spAutoFit/>
+          </a:bodyPr>
+          <a:lstStyle/>
+          <a:p>
+            <a:r>
+              <a:rPr lang="en-US" dirty="0"/>
+              <a:t>VAE</a:t>
+            </a:r>
+          </a:p>
+        </p:txBody>
+      </p:sp>
+      <p:sp>
+        <p:nvSpPr>
+          <p:cNvPr id="74" name="TextBox 73">
+            <a:extLst>
+              <a:ext uri="{FF2B5EF4-FFF2-40B4-BE49-F238E27FC236}">
+                <a16:creationId xmlns:a16="http://schemas.microsoft.com/office/drawing/2014/main" id="{AB157C85-2902-461F-A5BD-34B39579E3F5}"/>
+              </a:ext>
+            </a:extLst>
+          </p:cNvPr>
+          <p:cNvSpPr txBox="1"/>
+          <p:nvPr/>
+        </p:nvSpPr>
+        <p:spPr>
+          <a:xfrm>
+            <a:off x="4958860" y="1075202"/>
+            <a:ext cx="1236785" cy="369332"/>
+          </a:xfrm>
+          <a:prstGeom prst="rect">
+            <a:avLst/>
+          </a:prstGeom>
+          <a:noFill/>
+        </p:spPr>
+        <p:txBody>
+          <a:bodyPr wrap="square" rtlCol="0">
+            <a:spAutoFit/>
+          </a:bodyPr>
+          <a:lstStyle/>
+          <a:p>
+            <a:r>
+              <a:rPr lang="en-US" dirty="0"/>
+              <a:t>PCA</a:t>
+            </a:r>
+          </a:p>
+        </p:txBody>
+      </p:sp>
+      <p:sp>
+        <p:nvSpPr>
+          <p:cNvPr id="76" name="TextBox 75">
+            <a:extLst>
+              <a:ext uri="{FF2B5EF4-FFF2-40B4-BE49-F238E27FC236}">
+                <a16:creationId xmlns:a16="http://schemas.microsoft.com/office/drawing/2014/main" id="{3A3A3FBE-E0DF-4BE8-949A-742125406FFB}"/>
+              </a:ext>
+            </a:extLst>
+          </p:cNvPr>
+          <p:cNvSpPr txBox="1"/>
+          <p:nvPr/>
+        </p:nvSpPr>
+        <p:spPr>
+          <a:xfrm>
+            <a:off x="4778840" y="2925594"/>
+            <a:ext cx="1236785" cy="369332"/>
+          </a:xfrm>
+          <a:prstGeom prst="rect">
+            <a:avLst/>
+          </a:prstGeom>
+          <a:noFill/>
+        </p:spPr>
+        <p:txBody>
+          <a:bodyPr wrap="square" rtlCol="0">
+            <a:spAutoFit/>
+          </a:bodyPr>
+          <a:lstStyle/>
+          <a:p>
+            <a:r>
+              <a:rPr lang="en-US" dirty="0"/>
+              <a:t>UMAP</a:t>
+            </a:r>
+          </a:p>
+        </p:txBody>
+      </p:sp>
+      <p:sp>
+        <p:nvSpPr>
+          <p:cNvPr id="77" name="TextBox 76">
+            <a:extLst>
+              <a:ext uri="{FF2B5EF4-FFF2-40B4-BE49-F238E27FC236}">
+                <a16:creationId xmlns:a16="http://schemas.microsoft.com/office/drawing/2014/main" id="{6551F882-8C8B-428F-94B8-CCB58D65F014}"/>
+              </a:ext>
+            </a:extLst>
+          </p:cNvPr>
+          <p:cNvSpPr txBox="1"/>
+          <p:nvPr/>
+        </p:nvSpPr>
+        <p:spPr>
+          <a:xfrm>
+            <a:off x="4832061" y="3878217"/>
+            <a:ext cx="1236785" cy="369332"/>
+          </a:xfrm>
+          <a:prstGeom prst="rect">
+            <a:avLst/>
+          </a:prstGeom>
+          <a:noFill/>
+        </p:spPr>
+        <p:txBody>
+          <a:bodyPr wrap="square" rtlCol="0">
+            <a:spAutoFit/>
+          </a:bodyPr>
+          <a:lstStyle/>
+          <a:p>
+            <a:r>
+              <a:rPr lang="en-US" dirty="0"/>
+              <a:t>PHATE</a:t>
+            </a:r>
+          </a:p>
+        </p:txBody>
+      </p:sp>
+      <p:sp>
+        <p:nvSpPr>
+          <p:cNvPr id="78" name="TextBox 77">
+            <a:extLst>
+              <a:ext uri="{FF2B5EF4-FFF2-40B4-BE49-F238E27FC236}">
+                <a16:creationId xmlns:a16="http://schemas.microsoft.com/office/drawing/2014/main" id="{6454D236-2C46-4DFD-9B6A-C640BB9E2A65}"/>
+              </a:ext>
+            </a:extLst>
+          </p:cNvPr>
+          <p:cNvSpPr txBox="1"/>
+          <p:nvPr/>
+        </p:nvSpPr>
+        <p:spPr>
+          <a:xfrm>
+            <a:off x="4948827" y="5164513"/>
+            <a:ext cx="1236785" cy="369332"/>
+          </a:xfrm>
+          <a:prstGeom prst="rect">
+            <a:avLst/>
+          </a:prstGeom>
+          <a:noFill/>
+        </p:spPr>
+        <p:txBody>
+          <a:bodyPr wrap="square" rtlCol="0">
+            <a:spAutoFit/>
+          </a:bodyPr>
+          <a:lstStyle/>
+          <a:p>
+            <a:r>
+              <a:rPr lang="en-US" dirty="0"/>
+              <a:t>UpSetR</a:t>
+            </a:r>
+          </a:p>
+        </p:txBody>
+      </p:sp>
+      <p:sp>
+        <p:nvSpPr>
+          <p:cNvPr id="79" name="TextBox 78">
+            <a:extLst>
+              <a:ext uri="{FF2B5EF4-FFF2-40B4-BE49-F238E27FC236}">
+                <a16:creationId xmlns:a16="http://schemas.microsoft.com/office/drawing/2014/main" id="{3D7DBF15-3B40-4D5C-8F1D-16FC2F6F136C}"/>
+              </a:ext>
+            </a:extLst>
+          </p:cNvPr>
+          <p:cNvSpPr txBox="1"/>
+          <p:nvPr/>
+        </p:nvSpPr>
+        <p:spPr>
+          <a:xfrm>
+            <a:off x="4111390" y="5913275"/>
+            <a:ext cx="1236785" cy="369332"/>
+          </a:xfrm>
+          <a:prstGeom prst="rect">
+            <a:avLst/>
+          </a:prstGeom>
+          <a:noFill/>
+        </p:spPr>
+        <p:txBody>
+          <a:bodyPr wrap="square" rtlCol="0">
+            <a:spAutoFit/>
+          </a:bodyPr>
+          <a:lstStyle/>
+          <a:p>
+            <a:r>
+              <a:rPr lang="en-US"/>
+              <a:t>Sets</a:t>
+            </a:r>
+            <a:endParaRPr lang="en-US" dirty="0"/>
+          </a:p>
+        </p:txBody>
+      </p:sp>
+      <p:sp>
+        <p:nvSpPr>
+          <p:cNvPr id="80" name="TextBox 79">
+            <a:extLst>
+              <a:ext uri="{FF2B5EF4-FFF2-40B4-BE49-F238E27FC236}">
+                <a16:creationId xmlns:a16="http://schemas.microsoft.com/office/drawing/2014/main" id="{E468850B-1982-4129-8C71-0C8ED6457896}"/>
+              </a:ext>
+            </a:extLst>
+          </p:cNvPr>
+          <p:cNvSpPr txBox="1"/>
+          <p:nvPr/>
+        </p:nvSpPr>
+        <p:spPr>
+          <a:xfrm>
+            <a:off x="6414211" y="5162626"/>
+            <a:ext cx="1236785" cy="369332"/>
+          </a:xfrm>
+          <a:prstGeom prst="rect">
+            <a:avLst/>
+          </a:prstGeom>
+          <a:noFill/>
+        </p:spPr>
+        <p:txBody>
+          <a:bodyPr wrap="square" rtlCol="0">
+            <a:spAutoFit/>
+          </a:bodyPr>
+          <a:lstStyle/>
+          <a:p>
+            <a:r>
+              <a:rPr lang="en-US" dirty="0"/>
+              <a:t>Heatmap</a:t>
+            </a:r>
+          </a:p>
+        </p:txBody>
+      </p:sp>
+      <p:sp>
+        <p:nvSpPr>
+          <p:cNvPr id="81" name="TextBox 80">
+            <a:extLst>
+              <a:ext uri="{FF2B5EF4-FFF2-40B4-BE49-F238E27FC236}">
+                <a16:creationId xmlns:a16="http://schemas.microsoft.com/office/drawing/2014/main" id="{8464A318-DA20-47EB-B27B-4B3930AA6FAF}"/>
+              </a:ext>
+            </a:extLst>
+          </p:cNvPr>
+          <p:cNvSpPr txBox="1"/>
+          <p:nvPr/>
+        </p:nvSpPr>
+        <p:spPr>
+          <a:xfrm>
+            <a:off x="7533456" y="5178087"/>
+            <a:ext cx="1740879" cy="369332"/>
+          </a:xfrm>
+          <a:prstGeom prst="rect">
+            <a:avLst/>
+          </a:prstGeom>
+          <a:noFill/>
+        </p:spPr>
+        <p:txBody>
+          <a:bodyPr wrap="square" rtlCol="0">
+            <a:spAutoFit/>
+          </a:bodyPr>
+          <a:lstStyle/>
+          <a:p>
+            <a:r>
+              <a:rPr lang="en-US" dirty="0"/>
+              <a:t>Dendrogram</a:t>
+            </a:r>
+          </a:p>
+        </p:txBody>
+      </p:sp>
+      <p:sp>
+        <p:nvSpPr>
+          <p:cNvPr id="82" name="TextBox 81">
+            <a:extLst>
+              <a:ext uri="{FF2B5EF4-FFF2-40B4-BE49-F238E27FC236}">
+                <a16:creationId xmlns:a16="http://schemas.microsoft.com/office/drawing/2014/main" id="{BCB7BED8-2854-43F0-9021-74026549B244}"/>
+              </a:ext>
+            </a:extLst>
+          </p:cNvPr>
+          <p:cNvSpPr txBox="1"/>
+          <p:nvPr/>
+        </p:nvSpPr>
+        <p:spPr>
+          <a:xfrm>
+            <a:off x="5665617" y="204291"/>
+            <a:ext cx="1359879" cy="369332"/>
+          </a:xfrm>
+          <a:prstGeom prst="rect">
+            <a:avLst/>
+          </a:prstGeom>
+          <a:noFill/>
+        </p:spPr>
+        <p:txBody>
+          <a:bodyPr wrap="square" rtlCol="0">
+            <a:spAutoFit/>
+          </a:bodyPr>
+          <a:lstStyle/>
+          <a:p>
+            <a:r>
+              <a:rPr lang="en-US" dirty="0"/>
+              <a:t>Exploration</a:t>
+            </a:r>
+          </a:p>
+        </p:txBody>
+      </p:sp>
+      <p:sp>
+        <p:nvSpPr>
+          <p:cNvPr id="83" name="TextBox 82">
+            <a:extLst>
+              <a:ext uri="{FF2B5EF4-FFF2-40B4-BE49-F238E27FC236}">
+                <a16:creationId xmlns:a16="http://schemas.microsoft.com/office/drawing/2014/main" id="{2886D174-83DC-4EA4-9E3D-085A999F1726}"/>
+              </a:ext>
+            </a:extLst>
+          </p:cNvPr>
+          <p:cNvSpPr txBox="1"/>
+          <p:nvPr/>
+        </p:nvSpPr>
+        <p:spPr>
+          <a:xfrm>
+            <a:off x="8803607" y="219780"/>
+            <a:ext cx="1359879" cy="369332"/>
+          </a:xfrm>
+          <a:prstGeom prst="rect">
+            <a:avLst/>
+          </a:prstGeom>
+          <a:noFill/>
+        </p:spPr>
+        <p:txBody>
+          <a:bodyPr wrap="square" rtlCol="0">
+            <a:spAutoFit/>
+          </a:bodyPr>
+          <a:lstStyle/>
+          <a:p>
+            <a:r>
+              <a:rPr lang="en-US" dirty="0"/>
+              <a:t>Summary</a:t>
+            </a:r>
+          </a:p>
+        </p:txBody>
+      </p:sp>
+      <p:sp>
+        <p:nvSpPr>
+          <p:cNvPr id="84" name="TextBox 83">
+            <a:extLst>
+              <a:ext uri="{FF2B5EF4-FFF2-40B4-BE49-F238E27FC236}">
+                <a16:creationId xmlns:a16="http://schemas.microsoft.com/office/drawing/2014/main" id="{1DC97BAB-E949-4FAC-862E-831575A2E1E5}"/>
+              </a:ext>
+            </a:extLst>
+          </p:cNvPr>
+          <p:cNvSpPr txBox="1"/>
+          <p:nvPr/>
+        </p:nvSpPr>
+        <p:spPr>
+          <a:xfrm>
+            <a:off x="10274854" y="219780"/>
+            <a:ext cx="932098" cy="369332"/>
+          </a:xfrm>
+          <a:prstGeom prst="rect">
+            <a:avLst/>
+          </a:prstGeom>
+          <a:noFill/>
+        </p:spPr>
+        <p:txBody>
+          <a:bodyPr wrap="square" rtlCol="0">
+            <a:spAutoFit/>
+          </a:bodyPr>
+          <a:lstStyle/>
+          <a:p>
+            <a:r>
+              <a:rPr lang="en-US" dirty="0"/>
+              <a:t>tSNE</a:t>
+            </a:r>
+          </a:p>
+        </p:txBody>
+      </p:sp>
+      <p:sp>
+        <p:nvSpPr>
+          <p:cNvPr id="85" name="TextBox 84">
+            <a:extLst>
+              <a:ext uri="{FF2B5EF4-FFF2-40B4-BE49-F238E27FC236}">
+                <a16:creationId xmlns:a16="http://schemas.microsoft.com/office/drawing/2014/main" id="{6DE4AC19-A1B9-498D-B804-FAE4FB87D430}"/>
+              </a:ext>
+            </a:extLst>
+          </p:cNvPr>
+          <p:cNvSpPr txBox="1"/>
+          <p:nvPr/>
+        </p:nvSpPr>
+        <p:spPr>
+          <a:xfrm>
+            <a:off x="7229939" y="204319"/>
+            <a:ext cx="932098" cy="369332"/>
+          </a:xfrm>
+          <a:prstGeom prst="rect">
+            <a:avLst/>
+          </a:prstGeom>
+          <a:noFill/>
+        </p:spPr>
+        <p:txBody>
+          <a:bodyPr wrap="square" rtlCol="0">
+            <a:spAutoFit/>
+          </a:bodyPr>
+          <a:lstStyle/>
+          <a:p>
+            <a:r>
+              <a:rPr lang="en-US" dirty="0"/>
+              <a:t>Boxplot</a:t>
+            </a:r>
+          </a:p>
+        </p:txBody>
+      </p:sp>
+      <p:pic>
+        <p:nvPicPr>
+          <p:cNvPr id="1031" name="Picture 7" descr="Plot object">
+            <a:extLst>
+              <a:ext uri="{FF2B5EF4-FFF2-40B4-BE49-F238E27FC236}">
+                <a16:creationId xmlns:a16="http://schemas.microsoft.com/office/drawing/2014/main" id="{60424F73-1AD6-4AC1-ADA2-430F924F374C}"/>
+              </a:ext>
+            </a:extLst>
+          </p:cNvPr>
+          <p:cNvPicPr>
+            <a:picLocks noChangeAspect="1" noChangeArrowheads="1"/>
+          </p:cNvPicPr>
+          <p:nvPr/>
+        </p:nvPicPr>
+        <p:blipFill>
+          <a:blip r:embed="rId5">
+            <a:extLst>
+              <a:ext uri="{28A0092B-C50C-407E-A947-70E740481C1C}">
+                <a14:useLocalDpi xmlns:a14="http://schemas.microsoft.com/office/drawing/2010/main" val="0"/>
+              </a:ext>
+            </a:extLst>
+          </a:blip>
+          <a:srcRect/>
+          <a:stretch>
+            <a:fillRect/>
+          </a:stretch>
+        </p:blipFill>
+        <p:spPr bwMode="auto">
+          <a:xfrm>
+            <a:off x="5841023" y="577392"/>
+            <a:ext cx="854164" cy="854164"/>
+          </a:xfrm>
+          <a:prstGeom prst="rect">
+            <a:avLst/>
+          </a:prstGeom>
+          <a:noFill/>
+          <a:extLst>
+            <a:ext uri="{909E8E84-426E-40DD-AFC4-6F175D3DCCD1}">
+              <a14:hiddenFill xmlns:a14="http://schemas.microsoft.com/office/drawing/2010/main">
+                <a:solidFill>
+                  <a:srgbClr val="FFFFFF"/>
+                </a:solidFill>
+              </a14:hiddenFill>
+            </a:ext>
+          </a:extLst>
+        </p:spPr>
+      </p:pic>
+      <p:pic>
+        <p:nvPicPr>
+          <p:cNvPr id="1035" name="Picture 11" descr="Plot object">
+            <a:extLst>
+              <a:ext uri="{FF2B5EF4-FFF2-40B4-BE49-F238E27FC236}">
+                <a16:creationId xmlns:a16="http://schemas.microsoft.com/office/drawing/2014/main" id="{20C9E518-2F5E-42AB-B243-2716BDF76B0B}"/>
+              </a:ext>
+            </a:extLst>
+          </p:cNvPr>
+          <p:cNvPicPr>
+            <a:picLocks noChangeAspect="1" noChangeArrowheads="1"/>
+          </p:cNvPicPr>
+          <p:nvPr/>
+        </p:nvPicPr>
+        <p:blipFill>
+          <a:blip r:embed="rId6">
+            <a:extLst>
+              <a:ext uri="{28A0092B-C50C-407E-A947-70E740481C1C}">
+                <a14:useLocalDpi xmlns:a14="http://schemas.microsoft.com/office/drawing/2010/main" val="0"/>
+              </a:ext>
+            </a:extLst>
+          </a:blip>
+          <a:srcRect/>
+          <a:stretch>
+            <a:fillRect/>
+          </a:stretch>
+        </p:blipFill>
+        <p:spPr bwMode="auto">
+          <a:xfrm>
+            <a:off x="10044083" y="551041"/>
+            <a:ext cx="854165" cy="854165"/>
+          </a:xfrm>
+          <a:prstGeom prst="rect">
+            <a:avLst/>
+          </a:prstGeom>
+          <a:noFill/>
+          <a:extLst>
+            <a:ext uri="{909E8E84-426E-40DD-AFC4-6F175D3DCCD1}">
+              <a14:hiddenFill xmlns:a14="http://schemas.microsoft.com/office/drawing/2010/main">
+                <a:solidFill>
+                  <a:srgbClr val="FFFFFF"/>
+                </a:solidFill>
+              </a14:hiddenFill>
+            </a:ext>
+          </a:extLst>
+        </p:spPr>
+      </p:pic>
+      <p:pic>
+        <p:nvPicPr>
+          <p:cNvPr id="1037" name="Picture 13" descr="Plot object">
+            <a:extLst>
+              <a:ext uri="{FF2B5EF4-FFF2-40B4-BE49-F238E27FC236}">
+                <a16:creationId xmlns:a16="http://schemas.microsoft.com/office/drawing/2014/main" id="{B2F267C8-9801-46D5-B20D-B75EEADB438A}"/>
+              </a:ext>
+            </a:extLst>
+          </p:cNvPr>
+          <p:cNvPicPr>
+            <a:picLocks noChangeAspect="1" noChangeArrowheads="1"/>
+          </p:cNvPicPr>
+          <p:nvPr/>
+        </p:nvPicPr>
+        <p:blipFill>
+          <a:blip r:embed="rId7">
+            <a:extLst>
+              <a:ext uri="{28A0092B-C50C-407E-A947-70E740481C1C}">
+                <a14:useLocalDpi xmlns:a14="http://schemas.microsoft.com/office/drawing/2010/main" val="0"/>
+              </a:ext>
+            </a:extLst>
+          </a:blip>
+          <a:srcRect/>
+          <a:stretch>
+            <a:fillRect/>
+          </a:stretch>
+        </p:blipFill>
+        <p:spPr bwMode="auto">
+          <a:xfrm>
+            <a:off x="7229940" y="460224"/>
+            <a:ext cx="854164" cy="854164"/>
+          </a:xfrm>
+          <a:prstGeom prst="rect">
+            <a:avLst/>
+          </a:prstGeom>
+          <a:noFill/>
+          <a:extLst>
+            <a:ext uri="{909E8E84-426E-40DD-AFC4-6F175D3DCCD1}">
+              <a14:hiddenFill xmlns:a14="http://schemas.microsoft.com/office/drawing/2010/main">
+                <a:solidFill>
+                  <a:srgbClr val="FFFFFF"/>
+                </a:solidFill>
+              </a14:hiddenFill>
+            </a:ext>
+          </a:extLst>
+        </p:spPr>
+      </p:pic>
+      <p:pic>
+        <p:nvPicPr>
+          <p:cNvPr id="1039" name="Picture 15" descr="Plot object">
+            <a:extLst>
+              <a:ext uri="{FF2B5EF4-FFF2-40B4-BE49-F238E27FC236}">
+                <a16:creationId xmlns:a16="http://schemas.microsoft.com/office/drawing/2014/main" id="{9C834EAB-C320-40D9-9BFB-AABB88D0C391}"/>
+              </a:ext>
+            </a:extLst>
+          </p:cNvPr>
+          <p:cNvPicPr>
+            <a:picLocks noChangeAspect="1" noChangeArrowheads="1"/>
+          </p:cNvPicPr>
+          <p:nvPr/>
+        </p:nvPicPr>
+        <p:blipFill>
+          <a:blip r:embed="rId8">
+            <a:extLst>
+              <a:ext uri="{28A0092B-C50C-407E-A947-70E740481C1C}">
+                <a14:useLocalDpi xmlns:a14="http://schemas.microsoft.com/office/drawing/2010/main" val="0"/>
+              </a:ext>
+            </a:extLst>
+          </a:blip>
+          <a:srcRect/>
+          <a:stretch>
+            <a:fillRect/>
+          </a:stretch>
+        </p:blipFill>
+        <p:spPr bwMode="auto">
+          <a:xfrm>
+            <a:off x="7229939" y="1402724"/>
+            <a:ext cx="854165" cy="854165"/>
+          </a:xfrm>
+          <a:prstGeom prst="rect">
+            <a:avLst/>
+          </a:prstGeom>
+          <a:noFill/>
+          <a:extLst>
+            <a:ext uri="{909E8E84-426E-40DD-AFC4-6F175D3DCCD1}">
+              <a14:hiddenFill xmlns:a14="http://schemas.microsoft.com/office/drawing/2010/main">
+                <a:solidFill>
+                  <a:srgbClr val="FFFFFF"/>
+                </a:solidFill>
+              </a14:hiddenFill>
+            </a:ext>
+          </a:extLst>
+        </p:spPr>
+      </p:pic>
+      <p:pic>
+        <p:nvPicPr>
+          <p:cNvPr id="1041" name="Picture 17" descr="Plot object">
+            <a:extLst>
+              <a:ext uri="{FF2B5EF4-FFF2-40B4-BE49-F238E27FC236}">
+                <a16:creationId xmlns:a16="http://schemas.microsoft.com/office/drawing/2014/main" id="{94E86401-8540-4A03-B127-1B0F93781CDC}"/>
+              </a:ext>
+            </a:extLst>
+          </p:cNvPr>
+          <p:cNvPicPr>
+            <a:picLocks noChangeAspect="1" noChangeArrowheads="1"/>
+          </p:cNvPicPr>
+          <p:nvPr/>
+        </p:nvPicPr>
+        <p:blipFill>
+          <a:blip r:embed="rId9">
+            <a:extLst>
+              <a:ext uri="{28A0092B-C50C-407E-A947-70E740481C1C}">
+                <a14:useLocalDpi xmlns:a14="http://schemas.microsoft.com/office/drawing/2010/main" val="0"/>
+              </a:ext>
+            </a:extLst>
+          </a:blip>
+          <a:srcRect/>
+          <a:stretch>
+            <a:fillRect/>
+          </a:stretch>
+        </p:blipFill>
+        <p:spPr bwMode="auto">
+          <a:xfrm>
+            <a:off x="10044083" y="1464533"/>
+            <a:ext cx="854164" cy="854164"/>
+          </a:xfrm>
+          <a:prstGeom prst="rect">
+            <a:avLst/>
+          </a:prstGeom>
+          <a:noFill/>
+          <a:extLst>
+            <a:ext uri="{909E8E84-426E-40DD-AFC4-6F175D3DCCD1}">
+              <a14:hiddenFill xmlns:a14="http://schemas.microsoft.com/office/drawing/2010/main">
+                <a:solidFill>
+                  <a:srgbClr val="FFFFFF"/>
+                </a:solidFill>
+              </a14:hiddenFill>
+            </a:ext>
+          </a:extLst>
+        </p:spPr>
+      </p:pic>
+      <p:pic>
+        <p:nvPicPr>
+          <p:cNvPr id="1043" name="Picture 19" descr="Plot object">
+            <a:extLst>
+              <a:ext uri="{FF2B5EF4-FFF2-40B4-BE49-F238E27FC236}">
+                <a16:creationId xmlns:a16="http://schemas.microsoft.com/office/drawing/2014/main" id="{CB24581C-A4E2-4C90-87FA-B12D5E5F7CA0}"/>
+              </a:ext>
+            </a:extLst>
+          </p:cNvPr>
+          <p:cNvPicPr>
+            <a:picLocks noChangeAspect="1" noChangeArrowheads="1"/>
+          </p:cNvPicPr>
+          <p:nvPr/>
+        </p:nvPicPr>
+        <p:blipFill>
+          <a:blip r:embed="rId10">
+            <a:extLst>
+              <a:ext uri="{28A0092B-C50C-407E-A947-70E740481C1C}">
+                <a14:useLocalDpi xmlns:a14="http://schemas.microsoft.com/office/drawing/2010/main" val="0"/>
+              </a:ext>
+            </a:extLst>
+          </a:blip>
+          <a:srcRect/>
+          <a:stretch>
+            <a:fillRect/>
+          </a:stretch>
+        </p:blipFill>
+        <p:spPr bwMode="auto">
+          <a:xfrm>
+            <a:off x="8715683" y="1516241"/>
+            <a:ext cx="854166" cy="854166"/>
+          </a:xfrm>
+          <a:prstGeom prst="rect">
+            <a:avLst/>
+          </a:prstGeom>
+          <a:noFill/>
+          <a:extLst>
+            <a:ext uri="{909E8E84-426E-40DD-AFC4-6F175D3DCCD1}">
+              <a14:hiddenFill xmlns:a14="http://schemas.microsoft.com/office/drawing/2010/main">
+                <a:solidFill>
+                  <a:srgbClr val="FFFFFF"/>
+                </a:solidFill>
+              </a14:hiddenFill>
+            </a:ext>
+          </a:extLst>
+        </p:spPr>
+      </p:pic>
+      <p:pic>
+        <p:nvPicPr>
+          <p:cNvPr id="1045" name="Picture 21" descr="Plot object">
+            <a:extLst>
+              <a:ext uri="{FF2B5EF4-FFF2-40B4-BE49-F238E27FC236}">
+                <a16:creationId xmlns:a16="http://schemas.microsoft.com/office/drawing/2014/main" id="{AAAF361F-CA30-4980-B7CA-D475DCE2B17C}"/>
+              </a:ext>
+            </a:extLst>
+          </p:cNvPr>
+          <p:cNvPicPr>
+            <a:picLocks noChangeAspect="1" noChangeArrowheads="1"/>
+          </p:cNvPicPr>
+          <p:nvPr/>
+        </p:nvPicPr>
+        <p:blipFill>
+          <a:blip r:embed="rId11">
+            <a:extLst>
+              <a:ext uri="{28A0092B-C50C-407E-A947-70E740481C1C}">
+                <a14:useLocalDpi xmlns:a14="http://schemas.microsoft.com/office/drawing/2010/main" val="0"/>
+              </a:ext>
+            </a:extLst>
+          </a:blip>
+          <a:srcRect/>
+          <a:stretch>
+            <a:fillRect/>
+          </a:stretch>
+        </p:blipFill>
+        <p:spPr bwMode="auto">
+          <a:xfrm>
+            <a:off x="8715683" y="551039"/>
+            <a:ext cx="854166" cy="854166"/>
+          </a:xfrm>
+          <a:prstGeom prst="rect">
+            <a:avLst/>
+          </a:prstGeom>
+          <a:noFill/>
+          <a:extLst>
+            <a:ext uri="{909E8E84-426E-40DD-AFC4-6F175D3DCCD1}">
+              <a14:hiddenFill xmlns:a14="http://schemas.microsoft.com/office/drawing/2010/main">
+                <a:solidFill>
+                  <a:srgbClr val="FFFFFF"/>
+                </a:solidFill>
+              </a14:hiddenFill>
+            </a:ext>
+          </a:extLst>
+        </p:spPr>
+      </p:pic>
+      <p:pic>
+        <p:nvPicPr>
+          <p:cNvPr id="13" name="Picture 12">
+            <a:extLst>
+              <a:ext uri="{FF2B5EF4-FFF2-40B4-BE49-F238E27FC236}">
+                <a16:creationId xmlns:a16="http://schemas.microsoft.com/office/drawing/2014/main" id="{A7F98B86-BF73-4C47-89B6-B56D9EC53F6C}"/>
+              </a:ext>
+            </a:extLst>
+          </p:cNvPr>
+          <p:cNvPicPr>
+            <a:picLocks noChangeAspect="1"/>
+          </p:cNvPicPr>
+          <p:nvPr/>
+        </p:nvPicPr>
+        <p:blipFill rotWithShape="1">
+          <a:blip r:embed="rId12"/>
+          <a:srcRect t="4436" b="44882"/>
+          <a:stretch/>
+        </p:blipFill>
+        <p:spPr>
+          <a:xfrm>
+            <a:off x="8919064" y="4288490"/>
+            <a:ext cx="3231417" cy="2486936"/>
+          </a:xfrm>
+          <a:prstGeom prst="rect">
+            <a:avLst/>
+          </a:prstGeom>
+        </p:spPr>
+      </p:pic>
+      <p:pic>
+        <p:nvPicPr>
+          <p:cNvPr id="1047" name="Picture 23" descr="Plot object">
+            <a:extLst>
+              <a:ext uri="{FF2B5EF4-FFF2-40B4-BE49-F238E27FC236}">
+                <a16:creationId xmlns:a16="http://schemas.microsoft.com/office/drawing/2014/main" id="{C5779F4E-56D2-43BB-8243-EE19E9331369}"/>
+              </a:ext>
+            </a:extLst>
+          </p:cNvPr>
+          <p:cNvPicPr>
+            <a:picLocks noChangeAspect="1" noChangeArrowheads="1"/>
+          </p:cNvPicPr>
+          <p:nvPr/>
+        </p:nvPicPr>
+        <p:blipFill>
+          <a:blip r:embed="rId13">
+            <a:extLst>
+              <a:ext uri="{28A0092B-C50C-407E-A947-70E740481C1C}">
+                <a14:useLocalDpi xmlns:a14="http://schemas.microsoft.com/office/drawing/2010/main" val="0"/>
+              </a:ext>
+            </a:extLst>
+          </a:blip>
+          <a:srcRect/>
+          <a:stretch>
+            <a:fillRect/>
+          </a:stretch>
+        </p:blipFill>
+        <p:spPr bwMode="auto">
+          <a:xfrm>
+            <a:off x="5846711" y="1542592"/>
+            <a:ext cx="854164" cy="854164"/>
+          </a:xfrm>
+          <a:prstGeom prst="rect">
+            <a:avLst/>
+          </a:prstGeom>
+          <a:noFill/>
+          <a:extLst>
+            <a:ext uri="{909E8E84-426E-40DD-AFC4-6F175D3DCCD1}">
+              <a14:hiddenFill xmlns:a14="http://schemas.microsoft.com/office/drawing/2010/main">
+                <a:solidFill>
+                  <a:srgbClr val="FFFFFF"/>
+                </a:solidFill>
+              </a14:hiddenFill>
+            </a:ext>
+          </a:extLst>
+        </p:spPr>
+      </p:pic>
+      <p:pic>
+        <p:nvPicPr>
+          <p:cNvPr id="1049" name="Picture 25" descr="Plot object">
+            <a:extLst>
+              <a:ext uri="{FF2B5EF4-FFF2-40B4-BE49-F238E27FC236}">
+                <a16:creationId xmlns:a16="http://schemas.microsoft.com/office/drawing/2014/main" id="{526CF1AB-432F-4EE3-A694-520828082015}"/>
+              </a:ext>
+            </a:extLst>
+          </p:cNvPr>
+          <p:cNvPicPr>
+            <a:picLocks noChangeAspect="1" noChangeArrowheads="1"/>
+          </p:cNvPicPr>
+          <p:nvPr/>
+        </p:nvPicPr>
+        <p:blipFill>
+          <a:blip r:embed="rId14">
+            <a:extLst>
+              <a:ext uri="{28A0092B-C50C-407E-A947-70E740481C1C}">
+                <a14:useLocalDpi xmlns:a14="http://schemas.microsoft.com/office/drawing/2010/main" val="0"/>
+              </a:ext>
+            </a:extLst>
+          </a:blip>
+          <a:srcRect/>
+          <a:stretch>
+            <a:fillRect/>
+          </a:stretch>
+        </p:blipFill>
+        <p:spPr bwMode="auto">
+          <a:xfrm>
+            <a:off x="5845232" y="2537004"/>
+            <a:ext cx="854164" cy="854164"/>
+          </a:xfrm>
+          <a:prstGeom prst="rect">
+            <a:avLst/>
+          </a:prstGeom>
+          <a:noFill/>
+          <a:extLst>
+            <a:ext uri="{909E8E84-426E-40DD-AFC4-6F175D3DCCD1}">
+              <a14:hiddenFill xmlns:a14="http://schemas.microsoft.com/office/drawing/2010/main">
+                <a:solidFill>
+                  <a:srgbClr val="FFFFFF"/>
+                </a:solidFill>
+              </a14:hiddenFill>
+            </a:ext>
+          </a:extLst>
+        </p:spPr>
+      </p:pic>
+      <p:pic>
+        <p:nvPicPr>
+          <p:cNvPr id="1051" name="Picture 27" descr="Plot object">
+            <a:extLst>
+              <a:ext uri="{FF2B5EF4-FFF2-40B4-BE49-F238E27FC236}">
+                <a16:creationId xmlns:a16="http://schemas.microsoft.com/office/drawing/2014/main" id="{67EE66D8-A4E0-4871-8401-3FAA02F97E87}"/>
+              </a:ext>
+            </a:extLst>
+          </p:cNvPr>
+          <p:cNvPicPr>
+            <a:picLocks noChangeAspect="1" noChangeArrowheads="1"/>
+          </p:cNvPicPr>
+          <p:nvPr/>
+        </p:nvPicPr>
+        <p:blipFill>
+          <a:blip r:embed="rId15">
+            <a:extLst>
+              <a:ext uri="{28A0092B-C50C-407E-A947-70E740481C1C}">
+                <a14:useLocalDpi xmlns:a14="http://schemas.microsoft.com/office/drawing/2010/main" val="0"/>
+              </a:ext>
+            </a:extLst>
+          </a:blip>
+          <a:srcRect/>
+          <a:stretch>
+            <a:fillRect/>
+          </a:stretch>
+        </p:blipFill>
+        <p:spPr bwMode="auto">
+          <a:xfrm>
+            <a:off x="10044083" y="2435612"/>
+            <a:ext cx="854165" cy="854165"/>
+          </a:xfrm>
+          <a:prstGeom prst="rect">
+            <a:avLst/>
+          </a:prstGeom>
+          <a:noFill/>
+          <a:extLst>
+            <a:ext uri="{909E8E84-426E-40DD-AFC4-6F175D3DCCD1}">
+              <a14:hiddenFill xmlns:a14="http://schemas.microsoft.com/office/drawing/2010/main">
+                <a:solidFill>
+                  <a:srgbClr val="FFFFFF"/>
+                </a:solidFill>
+              </a14:hiddenFill>
+            </a:ext>
+          </a:extLst>
+        </p:spPr>
+      </p:pic>
+      <p:pic>
+        <p:nvPicPr>
+          <p:cNvPr id="1053" name="Picture 29" descr="Plot object">
+            <a:extLst>
+              <a:ext uri="{FF2B5EF4-FFF2-40B4-BE49-F238E27FC236}">
+                <a16:creationId xmlns:a16="http://schemas.microsoft.com/office/drawing/2014/main" id="{9458ECF5-A2A5-4349-9EB0-C7D9561C9314}"/>
+              </a:ext>
+            </a:extLst>
+          </p:cNvPr>
+          <p:cNvPicPr>
+            <a:picLocks noChangeAspect="1" noChangeArrowheads="1"/>
+          </p:cNvPicPr>
+          <p:nvPr/>
+        </p:nvPicPr>
+        <p:blipFill>
+          <a:blip r:embed="rId16">
+            <a:extLst>
+              <a:ext uri="{28A0092B-C50C-407E-A947-70E740481C1C}">
+                <a14:useLocalDpi xmlns:a14="http://schemas.microsoft.com/office/drawing/2010/main" val="0"/>
+              </a:ext>
+            </a:extLst>
+          </a:blip>
+          <a:srcRect/>
+          <a:stretch>
+            <a:fillRect/>
+          </a:stretch>
+        </p:blipFill>
+        <p:spPr bwMode="auto">
+          <a:xfrm>
+            <a:off x="7232480" y="2354947"/>
+            <a:ext cx="854164" cy="854164"/>
+          </a:xfrm>
+          <a:prstGeom prst="rect">
+            <a:avLst/>
+          </a:prstGeom>
+          <a:noFill/>
+          <a:extLst>
+            <a:ext uri="{909E8E84-426E-40DD-AFC4-6F175D3DCCD1}">
+              <a14:hiddenFill xmlns:a14="http://schemas.microsoft.com/office/drawing/2010/main">
+                <a:solidFill>
+                  <a:srgbClr val="FFFFFF"/>
+                </a:solidFill>
+              </a14:hiddenFill>
+            </a:ext>
+          </a:extLst>
+        </p:spPr>
+      </p:pic>
+      <p:pic>
+        <p:nvPicPr>
+          <p:cNvPr id="1055" name="Picture 31" descr="Plot object">
+            <a:extLst>
+              <a:ext uri="{FF2B5EF4-FFF2-40B4-BE49-F238E27FC236}">
+                <a16:creationId xmlns:a16="http://schemas.microsoft.com/office/drawing/2014/main" id="{7552B881-34E2-4089-9A19-C222D4680CFE}"/>
+              </a:ext>
+            </a:extLst>
+          </p:cNvPr>
+          <p:cNvPicPr>
+            <a:picLocks noChangeAspect="1" noChangeArrowheads="1"/>
+          </p:cNvPicPr>
+          <p:nvPr/>
+        </p:nvPicPr>
+        <p:blipFill>
+          <a:blip r:embed="rId17">
+            <a:extLst>
+              <a:ext uri="{28A0092B-C50C-407E-A947-70E740481C1C}">
+                <a14:useLocalDpi xmlns:a14="http://schemas.microsoft.com/office/drawing/2010/main" val="0"/>
+              </a:ext>
+            </a:extLst>
+          </a:blip>
+          <a:srcRect/>
+          <a:stretch>
+            <a:fillRect/>
+          </a:stretch>
+        </p:blipFill>
+        <p:spPr bwMode="auto">
+          <a:xfrm>
+            <a:off x="5844745" y="3646053"/>
+            <a:ext cx="854166" cy="854166"/>
+          </a:xfrm>
+          <a:prstGeom prst="rect">
+            <a:avLst/>
+          </a:prstGeom>
+          <a:noFill/>
+          <a:extLst>
+            <a:ext uri="{909E8E84-426E-40DD-AFC4-6F175D3DCCD1}">
+              <a14:hiddenFill xmlns:a14="http://schemas.microsoft.com/office/drawing/2010/main">
+                <a:solidFill>
+                  <a:srgbClr val="FFFFFF"/>
+                </a:solidFill>
+              </a14:hiddenFill>
+            </a:ext>
+          </a:extLst>
+        </p:spPr>
+      </p:pic>
+      <p:pic>
+        <p:nvPicPr>
+          <p:cNvPr id="1057" name="Picture 33" descr="Plot object">
+            <a:extLst>
+              <a:ext uri="{FF2B5EF4-FFF2-40B4-BE49-F238E27FC236}">
+                <a16:creationId xmlns:a16="http://schemas.microsoft.com/office/drawing/2014/main" id="{31AB52A4-E1C8-4821-A919-12C78665A09A}"/>
+              </a:ext>
+            </a:extLst>
+          </p:cNvPr>
+          <p:cNvPicPr>
+            <a:picLocks noChangeAspect="1" noChangeArrowheads="1"/>
+          </p:cNvPicPr>
+          <p:nvPr/>
+        </p:nvPicPr>
+        <p:blipFill>
+          <a:blip r:embed="rId18">
+            <a:extLst>
+              <a:ext uri="{28A0092B-C50C-407E-A947-70E740481C1C}">
+                <a14:useLocalDpi xmlns:a14="http://schemas.microsoft.com/office/drawing/2010/main" val="0"/>
+              </a:ext>
+            </a:extLst>
+          </a:blip>
+          <a:srcRect/>
+          <a:stretch>
+            <a:fillRect/>
+          </a:stretch>
+        </p:blipFill>
+        <p:spPr bwMode="auto">
+          <a:xfrm>
+            <a:off x="4921092" y="5670858"/>
+            <a:ext cx="854166" cy="854166"/>
+          </a:xfrm>
+          <a:prstGeom prst="rect">
+            <a:avLst/>
+          </a:prstGeom>
+          <a:noFill/>
+          <a:extLst>
+            <a:ext uri="{909E8E84-426E-40DD-AFC4-6F175D3DCCD1}">
+              <a14:hiddenFill xmlns:a14="http://schemas.microsoft.com/office/drawing/2010/main">
+                <a:solidFill>
+                  <a:srgbClr val="FFFFFF"/>
+                </a:solidFill>
+              </a14:hiddenFill>
+            </a:ext>
+          </a:extLst>
+        </p:spPr>
+      </p:pic>
+      <p:pic>
+        <p:nvPicPr>
+          <p:cNvPr id="17" name="Picture 16">
+            <a:extLst>
+              <a:ext uri="{FF2B5EF4-FFF2-40B4-BE49-F238E27FC236}">
+                <a16:creationId xmlns:a16="http://schemas.microsoft.com/office/drawing/2014/main" id="{200E4CE9-BB1D-4461-9210-86BB274B274D}"/>
+              </a:ext>
+            </a:extLst>
+          </p:cNvPr>
+          <p:cNvPicPr>
+            <a:picLocks noChangeAspect="1"/>
+          </p:cNvPicPr>
+          <p:nvPr/>
+        </p:nvPicPr>
+        <p:blipFill>
+          <a:blip r:embed="rId19"/>
+          <a:stretch>
+            <a:fillRect/>
+          </a:stretch>
+        </p:blipFill>
+        <p:spPr>
+          <a:xfrm>
+            <a:off x="6600176" y="5675874"/>
+            <a:ext cx="705752" cy="844134"/>
+          </a:xfrm>
+          <a:prstGeom prst="rect">
+            <a:avLst/>
+          </a:prstGeom>
+        </p:spPr>
+      </p:pic>
+      <p:pic>
+        <p:nvPicPr>
+          <p:cNvPr id="19" name="Picture 18">
+            <a:extLst>
+              <a:ext uri="{FF2B5EF4-FFF2-40B4-BE49-F238E27FC236}">
+                <a16:creationId xmlns:a16="http://schemas.microsoft.com/office/drawing/2014/main" id="{AB4C7C6E-5B34-46DA-90A5-8CBC74FB3C25}"/>
+              </a:ext>
+            </a:extLst>
+          </p:cNvPr>
+          <p:cNvPicPr>
+            <a:picLocks noChangeAspect="1"/>
+          </p:cNvPicPr>
+          <p:nvPr/>
+        </p:nvPicPr>
+        <p:blipFill>
+          <a:blip r:embed="rId20"/>
+          <a:stretch>
+            <a:fillRect/>
+          </a:stretch>
+        </p:blipFill>
+        <p:spPr>
+          <a:xfrm>
+            <a:off x="8689684" y="2472162"/>
+            <a:ext cx="984509" cy="854166"/>
+          </a:xfrm>
+          <a:prstGeom prst="rect">
+            <a:avLst/>
+          </a:prstGeom>
+        </p:spPr>
+      </p:pic>
+      <p:pic>
+        <p:nvPicPr>
+          <p:cNvPr id="21" name="Picture 20">
+            <a:extLst>
+              <a:ext uri="{FF2B5EF4-FFF2-40B4-BE49-F238E27FC236}">
+                <a16:creationId xmlns:a16="http://schemas.microsoft.com/office/drawing/2014/main" id="{5372F061-3BD9-4843-97C8-9819423CDCB3}"/>
+              </a:ext>
+            </a:extLst>
+          </p:cNvPr>
+          <p:cNvPicPr>
+            <a:picLocks noChangeAspect="1"/>
+          </p:cNvPicPr>
+          <p:nvPr/>
+        </p:nvPicPr>
+        <p:blipFill>
+          <a:blip r:embed="rId21"/>
+          <a:stretch>
+            <a:fillRect/>
+          </a:stretch>
+        </p:blipFill>
+        <p:spPr>
+          <a:xfrm>
+            <a:off x="7748842" y="5661575"/>
+            <a:ext cx="978284" cy="844795"/>
+          </a:xfrm>
+          <a:prstGeom prst="rect">
+            <a:avLst/>
+          </a:prstGeom>
+        </p:spPr>
+      </p:pic>
+      <p:sp>
+        <p:nvSpPr>
+          <p:cNvPr id="101" name="TextBox 100">
+            <a:extLst>
+              <a:ext uri="{FF2B5EF4-FFF2-40B4-BE49-F238E27FC236}">
+                <a16:creationId xmlns:a16="http://schemas.microsoft.com/office/drawing/2014/main" id="{F70809AB-6AE4-46FF-8C29-B8D7BCFDE220}"/>
+              </a:ext>
+            </a:extLst>
+          </p:cNvPr>
+          <p:cNvSpPr txBox="1"/>
+          <p:nvPr/>
+        </p:nvSpPr>
+        <p:spPr>
+          <a:xfrm>
+            <a:off x="8978231" y="3944991"/>
+            <a:ext cx="2985867" cy="369332"/>
+          </a:xfrm>
+          <a:prstGeom prst="rect">
+            <a:avLst/>
+          </a:prstGeom>
+          <a:noFill/>
+        </p:spPr>
+        <p:txBody>
+          <a:bodyPr wrap="square" rtlCol="0">
+            <a:spAutoFit/>
+          </a:bodyPr>
+          <a:lstStyle/>
+          <a:p>
+            <a:r>
+              <a:rPr lang="en-US" dirty="0"/>
+              <a:t>Metadata Annotation of Plots </a:t>
+            </a:r>
+          </a:p>
+        </p:txBody>
+      </p:sp>
+    </p:spTree>
+    <p:extLst>
+      <p:ext uri="{BB962C8B-B14F-4D97-AF65-F5344CB8AC3E}">
+        <p14:creationId xmlns:p14="http://schemas.microsoft.com/office/powerpoint/2010/main" val="2272579441"/>
+      </p:ext>
+    </p:extLst>
+  </p:cSld>
+  <p:clrMapOvr>
+    <a:masterClrMapping/>
+  </p:clrMapOvr>
+</p:sld>
+</file>
+
 <file path=ppt/theme/theme1.xml><?xml version="1.0" encoding="utf-8"?>
 <a:theme xmlns:a="http://schemas.openxmlformats.org/drawingml/2006/main" name="Office Theme">
   <a:themeElements>

</xml_diff>

<commit_message>
presentation update, add hash
</commit_message>
<xml_diff>
--- a/extras/Explorer_Tool_Workflow_2.pptx
+++ b/extras/Explorer_Tool_Workflow_2.pptx
@@ -263,7 +263,7 @@
           <a:p>
             <a:fld id="{1560D20A-E720-4ECB-907E-0F9EBDE75356}" type="datetimeFigureOut">
               <a:rPr lang="en-US" smtClean="0"/>
-              <a:t>4/14/2022</a:t>
+              <a:t>4/20/2022</a:t>
             </a:fld>
             <a:endParaRPr lang="en-US"/>
           </a:p>
@@ -461,7 +461,7 @@
           <a:p>
             <a:fld id="{1560D20A-E720-4ECB-907E-0F9EBDE75356}" type="datetimeFigureOut">
               <a:rPr lang="en-US" smtClean="0"/>
-              <a:t>4/14/2022</a:t>
+              <a:t>4/20/2022</a:t>
             </a:fld>
             <a:endParaRPr lang="en-US"/>
           </a:p>
@@ -669,7 +669,7 @@
           <a:p>
             <a:fld id="{1560D20A-E720-4ECB-907E-0F9EBDE75356}" type="datetimeFigureOut">
               <a:rPr lang="en-US" smtClean="0"/>
-              <a:t>4/14/2022</a:t>
+              <a:t>4/20/2022</a:t>
             </a:fld>
             <a:endParaRPr lang="en-US"/>
           </a:p>
@@ -867,7 +867,7 @@
           <a:p>
             <a:fld id="{1560D20A-E720-4ECB-907E-0F9EBDE75356}" type="datetimeFigureOut">
               <a:rPr lang="en-US" smtClean="0"/>
-              <a:t>4/14/2022</a:t>
+              <a:t>4/20/2022</a:t>
             </a:fld>
             <a:endParaRPr lang="en-US"/>
           </a:p>
@@ -1142,7 +1142,7 @@
           <a:p>
             <a:fld id="{1560D20A-E720-4ECB-907E-0F9EBDE75356}" type="datetimeFigureOut">
               <a:rPr lang="en-US" smtClean="0"/>
-              <a:t>4/14/2022</a:t>
+              <a:t>4/20/2022</a:t>
             </a:fld>
             <a:endParaRPr lang="en-US"/>
           </a:p>
@@ -1407,7 +1407,7 @@
           <a:p>
             <a:fld id="{1560D20A-E720-4ECB-907E-0F9EBDE75356}" type="datetimeFigureOut">
               <a:rPr lang="en-US" smtClean="0"/>
-              <a:t>4/14/2022</a:t>
+              <a:t>4/20/2022</a:t>
             </a:fld>
             <a:endParaRPr lang="en-US"/>
           </a:p>
@@ -1819,7 +1819,7 @@
           <a:p>
             <a:fld id="{1560D20A-E720-4ECB-907E-0F9EBDE75356}" type="datetimeFigureOut">
               <a:rPr lang="en-US" smtClean="0"/>
-              <a:t>4/14/2022</a:t>
+              <a:t>4/20/2022</a:t>
             </a:fld>
             <a:endParaRPr lang="en-US"/>
           </a:p>
@@ -1960,7 +1960,7 @@
           <a:p>
             <a:fld id="{1560D20A-E720-4ECB-907E-0F9EBDE75356}" type="datetimeFigureOut">
               <a:rPr lang="en-US" smtClean="0"/>
-              <a:t>4/14/2022</a:t>
+              <a:t>4/20/2022</a:t>
             </a:fld>
             <a:endParaRPr lang="en-US"/>
           </a:p>
@@ -2073,7 +2073,7 @@
           <a:p>
             <a:fld id="{1560D20A-E720-4ECB-907E-0F9EBDE75356}" type="datetimeFigureOut">
               <a:rPr lang="en-US" smtClean="0"/>
-              <a:t>4/14/2022</a:t>
+              <a:t>4/20/2022</a:t>
             </a:fld>
             <a:endParaRPr lang="en-US"/>
           </a:p>
@@ -2384,7 +2384,7 @@
           <a:p>
             <a:fld id="{1560D20A-E720-4ECB-907E-0F9EBDE75356}" type="datetimeFigureOut">
               <a:rPr lang="en-US" smtClean="0"/>
-              <a:t>4/14/2022</a:t>
+              <a:t>4/20/2022</a:t>
             </a:fld>
             <a:endParaRPr lang="en-US"/>
           </a:p>
@@ -2672,7 +2672,7 @@
           <a:p>
             <a:fld id="{1560D20A-E720-4ECB-907E-0F9EBDE75356}" type="datetimeFigureOut">
               <a:rPr lang="en-US" smtClean="0"/>
-              <a:t>4/14/2022</a:t>
+              <a:t>4/20/2022</a:t>
             </a:fld>
             <a:endParaRPr lang="en-US"/>
           </a:p>
@@ -2913,7 +2913,7 @@
           <a:p>
             <a:fld id="{1560D20A-E720-4ECB-907E-0F9EBDE75356}" type="datetimeFigureOut">
               <a:rPr lang="en-US" smtClean="0"/>
-              <a:t>4/14/2022</a:t>
+              <a:t>4/20/2022</a:t>
             </a:fld>
             <a:endParaRPr lang="en-US"/>
           </a:p>
@@ -5904,7 +5904,7 @@
         </p:nvSpPr>
         <p:spPr>
           <a:xfrm>
-            <a:off x="83874" y="202288"/>
+            <a:off x="158613" y="1191308"/>
             <a:ext cx="2363437" cy="646331"/>
           </a:xfrm>
           <a:prstGeom prst="rect">
@@ -5973,7 +5973,7 @@
         </p:nvSpPr>
         <p:spPr>
           <a:xfrm>
-            <a:off x="2651213" y="2574431"/>
+            <a:off x="2788432" y="2632580"/>
             <a:ext cx="2363434" cy="461665"/>
           </a:xfrm>
           <a:prstGeom prst="rect">
@@ -6111,7 +6111,7 @@
         </p:nvSpPr>
         <p:spPr>
           <a:xfrm>
-            <a:off x="5242149" y="2680756"/>
+            <a:off x="5406817" y="2786517"/>
             <a:ext cx="2363167" cy="830997"/>
           </a:xfrm>
           <a:prstGeom prst="rect">
@@ -6197,7 +6197,7 @@
         </p:nvSpPr>
         <p:spPr>
           <a:xfrm>
-            <a:off x="5240748" y="3593259"/>
+            <a:off x="5405416" y="3699020"/>
             <a:ext cx="2363435" cy="1015663"/>
           </a:xfrm>
           <a:prstGeom prst="rect">
@@ -6270,8 +6270,8 @@
         </p:nvCxnSpPr>
         <p:spPr>
           <a:xfrm>
-            <a:off x="3832930" y="3036096"/>
-            <a:ext cx="11043" cy="1551029"/>
+            <a:off x="3970149" y="3094245"/>
+            <a:ext cx="2948" cy="483244"/>
           </a:xfrm>
           <a:prstGeom prst="straightConnector1">
             <a:avLst/>
@@ -6313,7 +6313,7 @@
         </p:nvCxnSpPr>
         <p:spPr>
           <a:xfrm flipH="1">
-            <a:off x="6422466" y="3511753"/>
+            <a:off x="6587134" y="3617514"/>
             <a:ext cx="1267" cy="81506"/>
           </a:xfrm>
           <a:prstGeom prst="straightConnector1">
@@ -6352,7 +6352,7 @@
         </p:nvSpPr>
         <p:spPr>
           <a:xfrm>
-            <a:off x="5248469" y="958861"/>
+            <a:off x="5413137" y="1064622"/>
             <a:ext cx="2363167" cy="646331"/>
           </a:xfrm>
           <a:prstGeom prst="rect">
@@ -6609,8 +6609,8 @@
         </p:nvCxnSpPr>
         <p:spPr>
           <a:xfrm flipV="1">
-            <a:off x="3832930" y="1282027"/>
-            <a:ext cx="1415539" cy="1292404"/>
+            <a:off x="3970149" y="1387788"/>
+            <a:ext cx="1442988" cy="1244792"/>
           </a:xfrm>
           <a:prstGeom prst="straightConnector1">
             <a:avLst/>
@@ -6652,8 +6652,8 @@
         </p:nvCxnSpPr>
         <p:spPr>
           <a:xfrm flipH="1" flipV="1">
-            <a:off x="7611636" y="1282027"/>
-            <a:ext cx="397342" cy="662156"/>
+            <a:off x="7776304" y="1387788"/>
+            <a:ext cx="232674" cy="556395"/>
           </a:xfrm>
           <a:prstGeom prst="straightConnector1">
             <a:avLst/>
@@ -6691,7 +6691,7 @@
         </p:nvSpPr>
         <p:spPr>
           <a:xfrm>
-            <a:off x="94093" y="3801811"/>
+            <a:off x="167233" y="2792175"/>
             <a:ext cx="2363435" cy="646331"/>
           </a:xfrm>
           <a:prstGeom prst="rect">
@@ -6761,14 +6761,14 @@
           <p:cNvCxnSpPr>
             <a:cxnSpLocks/>
             <a:stCxn id="50" idx="1"/>
-            <a:endCxn id="75" idx="0"/>
+            <a:endCxn id="75" idx="3"/>
           </p:cNvCxnSpPr>
           <p:nvPr/>
         </p:nvCxnSpPr>
         <p:spPr>
-          <a:xfrm flipH="1">
-            <a:off x="3843973" y="4101091"/>
-            <a:ext cx="1396775" cy="486034"/>
+          <a:xfrm flipH="1" flipV="1">
+            <a:off x="5154816" y="3900655"/>
+            <a:ext cx="250600" cy="306197"/>
           </a:xfrm>
           <a:prstGeom prst="straightConnector1">
             <a:avLst/>
@@ -6806,8 +6806,8 @@
         </p:nvSpPr>
         <p:spPr>
           <a:xfrm>
-            <a:off x="2605510" y="4587125"/>
-            <a:ext cx="2476925" cy="646331"/>
+            <a:off x="2791378" y="3577489"/>
+            <a:ext cx="2363438" cy="646331"/>
           </a:xfrm>
           <a:prstGeom prst="rect">
             <a:avLst/>
@@ -6882,8 +6882,8 @@
         </p:nvCxnSpPr>
         <p:spPr>
           <a:xfrm>
-            <a:off x="2457528" y="4124977"/>
-            <a:ext cx="147982" cy="785314"/>
+            <a:off x="2530668" y="3115341"/>
+            <a:ext cx="260710" cy="785314"/>
           </a:xfrm>
           <a:prstGeom prst="straightConnector1">
             <a:avLst/>
@@ -7128,7 +7128,7 @@
         </p:nvSpPr>
         <p:spPr>
           <a:xfrm>
-            <a:off x="2651212" y="5420119"/>
+            <a:off x="2791381" y="4640615"/>
             <a:ext cx="2363435" cy="646331"/>
           </a:xfrm>
           <a:prstGeom prst="rect">
@@ -7203,9 +7203,9 @@
           <p:nvPr/>
         </p:nvCxnSpPr>
         <p:spPr>
-          <a:xfrm flipH="1">
-            <a:off x="3832930" y="5233456"/>
-            <a:ext cx="11043" cy="186663"/>
+          <a:xfrm>
+            <a:off x="3973097" y="4223820"/>
+            <a:ext cx="2" cy="416795"/>
           </a:xfrm>
           <a:prstGeom prst="straightConnector1">
             <a:avLst/>
@@ -7246,9 +7246,9 @@
           <p:nvPr/>
         </p:nvCxnSpPr>
         <p:spPr>
-          <a:xfrm>
-            <a:off x="9195799" y="5156452"/>
-            <a:ext cx="5" cy="66225"/>
+          <a:xfrm flipH="1">
+            <a:off x="9195804" y="5155307"/>
+            <a:ext cx="5104" cy="67370"/>
           </a:xfrm>
           <a:prstGeom prst="straightConnector1">
             <a:avLst/>
@@ -7372,7 +7372,7 @@
         </p:nvSpPr>
         <p:spPr>
           <a:xfrm>
-            <a:off x="5245097" y="1682790"/>
+            <a:off x="5409765" y="1788551"/>
             <a:ext cx="2363167" cy="646331"/>
           </a:xfrm>
           <a:prstGeom prst="rect">
@@ -7439,7 +7439,7 @@
         </p:nvCxnSpPr>
         <p:spPr>
           <a:xfrm flipH="1">
-            <a:off x="6423733" y="2603158"/>
+            <a:off x="6588401" y="2708919"/>
             <a:ext cx="2948" cy="77598"/>
           </a:xfrm>
           <a:prstGeom prst="straightConnector1">
@@ -7482,7 +7482,7 @@
         </p:nvCxnSpPr>
         <p:spPr>
           <a:xfrm flipV="1">
-            <a:off x="6426681" y="1605192"/>
+            <a:off x="6591349" y="1710953"/>
             <a:ext cx="3372" cy="77598"/>
           </a:xfrm>
           <a:prstGeom prst="straightConnector1">
@@ -7521,8 +7521,8 @@
         </p:nvSpPr>
         <p:spPr>
           <a:xfrm>
-            <a:off x="83873" y="845845"/>
-            <a:ext cx="2363437" cy="461665"/>
+            <a:off x="158612" y="1834865"/>
+            <a:ext cx="2363437" cy="246221"/>
           </a:xfrm>
           <a:prstGeom prst="rect">
             <a:avLst/>
@@ -7552,14 +7552,14 @@
           <a:p>
             <a:pPr algn="ctr"/>
             <a:r>
-              <a:rPr lang="en-US" sz="1200" dirty="0">
+              <a:rPr lang="en-US" sz="1000" dirty="0">
                 <a:solidFill>
                   <a:schemeClr val="tx1"/>
                 </a:solidFill>
                 <a:latin typeface="Times New Roman" panose="02020603050405020304" pitchFamily="18" charset="0"/>
                 <a:cs typeface="Times New Roman" panose="02020603050405020304" pitchFamily="18" charset="0"/>
               </a:rPr>
-              <a:t>library(shiny), library(dplyr), library(BiocManager)</a:t>
+              <a:t>shiny, dplyr, BiocManager</a:t>
             </a:r>
           </a:p>
         </p:txBody>
@@ -7578,7 +7578,7 @@
         </p:nvSpPr>
         <p:spPr>
           <a:xfrm>
-            <a:off x="88977" y="5563467"/>
+            <a:off x="163719" y="4153595"/>
             <a:ext cx="2363435" cy="461665"/>
           </a:xfrm>
           <a:prstGeom prst="rect">
@@ -7654,8 +7654,8 @@
         </p:nvCxnSpPr>
         <p:spPr>
           <a:xfrm flipV="1">
-            <a:off x="2452412" y="4910291"/>
-            <a:ext cx="153098" cy="884009"/>
+            <a:off x="2527154" y="3900655"/>
+            <a:ext cx="264224" cy="483773"/>
           </a:xfrm>
           <a:prstGeom prst="straightConnector1">
             <a:avLst/>
@@ -7693,7 +7693,7 @@
         </p:nvSpPr>
         <p:spPr>
           <a:xfrm>
-            <a:off x="2605510" y="6469650"/>
+            <a:off x="163717" y="5009947"/>
             <a:ext cx="2363437" cy="276999"/>
           </a:xfrm>
           <a:prstGeom prst="rect">
@@ -7752,7 +7752,7 @@
         </p:nvSpPr>
         <p:spPr>
           <a:xfrm>
-            <a:off x="88975" y="6019583"/>
+            <a:off x="163716" y="4609711"/>
             <a:ext cx="2363437" cy="276999"/>
           </a:xfrm>
           <a:prstGeom prst="rect">
@@ -7809,7 +7809,7 @@
         </p:nvSpPr>
         <p:spPr>
           <a:xfrm>
-            <a:off x="5244962" y="2326159"/>
+            <a:off x="5409630" y="2431920"/>
             <a:ext cx="2363437" cy="276999"/>
           </a:xfrm>
           <a:prstGeom prst="rect">
@@ -7923,8 +7923,8 @@
         </p:nvSpPr>
         <p:spPr>
           <a:xfrm>
-            <a:off x="5244694" y="5420119"/>
-            <a:ext cx="2366942" cy="430887"/>
+            <a:off x="5411249" y="5275803"/>
+            <a:ext cx="2361683" cy="400110"/>
           </a:xfrm>
           <a:prstGeom prst="rect">
             <a:avLst/>
@@ -7954,112 +7954,15 @@
           <a:p>
             <a:pPr algn="ctr"/>
             <a:r>
-              <a:rPr lang="en-US" sz="1050" dirty="0">
+              <a:rPr lang="en-US" sz="1000" dirty="0">
                 <a:solidFill>
                   <a:schemeClr val="tx1"/>
                 </a:solidFill>
                 <a:latin typeface="Times New Roman" panose="02020603050405020304" pitchFamily="18" charset="0"/>
                 <a:cs typeface="Times New Roman" panose="02020603050405020304" pitchFamily="18" charset="0"/>
               </a:rPr>
-              <a:t>viridis, ggplot2, </a:t>
-            </a:r>
-            <a:r>
-              <a:rPr lang="en-US" sz="1050" dirty="0" err="1">
-                <a:solidFill>
-                  <a:schemeClr val="tx1"/>
-                </a:solidFill>
-                <a:latin typeface="Times New Roman" panose="02020603050405020304" pitchFamily="18" charset="0"/>
-                <a:cs typeface="Times New Roman" panose="02020603050405020304" pitchFamily="18" charset="0"/>
-              </a:rPr>
-              <a:t>plotly</a:t>
-            </a:r>
-            <a:r>
-              <a:rPr lang="en-US" sz="1050" dirty="0">
-                <a:solidFill>
-                  <a:schemeClr val="tx1"/>
-                </a:solidFill>
-                <a:latin typeface="Times New Roman" panose="02020603050405020304" pitchFamily="18" charset="0"/>
-                <a:cs typeface="Times New Roman" panose="02020603050405020304" pitchFamily="18" charset="0"/>
-              </a:rPr>
-              <a:t>, </a:t>
-            </a:r>
-            <a:r>
-              <a:rPr lang="en-US" sz="1050" dirty="0" err="1">
-                <a:solidFill>
-                  <a:schemeClr val="tx1"/>
-                </a:solidFill>
-                <a:latin typeface="Times New Roman" panose="02020603050405020304" pitchFamily="18" charset="0"/>
-                <a:cs typeface="Times New Roman" panose="02020603050405020304" pitchFamily="18" charset="0"/>
-              </a:rPr>
-              <a:t>beeswarm</a:t>
-            </a:r>
-            <a:r>
-              <a:rPr lang="en-US" sz="1050" dirty="0">
-                <a:solidFill>
-                  <a:schemeClr val="tx1"/>
-                </a:solidFill>
-                <a:latin typeface="Times New Roman" panose="02020603050405020304" pitchFamily="18" charset="0"/>
-                <a:cs typeface="Times New Roman" panose="02020603050405020304" pitchFamily="18" charset="0"/>
-              </a:rPr>
-              <a:t>, DT, </a:t>
-            </a:r>
-            <a:r>
-              <a:rPr lang="en-US" sz="1050" dirty="0" err="1">
-                <a:solidFill>
-                  <a:schemeClr val="tx1"/>
-                </a:solidFill>
-                <a:latin typeface="Times New Roman" panose="02020603050405020304" pitchFamily="18" charset="0"/>
-                <a:cs typeface="Times New Roman" panose="02020603050405020304" pitchFamily="18" charset="0"/>
-              </a:rPr>
-              <a:t>UpSetR</a:t>
-            </a:r>
-            <a:r>
-              <a:rPr lang="en-US" sz="1050" dirty="0">
-                <a:solidFill>
-                  <a:schemeClr val="tx1"/>
-                </a:solidFill>
-                <a:latin typeface="Times New Roman" panose="02020603050405020304" pitchFamily="18" charset="0"/>
-                <a:cs typeface="Times New Roman" panose="02020603050405020304" pitchFamily="18" charset="0"/>
-              </a:rPr>
-              <a:t>, </a:t>
-            </a:r>
-            <a:r>
-              <a:rPr lang="en-US" sz="1050" dirty="0" err="1">
-                <a:solidFill>
-                  <a:schemeClr val="tx1"/>
-                </a:solidFill>
-                <a:latin typeface="Times New Roman" panose="02020603050405020304" pitchFamily="18" charset="0"/>
-                <a:cs typeface="Times New Roman" panose="02020603050405020304" pitchFamily="18" charset="0"/>
-              </a:rPr>
-              <a:t>VennDiagram</a:t>
-            </a:r>
-            <a:r>
-              <a:rPr lang="en-US" sz="1050" dirty="0">
-                <a:solidFill>
-                  <a:schemeClr val="tx1"/>
-                </a:solidFill>
-                <a:latin typeface="Times New Roman" panose="02020603050405020304" pitchFamily="18" charset="0"/>
-                <a:cs typeface="Times New Roman" panose="02020603050405020304" pitchFamily="18" charset="0"/>
-              </a:rPr>
-              <a:t>, </a:t>
-            </a:r>
-            <a:r>
-              <a:rPr lang="en-US" sz="1050" dirty="0" err="1">
-                <a:solidFill>
-                  <a:schemeClr val="tx1"/>
-                </a:solidFill>
-                <a:latin typeface="Times New Roman" panose="02020603050405020304" pitchFamily="18" charset="0"/>
-                <a:cs typeface="Times New Roman" panose="02020603050405020304" pitchFamily="18" charset="0"/>
-              </a:rPr>
-              <a:t>heatmaply</a:t>
-            </a:r>
-            <a:endParaRPr lang="en-US" sz="1050" dirty="0">
-              <a:solidFill>
-                <a:schemeClr val="tx1"/>
-              </a:solidFill>
-              <a:latin typeface="Times New Roman" panose="02020603050405020304" pitchFamily="18" charset="0"/>
-              <a:cs typeface="Times New Roman" panose="02020603050405020304" pitchFamily="18" charset="0"/>
-            </a:endParaRPr>
+              <a:t>viridis, ggplot2, plotly, beeswarm, DT, UpSetR, VennDiagram, heatmaply</a:t>
+            </a:r>
           </a:p>
         </p:txBody>
       </p:sp>
@@ -8077,7 +7980,7 @@
         </p:nvSpPr>
         <p:spPr>
           <a:xfrm>
-            <a:off x="8014087" y="4910231"/>
+            <a:off x="8019196" y="4909086"/>
             <a:ext cx="2363424" cy="246221"/>
           </a:xfrm>
           <a:prstGeom prst="rect">
@@ -8134,7 +8037,7 @@
         </p:nvSpPr>
         <p:spPr>
           <a:xfrm>
-            <a:off x="5246453" y="4958454"/>
+            <a:off x="5405427" y="4814138"/>
             <a:ext cx="2363424" cy="461665"/>
           </a:xfrm>
           <a:prstGeom prst="rect">
@@ -8207,8 +8110,8 @@
         </p:nvCxnSpPr>
         <p:spPr>
           <a:xfrm>
-            <a:off x="7609877" y="5189287"/>
-            <a:ext cx="404214" cy="356556"/>
+            <a:off x="7768851" y="5044971"/>
+            <a:ext cx="245240" cy="500872"/>
           </a:xfrm>
           <a:prstGeom prst="straightConnector1">
             <a:avLst/>
@@ -8303,8 +8206,8 @@
         </p:nvSpPr>
         <p:spPr>
           <a:xfrm>
-            <a:off x="94075" y="4447223"/>
-            <a:ext cx="2363435" cy="830997"/>
+            <a:off x="167233" y="3440792"/>
+            <a:ext cx="2363435" cy="400110"/>
           </a:xfrm>
           <a:prstGeom prst="rect">
             <a:avLst/>
@@ -8334,14 +8237,14 @@
           <a:p>
             <a:pPr algn="ctr"/>
             <a:r>
-              <a:rPr lang="en-US" sz="1200" dirty="0">
+              <a:rPr lang="en-US" sz="1000" dirty="0">
                 <a:solidFill>
                   <a:schemeClr val="tx1"/>
                 </a:solidFill>
                 <a:latin typeface="Times New Roman" panose="02020603050405020304" pitchFamily="18" charset="0"/>
                 <a:cs typeface="Times New Roman" panose="02020603050405020304" pitchFamily="18" charset="0"/>
               </a:rPr>
-              <a:t>library(reticulate), library(hash) library(tensorflow), library(keras), library(phateR), library(umap), library(Rtsne), library(Matrix)</a:t>
+              <a:t>reticulate, hash, tensorflow, keras, phateR, umap, Rtsne, Matrix</a:t>
             </a:r>
           </a:p>
         </p:txBody>
@@ -8421,8 +8324,8 @@
         </p:nvCxnSpPr>
         <p:spPr>
           <a:xfrm>
-            <a:off x="7604183" y="4101091"/>
-            <a:ext cx="415013" cy="485975"/>
+            <a:off x="7768851" y="4206852"/>
+            <a:ext cx="250345" cy="380214"/>
           </a:xfrm>
           <a:prstGeom prst="straightConnector1">
             <a:avLst/>
@@ -8460,7 +8363,7 @@
         </p:nvSpPr>
         <p:spPr>
           <a:xfrm>
-            <a:off x="88977" y="1563055"/>
+            <a:off x="163716" y="2205267"/>
             <a:ext cx="2363435" cy="461665"/>
           </a:xfrm>
           <a:prstGeom prst="rect">
@@ -8536,8 +8439,8 @@
         </p:nvCxnSpPr>
         <p:spPr>
           <a:xfrm flipV="1">
-            <a:off x="2452412" y="1282027"/>
-            <a:ext cx="2796057" cy="511861"/>
+            <a:off x="2527151" y="1387788"/>
+            <a:ext cx="2885986" cy="1048312"/>
           </a:xfrm>
           <a:prstGeom prst="straightConnector1">
             <a:avLst/>
@@ -8579,8 +8482,8 @@
         </p:nvCxnSpPr>
         <p:spPr>
           <a:xfrm>
-            <a:off x="1270695" y="2024720"/>
-            <a:ext cx="5116" cy="1777091"/>
+            <a:off x="1345434" y="2666932"/>
+            <a:ext cx="3517" cy="125243"/>
           </a:xfrm>
           <a:prstGeom prst="straightConnector1">
             <a:avLst/>

</xml_diff>

<commit_message>
improve existing tests, add new tests, describe test usage more accurately
</commit_message>
<xml_diff>
--- a/extras/Explorer_Tool_Workflow_2.pptx
+++ b/extras/Explorer_Tool_Workflow_2.pptx
@@ -263,7 +263,7 @@
           <a:p>
             <a:fld id="{1560D20A-E720-4ECB-907E-0F9EBDE75356}" type="datetimeFigureOut">
               <a:rPr lang="en-US" smtClean="0"/>
-              <a:t>4/20/2022</a:t>
+              <a:t>4/24/2022</a:t>
             </a:fld>
             <a:endParaRPr lang="en-US"/>
           </a:p>
@@ -461,7 +461,7 @@
           <a:p>
             <a:fld id="{1560D20A-E720-4ECB-907E-0F9EBDE75356}" type="datetimeFigureOut">
               <a:rPr lang="en-US" smtClean="0"/>
-              <a:t>4/20/2022</a:t>
+              <a:t>4/24/2022</a:t>
             </a:fld>
             <a:endParaRPr lang="en-US"/>
           </a:p>
@@ -669,7 +669,7 @@
           <a:p>
             <a:fld id="{1560D20A-E720-4ECB-907E-0F9EBDE75356}" type="datetimeFigureOut">
               <a:rPr lang="en-US" smtClean="0"/>
-              <a:t>4/20/2022</a:t>
+              <a:t>4/24/2022</a:t>
             </a:fld>
             <a:endParaRPr lang="en-US"/>
           </a:p>
@@ -867,7 +867,7 @@
           <a:p>
             <a:fld id="{1560D20A-E720-4ECB-907E-0F9EBDE75356}" type="datetimeFigureOut">
               <a:rPr lang="en-US" smtClean="0"/>
-              <a:t>4/20/2022</a:t>
+              <a:t>4/24/2022</a:t>
             </a:fld>
             <a:endParaRPr lang="en-US"/>
           </a:p>
@@ -1142,7 +1142,7 @@
           <a:p>
             <a:fld id="{1560D20A-E720-4ECB-907E-0F9EBDE75356}" type="datetimeFigureOut">
               <a:rPr lang="en-US" smtClean="0"/>
-              <a:t>4/20/2022</a:t>
+              <a:t>4/24/2022</a:t>
             </a:fld>
             <a:endParaRPr lang="en-US"/>
           </a:p>
@@ -1407,7 +1407,7 @@
           <a:p>
             <a:fld id="{1560D20A-E720-4ECB-907E-0F9EBDE75356}" type="datetimeFigureOut">
               <a:rPr lang="en-US" smtClean="0"/>
-              <a:t>4/20/2022</a:t>
+              <a:t>4/24/2022</a:t>
             </a:fld>
             <a:endParaRPr lang="en-US"/>
           </a:p>
@@ -1819,7 +1819,7 @@
           <a:p>
             <a:fld id="{1560D20A-E720-4ECB-907E-0F9EBDE75356}" type="datetimeFigureOut">
               <a:rPr lang="en-US" smtClean="0"/>
-              <a:t>4/20/2022</a:t>
+              <a:t>4/24/2022</a:t>
             </a:fld>
             <a:endParaRPr lang="en-US"/>
           </a:p>
@@ -1960,7 +1960,7 @@
           <a:p>
             <a:fld id="{1560D20A-E720-4ECB-907E-0F9EBDE75356}" type="datetimeFigureOut">
               <a:rPr lang="en-US" smtClean="0"/>
-              <a:t>4/20/2022</a:t>
+              <a:t>4/24/2022</a:t>
             </a:fld>
             <a:endParaRPr lang="en-US"/>
           </a:p>
@@ -2073,7 +2073,7 @@
           <a:p>
             <a:fld id="{1560D20A-E720-4ECB-907E-0F9EBDE75356}" type="datetimeFigureOut">
               <a:rPr lang="en-US" smtClean="0"/>
-              <a:t>4/20/2022</a:t>
+              <a:t>4/24/2022</a:t>
             </a:fld>
             <a:endParaRPr lang="en-US"/>
           </a:p>
@@ -2384,7 +2384,7 @@
           <a:p>
             <a:fld id="{1560D20A-E720-4ECB-907E-0F9EBDE75356}" type="datetimeFigureOut">
               <a:rPr lang="en-US" smtClean="0"/>
-              <a:t>4/20/2022</a:t>
+              <a:t>4/24/2022</a:t>
             </a:fld>
             <a:endParaRPr lang="en-US"/>
           </a:p>
@@ -2672,7 +2672,7 @@
           <a:p>
             <a:fld id="{1560D20A-E720-4ECB-907E-0F9EBDE75356}" type="datetimeFigureOut">
               <a:rPr lang="en-US" smtClean="0"/>
-              <a:t>4/20/2022</a:t>
+              <a:t>4/24/2022</a:t>
             </a:fld>
             <a:endParaRPr lang="en-US"/>
           </a:p>
@@ -2913,7 +2913,7 @@
           <a:p>
             <a:fld id="{1560D20A-E720-4ECB-907E-0F9EBDE75356}" type="datetimeFigureOut">
               <a:rPr lang="en-US" smtClean="0"/>
-              <a:t>4/20/2022</a:t>
+              <a:t>4/24/2022</a:t>
             </a:fld>
             <a:endParaRPr lang="en-US"/>
           </a:p>
@@ -6111,8 +6111,8 @@
         </p:nvSpPr>
         <p:spPr>
           <a:xfrm>
-            <a:off x="5406817" y="2786517"/>
-            <a:ext cx="2363167" cy="830997"/>
+            <a:off x="5413137" y="2880804"/>
+            <a:ext cx="2363167" cy="646331"/>
           </a:xfrm>
           <a:prstGeom prst="rect">
             <a:avLst/>
@@ -6151,7 +6151,7 @@
                 <a:latin typeface="Times New Roman" panose="02020603050405020304" pitchFamily="18" charset="0"/>
                 <a:cs typeface="Times New Roman" panose="02020603050405020304" pitchFamily="18" charset="0"/>
               </a:rPr>
-              <a:t>preprocess.R</a:t>
+              <a:t>preprocess.R*</a:t>
             </a:r>
             <a:r>
               <a:rPr lang="en-US" sz="1200" dirty="0">
@@ -6178,7 +6178,7 @@
                 <a:latin typeface="Times New Roman" panose="02020603050405020304" pitchFamily="18" charset="0"/>
                 <a:cs typeface="Times New Roman" panose="02020603050405020304" pitchFamily="18" charset="0"/>
               </a:rPr>
-              <a:t>. Names, stores, and loads reduction files. </a:t>
+              <a:t>. Names, stores, and loads files. </a:t>
             </a:r>
           </a:p>
         </p:txBody>
@@ -6237,7 +6237,7 @@
                 <a:latin typeface="Times New Roman" panose="02020603050405020304" pitchFamily="18" charset="0"/>
                 <a:cs typeface="Times New Roman" panose="02020603050405020304" pitchFamily="18" charset="0"/>
               </a:rPr>
-              <a:t>make_requests.R</a:t>
+              <a:t>make_requests.R*</a:t>
             </a:r>
             <a:r>
               <a:rPr lang="en-US" sz="1200" dirty="0">
@@ -6313,8 +6313,8 @@
         </p:nvCxnSpPr>
         <p:spPr>
           <a:xfrm flipH="1">
-            <a:off x="6587134" y="3617514"/>
-            <a:ext cx="1267" cy="81506"/>
+            <a:off x="6587134" y="3527135"/>
+            <a:ext cx="7587" cy="171885"/>
           </a:xfrm>
           <a:prstGeom prst="straightConnector1">
             <a:avLst/>
@@ -6529,14 +6529,14 @@
                 <a:latin typeface="Times New Roman" panose="02020603050405020304" pitchFamily="18" charset="0"/>
                 <a:cs typeface="Times New Roman" panose="02020603050405020304" pitchFamily="18" charset="0"/>
               </a:rPr>
-              <a:t>text_work.R</a:t>
+              <a:t>text_work.R*</a:t>
             </a:r>
             <a:r>
               <a:rPr lang="en-US" sz="1200" dirty="0">
                 <a:latin typeface="Times New Roman" panose="02020603050405020304" pitchFamily="18" charset="0"/>
                 <a:cs typeface="Times New Roman" panose="02020603050405020304" pitchFamily="18" charset="0"/>
               </a:rPr>
-              <a:t>: Declares functions for identifying bookmarkable elements, manipulating menu text.</a:t>
+              <a:t>: Makes functions for identifying bookmarkable elements, manipulating menu text.</a:t>
             </a:r>
             <a:endParaRPr lang="en-US" sz="1200" dirty="0">
               <a:solidFill>
@@ -7030,7 +7030,7 @@
                 <a:latin typeface="Times New Roman" panose="02020603050405020304" pitchFamily="18" charset="0"/>
                 <a:cs typeface="Times New Roman" panose="02020603050405020304" pitchFamily="18" charset="0"/>
               </a:rPr>
-              <a:t>ui_functions.R</a:t>
+              <a:t>ui_functions.R*</a:t>
             </a:r>
             <a:r>
               <a:rPr lang="en-US" sz="1200" dirty="0">
@@ -7040,7 +7040,7 @@
                 <a:latin typeface="Times New Roman" panose="02020603050405020304" pitchFamily="18" charset="0"/>
                 <a:cs typeface="Times New Roman" panose="02020603050405020304" pitchFamily="18" charset="0"/>
               </a:rPr>
-              <a:t>: Declares functions that generate interactive HTML widgets for Shiny applications.</a:t>
+              <a:t>: Makes functions that generate interactive HTML widgets for Shiny applications.</a:t>
             </a:r>
           </a:p>
         </p:txBody>
@@ -7438,9 +7438,9 @@
           <p:nvPr/>
         </p:nvCxnSpPr>
         <p:spPr>
-          <a:xfrm flipH="1">
-            <a:off x="6588401" y="2708919"/>
-            <a:ext cx="2948" cy="77598"/>
+          <a:xfrm>
+            <a:off x="6591349" y="2678141"/>
+            <a:ext cx="3372" cy="202663"/>
           </a:xfrm>
           <a:prstGeom prst="straightConnector1">
             <a:avLst/>
@@ -7753,7 +7753,7 @@
         <p:spPr>
           <a:xfrm>
             <a:off x="163716" y="4609711"/>
-            <a:ext cx="2363437" cy="276999"/>
+            <a:ext cx="2363437" cy="246221"/>
           </a:xfrm>
           <a:prstGeom prst="rect">
             <a:avLst/>
@@ -7783,14 +7783,14 @@
           <a:p>
             <a:pPr algn="ctr"/>
             <a:r>
-              <a:rPr lang="en-US" sz="1200" dirty="0">
+              <a:rPr lang="en-US" sz="1000" dirty="0">
                 <a:solidFill>
                   <a:schemeClr val="tx1"/>
                 </a:solidFill>
                 <a:latin typeface="Times New Roman" panose="02020603050405020304" pitchFamily="18" charset="0"/>
                 <a:cs typeface="Times New Roman" panose="02020603050405020304" pitchFamily="18" charset="0"/>
               </a:rPr>
-              <a:t>library(limma)</a:t>
+              <a:t>limma</a:t>
             </a:r>
           </a:p>
         </p:txBody>
@@ -7810,7 +7810,7 @@
         <p:spPr>
           <a:xfrm>
             <a:off x="5409630" y="2431920"/>
-            <a:ext cx="2363437" cy="276999"/>
+            <a:ext cx="2363437" cy="246221"/>
           </a:xfrm>
           <a:prstGeom prst="rect">
             <a:avLst/>
@@ -7840,7 +7840,7 @@
           <a:p>
             <a:pPr algn="ctr"/>
             <a:r>
-              <a:rPr lang="en-US" sz="1200" dirty="0">
+              <a:rPr lang="en-US" sz="1000" dirty="0">
                 <a:solidFill>
                   <a:schemeClr val="tx1"/>
                 </a:solidFill>
@@ -8406,7 +8406,7 @@
                 <a:latin typeface="Times New Roman" panose="02020603050405020304" pitchFamily="18" charset="0"/>
                 <a:cs typeface="Times New Roman" panose="02020603050405020304" pitchFamily="18" charset="0"/>
               </a:rPr>
-              <a:t>validation.R</a:t>
+              <a:t>validation.R*</a:t>
             </a:r>
             <a:r>
               <a:rPr lang="en-US" sz="1200" dirty="0">

</xml_diff>

<commit_message>
automatic refresh, improve presentation
</commit_message>
<xml_diff>
--- a/extras/Explorer_Tool_Workflow_2.pptx
+++ b/extras/Explorer_Tool_Workflow_2.pptx
@@ -263,7 +263,7 @@
           <a:p>
             <a:fld id="{1560D20A-E720-4ECB-907E-0F9EBDE75356}" type="datetimeFigureOut">
               <a:rPr lang="en-US" smtClean="0"/>
-              <a:t>4/24/2022</a:t>
+              <a:t>5/6/2022</a:t>
             </a:fld>
             <a:endParaRPr lang="en-US"/>
           </a:p>
@@ -461,7 +461,7 @@
           <a:p>
             <a:fld id="{1560D20A-E720-4ECB-907E-0F9EBDE75356}" type="datetimeFigureOut">
               <a:rPr lang="en-US" smtClean="0"/>
-              <a:t>4/24/2022</a:t>
+              <a:t>5/6/2022</a:t>
             </a:fld>
             <a:endParaRPr lang="en-US"/>
           </a:p>
@@ -669,7 +669,7 @@
           <a:p>
             <a:fld id="{1560D20A-E720-4ECB-907E-0F9EBDE75356}" type="datetimeFigureOut">
               <a:rPr lang="en-US" smtClean="0"/>
-              <a:t>4/24/2022</a:t>
+              <a:t>5/6/2022</a:t>
             </a:fld>
             <a:endParaRPr lang="en-US"/>
           </a:p>
@@ -867,7 +867,7 @@
           <a:p>
             <a:fld id="{1560D20A-E720-4ECB-907E-0F9EBDE75356}" type="datetimeFigureOut">
               <a:rPr lang="en-US" smtClean="0"/>
-              <a:t>4/24/2022</a:t>
+              <a:t>5/6/2022</a:t>
             </a:fld>
             <a:endParaRPr lang="en-US"/>
           </a:p>
@@ -1142,7 +1142,7 @@
           <a:p>
             <a:fld id="{1560D20A-E720-4ECB-907E-0F9EBDE75356}" type="datetimeFigureOut">
               <a:rPr lang="en-US" smtClean="0"/>
-              <a:t>4/24/2022</a:t>
+              <a:t>5/6/2022</a:t>
             </a:fld>
             <a:endParaRPr lang="en-US"/>
           </a:p>
@@ -1407,7 +1407,7 @@
           <a:p>
             <a:fld id="{1560D20A-E720-4ECB-907E-0F9EBDE75356}" type="datetimeFigureOut">
               <a:rPr lang="en-US" smtClean="0"/>
-              <a:t>4/24/2022</a:t>
+              <a:t>5/6/2022</a:t>
             </a:fld>
             <a:endParaRPr lang="en-US"/>
           </a:p>
@@ -1819,7 +1819,7 @@
           <a:p>
             <a:fld id="{1560D20A-E720-4ECB-907E-0F9EBDE75356}" type="datetimeFigureOut">
               <a:rPr lang="en-US" smtClean="0"/>
-              <a:t>4/24/2022</a:t>
+              <a:t>5/6/2022</a:t>
             </a:fld>
             <a:endParaRPr lang="en-US"/>
           </a:p>
@@ -1960,7 +1960,7 @@
           <a:p>
             <a:fld id="{1560D20A-E720-4ECB-907E-0F9EBDE75356}" type="datetimeFigureOut">
               <a:rPr lang="en-US" smtClean="0"/>
-              <a:t>4/24/2022</a:t>
+              <a:t>5/6/2022</a:t>
             </a:fld>
             <a:endParaRPr lang="en-US"/>
           </a:p>
@@ -2073,7 +2073,7 @@
           <a:p>
             <a:fld id="{1560D20A-E720-4ECB-907E-0F9EBDE75356}" type="datetimeFigureOut">
               <a:rPr lang="en-US" smtClean="0"/>
-              <a:t>4/24/2022</a:t>
+              <a:t>5/6/2022</a:t>
             </a:fld>
             <a:endParaRPr lang="en-US"/>
           </a:p>
@@ -2384,7 +2384,7 @@
           <a:p>
             <a:fld id="{1560D20A-E720-4ECB-907E-0F9EBDE75356}" type="datetimeFigureOut">
               <a:rPr lang="en-US" smtClean="0"/>
-              <a:t>4/24/2022</a:t>
+              <a:t>5/6/2022</a:t>
             </a:fld>
             <a:endParaRPr lang="en-US"/>
           </a:p>
@@ -2672,7 +2672,7 @@
           <a:p>
             <a:fld id="{1560D20A-E720-4ECB-907E-0F9EBDE75356}" type="datetimeFigureOut">
               <a:rPr lang="en-US" smtClean="0"/>
-              <a:t>4/24/2022</a:t>
+              <a:t>5/6/2022</a:t>
             </a:fld>
             <a:endParaRPr lang="en-US"/>
           </a:p>
@@ -2913,7 +2913,7 @@
           <a:p>
             <a:fld id="{1560D20A-E720-4ECB-907E-0F9EBDE75356}" type="datetimeFigureOut">
               <a:rPr lang="en-US" smtClean="0"/>
-              <a:t>4/24/2022</a:t>
+              <a:t>5/6/2022</a:t>
             </a:fld>
             <a:endParaRPr lang="en-US"/>
           </a:p>
@@ -7923,7 +7923,7 @@
         </p:nvSpPr>
         <p:spPr>
           <a:xfrm>
-            <a:off x="5411249" y="5275803"/>
+            <a:off x="5400056" y="5275803"/>
             <a:ext cx="2361683" cy="400110"/>
           </a:xfrm>
           <a:prstGeom prst="rect">
@@ -8582,10 +8582,10 @@
       </p:grpSpPr>
       <p:pic>
         <p:nvPicPr>
-          <p:cNvPr id="6" name="Picture 5">
-            <a:extLst>
-              <a:ext uri="{FF2B5EF4-FFF2-40B4-BE49-F238E27FC236}">
-                <a16:creationId xmlns:a16="http://schemas.microsoft.com/office/drawing/2014/main" id="{EE2157D2-151A-43D7-8210-247EE8C61730}"/>
+          <p:cNvPr id="5" name="Picture 4">
+            <a:extLst>
+              <a:ext uri="{FF2B5EF4-FFF2-40B4-BE49-F238E27FC236}">
+                <a16:creationId xmlns:a16="http://schemas.microsoft.com/office/drawing/2014/main" id="{B61A72F2-E909-47FA-AF9B-67D461C043DC}"/>
               </a:ext>
             </a:extLst>
           </p:cNvPr>
@@ -8602,8 +8602,8 @@
         </p:blipFill>
         <p:spPr>
           <a:xfrm>
-            <a:off x="160611" y="2519380"/>
-            <a:ext cx="5340666" cy="3106758"/>
+            <a:off x="303546" y="2517596"/>
+            <a:ext cx="5073610" cy="3208744"/>
           </a:xfrm>
           <a:prstGeom prst="rect">
             <a:avLst/>
@@ -8804,7 +8804,7 @@
         </p:nvSpPr>
         <p:spPr>
           <a:xfrm>
-            <a:off x="5346072" y="3912808"/>
+            <a:off x="5307237" y="3788786"/>
             <a:ext cx="1359879" cy="584775"/>
           </a:xfrm>
           <a:prstGeom prst="rect">
@@ -8840,7 +8840,7 @@
         </p:nvSpPr>
         <p:spPr>
           <a:xfrm>
-            <a:off x="4964724" y="4927497"/>
+            <a:off x="4989966" y="4796094"/>
             <a:ext cx="1697457" cy="584775"/>
           </a:xfrm>
           <a:prstGeom prst="rect">
@@ -8883,7 +8883,7 @@
         </p:nvSpPr>
         <p:spPr>
           <a:xfrm>
-            <a:off x="5182798" y="5810661"/>
+            <a:off x="5274810" y="5743232"/>
             <a:ext cx="1398450" cy="584775"/>
           </a:xfrm>
           <a:prstGeom prst="rect">
@@ -9176,7 +9176,7 @@
         </p:blipFill>
         <p:spPr bwMode="auto">
           <a:xfrm>
-            <a:off x="7736867" y="3628508"/>
+            <a:off x="7717707" y="3654777"/>
             <a:ext cx="854166" cy="854166"/>
           </a:xfrm>
           <a:prstGeom prst="rect">
@@ -9226,7 +9226,7 @@
         </p:blipFill>
         <p:spPr bwMode="auto">
           <a:xfrm>
-            <a:off x="6686276" y="3627822"/>
+            <a:off x="6667116" y="3654091"/>
             <a:ext cx="854166" cy="854166"/>
           </a:xfrm>
           <a:prstGeom prst="rect">
@@ -9465,7 +9465,7 @@
         </p:blipFill>
         <p:spPr>
           <a:xfrm>
-            <a:off x="8802777" y="3622728"/>
+            <a:off x="8753203" y="3654091"/>
             <a:ext cx="984509" cy="854166"/>
           </a:xfrm>
           <a:prstGeom prst="rect">
@@ -9490,7 +9490,7 @@
         </p:nvSpPr>
         <p:spPr>
           <a:xfrm>
-            <a:off x="5298281" y="2706575"/>
+            <a:off x="5268958" y="2794196"/>
             <a:ext cx="1387995" cy="584775"/>
           </a:xfrm>
           <a:prstGeom prst="rect">
@@ -9527,8 +9527,8 @@
         </p:nvSpPr>
         <p:spPr>
           <a:xfrm>
-            <a:off x="3125259" y="3106503"/>
-            <a:ext cx="672041" cy="182971"/>
+            <a:off x="3975532" y="3184713"/>
+            <a:ext cx="752307" cy="132775"/>
           </a:xfrm>
           <a:prstGeom prst="rect">
             <a:avLst/>
@@ -9579,8 +9579,8 @@
         </p:nvSpPr>
         <p:spPr>
           <a:xfrm>
-            <a:off x="160611" y="4381828"/>
-            <a:ext cx="1000557" cy="335898"/>
+            <a:off x="320646" y="4543642"/>
+            <a:ext cx="1064066" cy="311892"/>
           </a:xfrm>
           <a:prstGeom prst="rect">
             <a:avLst/>
@@ -9793,8 +9793,8 @@
         </p:nvSpPr>
         <p:spPr>
           <a:xfrm>
-            <a:off x="160611" y="2659502"/>
-            <a:ext cx="1000557" cy="1704130"/>
+            <a:off x="320646" y="2681752"/>
+            <a:ext cx="1064066" cy="1851395"/>
           </a:xfrm>
           <a:prstGeom prst="rect">
             <a:avLst/>
@@ -9866,8 +9866,13 @@
             </a:r>
             <a:r>
               <a:rPr lang="en-US" dirty="0"/>
-              <a:t> Settings</a:t>
-            </a:r>
+              <a:t> </a:t>
+            </a:r>
+            <a:r>
+              <a:rPr lang="en-US" sz="1600" dirty="0"/>
+              <a:t>Settings</a:t>
+            </a:r>
+            <a:endParaRPr lang="en-US" dirty="0"/>
           </a:p>
         </p:txBody>
       </p:sp>
@@ -9975,8 +9980,8 @@
         </p:nvSpPr>
         <p:spPr>
           <a:xfrm>
-            <a:off x="2597872" y="3108378"/>
-            <a:ext cx="484959" cy="182971"/>
+            <a:off x="2928408" y="3184713"/>
+            <a:ext cx="990980" cy="132775"/>
           </a:xfrm>
           <a:prstGeom prst="rect">
             <a:avLst/>

</xml_diff>

<commit_message>
refactoring, add DROSHA and DGCR8
</commit_message>
<xml_diff>
--- a/extras/Explorer_Tool_Workflow_2.pptx
+++ b/extras/Explorer_Tool_Workflow_2.pptx
@@ -263,7 +263,7 @@
           <a:p>
             <a:fld id="{1560D20A-E720-4ECB-907E-0F9EBDE75356}" type="datetimeFigureOut">
               <a:rPr lang="en-US" smtClean="0"/>
-              <a:t>5/6/2022</a:t>
+              <a:t>6/9/2022</a:t>
             </a:fld>
             <a:endParaRPr lang="en-US"/>
           </a:p>
@@ -461,7 +461,7 @@
           <a:p>
             <a:fld id="{1560D20A-E720-4ECB-907E-0F9EBDE75356}" type="datetimeFigureOut">
               <a:rPr lang="en-US" smtClean="0"/>
-              <a:t>5/6/2022</a:t>
+              <a:t>6/9/2022</a:t>
             </a:fld>
             <a:endParaRPr lang="en-US"/>
           </a:p>
@@ -669,7 +669,7 @@
           <a:p>
             <a:fld id="{1560D20A-E720-4ECB-907E-0F9EBDE75356}" type="datetimeFigureOut">
               <a:rPr lang="en-US" smtClean="0"/>
-              <a:t>5/6/2022</a:t>
+              <a:t>6/9/2022</a:t>
             </a:fld>
             <a:endParaRPr lang="en-US"/>
           </a:p>
@@ -867,7 +867,7 @@
           <a:p>
             <a:fld id="{1560D20A-E720-4ECB-907E-0F9EBDE75356}" type="datetimeFigureOut">
               <a:rPr lang="en-US" smtClean="0"/>
-              <a:t>5/6/2022</a:t>
+              <a:t>6/9/2022</a:t>
             </a:fld>
             <a:endParaRPr lang="en-US"/>
           </a:p>
@@ -1142,7 +1142,7 @@
           <a:p>
             <a:fld id="{1560D20A-E720-4ECB-907E-0F9EBDE75356}" type="datetimeFigureOut">
               <a:rPr lang="en-US" smtClean="0"/>
-              <a:t>5/6/2022</a:t>
+              <a:t>6/9/2022</a:t>
             </a:fld>
             <a:endParaRPr lang="en-US"/>
           </a:p>
@@ -1407,7 +1407,7 @@
           <a:p>
             <a:fld id="{1560D20A-E720-4ECB-907E-0F9EBDE75356}" type="datetimeFigureOut">
               <a:rPr lang="en-US" smtClean="0"/>
-              <a:t>5/6/2022</a:t>
+              <a:t>6/9/2022</a:t>
             </a:fld>
             <a:endParaRPr lang="en-US"/>
           </a:p>
@@ -1819,7 +1819,7 @@
           <a:p>
             <a:fld id="{1560D20A-E720-4ECB-907E-0F9EBDE75356}" type="datetimeFigureOut">
               <a:rPr lang="en-US" smtClean="0"/>
-              <a:t>5/6/2022</a:t>
+              <a:t>6/9/2022</a:t>
             </a:fld>
             <a:endParaRPr lang="en-US"/>
           </a:p>
@@ -1960,7 +1960,7 @@
           <a:p>
             <a:fld id="{1560D20A-E720-4ECB-907E-0F9EBDE75356}" type="datetimeFigureOut">
               <a:rPr lang="en-US" smtClean="0"/>
-              <a:t>5/6/2022</a:t>
+              <a:t>6/9/2022</a:t>
             </a:fld>
             <a:endParaRPr lang="en-US"/>
           </a:p>
@@ -2073,7 +2073,7 @@
           <a:p>
             <a:fld id="{1560D20A-E720-4ECB-907E-0F9EBDE75356}" type="datetimeFigureOut">
               <a:rPr lang="en-US" smtClean="0"/>
-              <a:t>5/6/2022</a:t>
+              <a:t>6/9/2022</a:t>
             </a:fld>
             <a:endParaRPr lang="en-US"/>
           </a:p>
@@ -2384,7 +2384,7 @@
           <a:p>
             <a:fld id="{1560D20A-E720-4ECB-907E-0F9EBDE75356}" type="datetimeFigureOut">
               <a:rPr lang="en-US" smtClean="0"/>
-              <a:t>5/6/2022</a:t>
+              <a:t>6/9/2022</a:t>
             </a:fld>
             <a:endParaRPr lang="en-US"/>
           </a:p>
@@ -2672,7 +2672,7 @@
           <a:p>
             <a:fld id="{1560D20A-E720-4ECB-907E-0F9EBDE75356}" type="datetimeFigureOut">
               <a:rPr lang="en-US" smtClean="0"/>
-              <a:t>5/6/2022</a:t>
+              <a:t>6/9/2022</a:t>
             </a:fld>
             <a:endParaRPr lang="en-US"/>
           </a:p>
@@ -2913,7 +2913,7 @@
           <a:p>
             <a:fld id="{1560D20A-E720-4ECB-907E-0F9EBDE75356}" type="datetimeFigureOut">
               <a:rPr lang="en-US" smtClean="0"/>
-              <a:t>5/6/2022</a:t>
+              <a:t>6/9/2022</a:t>
             </a:fld>
             <a:endParaRPr lang="en-US"/>
           </a:p>
@@ -6385,18 +6385,32 @@
           <a:p>
             <a:pPr algn="ctr"/>
             <a:r>
-              <a:rPr lang="en-US" sz="1200" b="1" dirty="0">
+              <a:rPr lang="en-US" sz="1200" b="1" dirty="0" err="1">
                 <a:latin typeface="Times New Roman" panose="02020603050405020304" pitchFamily="18" charset="0"/>
                 <a:cs typeface="Times New Roman" panose="02020603050405020304" pitchFamily="18" charset="0"/>
               </a:rPr>
               <a:t>converter.R</a:t>
             </a:r>
             <a:r>
+              <a:rPr lang="en-US" sz="1200" b="1">
+                <a:latin typeface="Times New Roman" panose="02020603050405020304" pitchFamily="18" charset="0"/>
+                <a:cs typeface="Times New Roman" panose="02020603050405020304" pitchFamily="18" charset="0"/>
+              </a:rPr>
+              <a:t>*</a:t>
+            </a:r>
+            <a:r>
+              <a:rPr lang="en-US" sz="1200">
+                <a:latin typeface="Times New Roman" panose="02020603050405020304" pitchFamily="18" charset="0"/>
+                <a:cs typeface="Times New Roman" panose="02020603050405020304" pitchFamily="18" charset="0"/>
+              </a:rPr>
+              <a:t>: </a:t>
+            </a:r>
+            <a:r>
               <a:rPr lang="en-US" sz="1200" dirty="0">
                 <a:latin typeface="Times New Roman" panose="02020603050405020304" pitchFamily="18" charset="0"/>
                 <a:cs typeface="Times New Roman" panose="02020603050405020304" pitchFamily="18" charset="0"/>
               </a:rPr>
-              <a:t>: Standardizes data for downstream processing and generates app configuration files.</a:t>
+              <a:t>Standardizes data for downstream processing and generates app configuration files.</a:t>
             </a:r>
             <a:endParaRPr lang="en-US" sz="1200" dirty="0">
               <a:solidFill>
@@ -9226,7 +9240,7 @@
         </p:blipFill>
         <p:spPr bwMode="auto">
           <a:xfrm>
-            <a:off x="6667116" y="3654091"/>
+            <a:off x="6656953" y="3654091"/>
             <a:ext cx="854166" cy="854166"/>
           </a:xfrm>
           <a:prstGeom prst="rect">
@@ -10171,7 +10185,7 @@
         <p:spPr>
           <a:xfrm>
             <a:off x="925107" y="50916"/>
-            <a:ext cx="2143141" cy="338554"/>
+            <a:ext cx="2336625" cy="338554"/>
           </a:xfrm>
           <a:prstGeom prst="rect">
             <a:avLst/>
@@ -10468,6 +10482,158 @@
           </a:prstGeom>
         </p:spPr>
       </p:pic>
+      <p:sp>
+        <p:nvSpPr>
+          <p:cNvPr id="2" name="TextBox 1">
+            <a:extLst>
+              <a:ext uri="{FF2B5EF4-FFF2-40B4-BE49-F238E27FC236}">
+                <a16:creationId xmlns:a16="http://schemas.microsoft.com/office/drawing/2014/main" id="{4CE7210F-A71D-4CA7-8195-DCBFC47FB2E5}"/>
+              </a:ext>
+            </a:extLst>
+          </p:cNvPr>
+          <p:cNvSpPr txBox="1"/>
+          <p:nvPr/>
+        </p:nvSpPr>
+        <p:spPr>
+          <a:xfrm>
+            <a:off x="391933" y="338862"/>
+            <a:ext cx="359933" cy="369332"/>
+          </a:xfrm>
+          <a:prstGeom prst="rect">
+            <a:avLst/>
+          </a:prstGeom>
+          <a:noFill/>
+        </p:spPr>
+        <p:txBody>
+          <a:bodyPr wrap="square" rtlCol="0">
+            <a:spAutoFit/>
+          </a:bodyPr>
+          <a:lstStyle/>
+          <a:p>
+            <a:r>
+              <a:rPr lang="en-US" b="1" dirty="0">
+                <a:latin typeface="Arial" panose="020B0604020202020204" pitchFamily="34" charset="0"/>
+                <a:cs typeface="Arial" panose="020B0604020202020204" pitchFamily="34" charset="0"/>
+              </a:rPr>
+              <a:t>A</a:t>
+            </a:r>
+          </a:p>
+        </p:txBody>
+      </p:sp>
+      <p:sp>
+        <p:nvSpPr>
+          <p:cNvPr id="15" name="TextBox 14">
+            <a:extLst>
+              <a:ext uri="{FF2B5EF4-FFF2-40B4-BE49-F238E27FC236}">
+                <a16:creationId xmlns:a16="http://schemas.microsoft.com/office/drawing/2014/main" id="{292BC433-5DCA-4EC8-A437-BE94B29AE30F}"/>
+              </a:ext>
+            </a:extLst>
+          </p:cNvPr>
+          <p:cNvSpPr txBox="1"/>
+          <p:nvPr/>
+        </p:nvSpPr>
+        <p:spPr>
+          <a:xfrm>
+            <a:off x="5200875" y="338862"/>
+            <a:ext cx="359933" cy="369332"/>
+          </a:xfrm>
+          <a:prstGeom prst="rect">
+            <a:avLst/>
+          </a:prstGeom>
+          <a:noFill/>
+        </p:spPr>
+        <p:txBody>
+          <a:bodyPr wrap="square" rtlCol="0">
+            <a:spAutoFit/>
+          </a:bodyPr>
+          <a:lstStyle/>
+          <a:p>
+            <a:r>
+              <a:rPr lang="en-US" b="1" dirty="0">
+                <a:latin typeface="Arial" panose="020B0604020202020204" pitchFamily="34" charset="0"/>
+                <a:cs typeface="Arial" panose="020B0604020202020204" pitchFamily="34" charset="0"/>
+              </a:rPr>
+              <a:t>B</a:t>
+            </a:r>
+          </a:p>
+        </p:txBody>
+      </p:sp>
+      <p:sp>
+        <p:nvSpPr>
+          <p:cNvPr id="16" name="TextBox 15">
+            <a:extLst>
+              <a:ext uri="{FF2B5EF4-FFF2-40B4-BE49-F238E27FC236}">
+                <a16:creationId xmlns:a16="http://schemas.microsoft.com/office/drawing/2014/main" id="{7B2359CD-7228-45B0-BA65-462BA10B030F}"/>
+              </a:ext>
+            </a:extLst>
+          </p:cNvPr>
+          <p:cNvSpPr txBox="1"/>
+          <p:nvPr/>
+        </p:nvSpPr>
+        <p:spPr>
+          <a:xfrm>
+            <a:off x="391932" y="3649039"/>
+            <a:ext cx="359933" cy="369332"/>
+          </a:xfrm>
+          <a:prstGeom prst="rect">
+            <a:avLst/>
+          </a:prstGeom>
+          <a:noFill/>
+        </p:spPr>
+        <p:txBody>
+          <a:bodyPr wrap="square" rtlCol="0">
+            <a:spAutoFit/>
+          </a:bodyPr>
+          <a:lstStyle/>
+          <a:p>
+            <a:r>
+              <a:rPr lang="en-US" b="1" dirty="0">
+                <a:latin typeface="Arial" panose="020B0604020202020204" pitchFamily="34" charset="0"/>
+                <a:cs typeface="Arial" panose="020B0604020202020204" pitchFamily="34" charset="0"/>
+              </a:rPr>
+              <a:t>C</a:t>
+            </a:r>
+          </a:p>
+        </p:txBody>
+      </p:sp>
+      <p:sp>
+        <p:nvSpPr>
+          <p:cNvPr id="17" name="TextBox 16">
+            <a:extLst>
+              <a:ext uri="{FF2B5EF4-FFF2-40B4-BE49-F238E27FC236}">
+                <a16:creationId xmlns:a16="http://schemas.microsoft.com/office/drawing/2014/main" id="{7163F994-CB9A-4349-8E3D-A96ECCECFDD9}"/>
+              </a:ext>
+            </a:extLst>
+          </p:cNvPr>
+          <p:cNvSpPr txBox="1"/>
+          <p:nvPr/>
+        </p:nvSpPr>
+        <p:spPr>
+          <a:xfrm>
+            <a:off x="5221945" y="3649039"/>
+            <a:ext cx="359933" cy="369332"/>
+          </a:xfrm>
+          <a:prstGeom prst="rect">
+            <a:avLst/>
+          </a:prstGeom>
+          <a:noFill/>
+        </p:spPr>
+        <p:txBody>
+          <a:bodyPr wrap="square" rtlCol="0">
+            <a:spAutoFit/>
+          </a:bodyPr>
+          <a:lstStyle/>
+          <a:p>
+            <a:r>
+              <a:rPr lang="en-US" b="1" dirty="0">
+                <a:latin typeface="Arial" panose="020B0604020202020204" pitchFamily="34" charset="0"/>
+                <a:cs typeface="Arial" panose="020B0604020202020204" pitchFamily="34" charset="0"/>
+              </a:rPr>
+              <a:t>D</a:t>
+            </a:r>
+          </a:p>
+        </p:txBody>
+      </p:sp>
     </p:spTree>
     <p:extLst>
       <p:ext uri="{BB962C8B-B14F-4D97-AF65-F5344CB8AC3E}">

</xml_diff>